<commit_message>
lecture 4 completed and half lecture 5
</commit_message>
<xml_diff>
--- a/slides/Slides Labjs.pptx
+++ b/slides/Slides Labjs.pptx
@@ -48,7 +48,13 @@
     <p:sldId id="297" r:id="rId42"/>
     <p:sldId id="298" r:id="rId43"/>
     <p:sldId id="299" r:id="rId44"/>
-    <p:sldId id="292" r:id="rId45"/>
+    <p:sldId id="300" r:id="rId45"/>
+    <p:sldId id="301" r:id="rId46"/>
+    <p:sldId id="302" r:id="rId47"/>
+    <p:sldId id="303" r:id="rId48"/>
+    <p:sldId id="304" r:id="rId49"/>
+    <p:sldId id="305" r:id="rId50"/>
+    <p:sldId id="292" r:id="rId51"/>
   </p:sldIdLst>
   <p:sldSz cx="12192000" cy="6858000"/>
   <p:notesSz cx="6858000" cy="9144000"/>
@@ -1419,6 +1425,114 @@
 </inkml:ink>
 </file>
 
+<file path=ppt/ink/ink51.xml><?xml version="1.0" encoding="utf-8"?>
+<inkml:ink xmlns:inkml="http://www.w3.org/2003/InkML">
+  <inkml:definitions>
+    <inkml:context xml:id="ctx0">
+      <inkml:inkSource xml:id="inkSrc0">
+        <inkml:traceFormat>
+          <inkml:channel name="X" type="integer" min="-2.14748E9" max="2.14748E9" units="cm"/>
+          <inkml:channel name="Y" type="integer" min="-2.14748E9" max="2.14748E9" units="cm"/>
+        </inkml:traceFormat>
+        <inkml:channelProperties>
+          <inkml:channelProperty channel="X" name="resolution" value="1000" units="1/cm"/>
+          <inkml:channelProperty channel="Y" name="resolution" value="1000" units="1/cm"/>
+        </inkml:channelProperties>
+      </inkml:inkSource>
+      <inkml:timestamp xml:id="ts0" timeString="2025-06-29T20:00:40.029"/>
+    </inkml:context>
+    <inkml:brush xml:id="br0">
+      <inkml:brushProperty name="width" value="0.2" units="cm"/>
+      <inkml:brushProperty name="height" value="1.2" units="cm"/>
+      <inkml:brushProperty name="ignorePressure" value="1"/>
+      <inkml:brushProperty name="inkEffects" value="pencil"/>
+    </inkml:brush>
+  </inkml:definitions>
+  <inkml:trace contextRef="#ctx0" brushRef="#br0">969 4802,'0'-4,"0"-6,0-6,-4-4,-2-3,-4 3,-4-5,-5-15,-7-13,-13-20,-16-27,-8-23,-11-17,-5-5,2 8,10 15,12 20,10 18,10 19,5 17,5 7,5 6,3 6,3 2,1 7,2 2,3 0,3-6,-3-3,1-1,-3-5,-4-1,0 1,3-2,-1 0,1 2,-1 2,0 2,-1 2,1 1,3-4,3-1,2 1,2-4,2-4,0-5,0-3,1-3,-1-2,1-4,3-3,7-7,5-3,8-2,5 3,1-2,1 4,-2-5,4-3,0-3,-1 3,3-3,-1 3,3 1,4 3,-1 6,-3 4,-3 4,0 7,0-2,-2 0,2 3,0 2,-2 8,-1 6,1 0,5 0,-4 2,-3 1,1-3,5-1,0 1,3 1,7-2,5-1,3 6,0 2,0 3,-1-1,4 0,1-1,3 0,0 4,-2 0,-2 0,-2-1,2-1,1-1,-2 2,-1 2,7-5,2-3,-2-1,-2 4,-7 7,-9 5,-7 6,-1-2,-3 2,-2 1,2-3,-1 0,0 2,2-3,-1 0,0 2,-3 2,3-2,0-1,3 2,0-3,2 0,-1 2,-7-3,-4 2,-2 1,-1 2,1 1,-1 3,1 0,-4 1</inkml:trace>
+</inkml:ink>
+</file>
+
+<file path=ppt/ink/ink52.xml><?xml version="1.0" encoding="utf-8"?>
+<inkml:ink xmlns:inkml="http://www.w3.org/2003/InkML">
+  <inkml:definitions>
+    <inkml:context xml:id="ctx0">
+      <inkml:inkSource xml:id="inkSrc0">
+        <inkml:traceFormat>
+          <inkml:channel name="X" type="integer" min="-2.14748E9" max="2.14748E9" units="cm"/>
+          <inkml:channel name="Y" type="integer" min="-2.14748E9" max="2.14748E9" units="cm"/>
+        </inkml:traceFormat>
+        <inkml:channelProperties>
+          <inkml:channelProperty channel="X" name="resolution" value="1000" units="1/cm"/>
+          <inkml:channelProperty channel="Y" name="resolution" value="1000" units="1/cm"/>
+        </inkml:channelProperties>
+      </inkml:inkSource>
+      <inkml:timestamp xml:id="ts0" timeString="2025-06-29T20:00:42.828"/>
+    </inkml:context>
+    <inkml:brush xml:id="br0">
+      <inkml:brushProperty name="width" value="0.2" units="cm"/>
+      <inkml:brushProperty name="height" value="1.2" units="cm"/>
+      <inkml:brushProperty name="ignorePressure" value="1"/>
+      <inkml:brushProperty name="inkEffects" value="pencil"/>
+    </inkml:brush>
+  </inkml:definitions>
+  <inkml:trace contextRef="#ctx0" brushRef="#br0">0 658,'5'0,"5"0,6 0,4 0,3 0,2 4,1 2,0-1,1-1,-1-1,0-1,-4 4,-3 0,2 0,0-2,-4 3,1 1,1-2,1-1,-2 2,0 1,1-2,2-2,-3 4,0-1,2-1,0-1,3-2,1-1,-4 3,0 1,0-1,1-1,-3 3,0 1,1-2,2-2,-3-5,-5-7,-3-7,-10-1,-3-1,-6 2,-1-2,-4 4,1-2,-2 2,2 0,-2 1,-2 3,2-1,-1-4,2-3,0 1,1-1,0-2,-4 2,3 0,-2-2,2-1,-1-3,2-1,0 4,1 0,3 0,-1 3,0 0,3-1,2-2,-2 2,-1 0,-2-1,0-2,2-1,2-2,-2-1,0 0,2-1,-3 5,1 1,1 0,2-1,2-2,1 8,2 11,0 10,0 5</inkml:trace>
+</inkml:ink>
+</file>
+
+<file path=ppt/ink/ink53.xml><?xml version="1.0" encoding="utf-8"?>
+<inkml:ink xmlns:inkml="http://www.w3.org/2003/InkML">
+  <inkml:definitions>
+    <inkml:context xml:id="ctx0">
+      <inkml:inkSource xml:id="inkSrc0">
+        <inkml:traceFormat>
+          <inkml:channel name="X" type="integer" min="-2.14748E9" max="2.14748E9" units="cm"/>
+          <inkml:channel name="Y" type="integer" min="-2.14748E9" max="2.14748E9" units="cm"/>
+        </inkml:traceFormat>
+        <inkml:channelProperties>
+          <inkml:channelProperty channel="X" name="resolution" value="1000" units="1/cm"/>
+          <inkml:channelProperty channel="Y" name="resolution" value="1000" units="1/cm"/>
+        </inkml:channelProperties>
+      </inkml:inkSource>
+      <inkml:timestamp xml:id="ts0" timeString="2025-06-29T20:00:46.522"/>
+    </inkml:context>
+    <inkml:brush xml:id="br0">
+      <inkml:brushProperty name="width" value="0.2" units="cm"/>
+      <inkml:brushProperty name="height" value="1.2" units="cm"/>
+      <inkml:brushProperty name="ignorePressure" value="1"/>
+      <inkml:brushProperty name="inkEffects" value="pencil"/>
+    </inkml:brush>
+  </inkml:definitions>
+  <inkml:trace contextRef="#ctx0" brushRef="#br0">1 1,'4'0,"6"0,6 0,4 0,3 0,2 0,1 0,0 0,1 0,-1 4,0 2,0 0,0-2,-1-1,1-1,-1-1,0 0,1-1,-1 0,0 4,1 1,-5 4,-1 1,-5 3,1-1,0-3,3-2,2-3,2-2,2-1,-4 3,-1 2,-4 3,-5 5,-4 5,-3 2,-2 3,-2 2,-1 0,0 0,0 0,1 0,-1 0,-3 0,-3-1,2 1,0-1,2 1,1-1,1 1,1-1,0 0,0 1,0-1,0 0,-4 1,-1-1,-1 1,2-1,0 0,2 1,1-1,1 1,0-5</inkml:trace>
+</inkml:ink>
+</file>
+
+<file path=ppt/ink/ink54.xml><?xml version="1.0" encoding="utf-8"?>
+<inkml:ink xmlns:inkml="http://www.w3.org/2003/InkML">
+  <inkml:definitions>
+    <inkml:context xml:id="ctx0">
+      <inkml:inkSource xml:id="inkSrc0">
+        <inkml:traceFormat>
+          <inkml:channel name="X" type="integer" min="-2.14748E9" max="2.14748E9" units="cm"/>
+          <inkml:channel name="Y" type="integer" min="-2.14748E9" max="2.14748E9" units="cm"/>
+        </inkml:traceFormat>
+        <inkml:channelProperties>
+          <inkml:channelProperty channel="X" name="resolution" value="1000" units="1/cm"/>
+          <inkml:channelProperty channel="Y" name="resolution" value="1000" units="1/cm"/>
+        </inkml:channelProperties>
+      </inkml:inkSource>
+      <inkml:timestamp xml:id="ts0" timeString="2025-06-29T20:00:49.360"/>
+    </inkml:context>
+    <inkml:brush xml:id="br0">
+      <inkml:brushProperty name="width" value="0.2" units="cm"/>
+      <inkml:brushProperty name="height" value="1.2" units="cm"/>
+      <inkml:brushProperty name="ignorePressure" value="1"/>
+      <inkml:brushProperty name="inkEffects" value="pencil"/>
+    </inkml:brush>
+  </inkml:definitions>
+  <inkml:trace contextRef="#ctx0" brushRef="#br0">1070 1,'-5'0,"-5"0,-6 0,-4 4,-3 7,3 4,-1 5,0-1,3 0,1 2,-2 1,3 1,0 2,-2 4,-2 2,-3 4,0 6,-2 3,-5 4,-1 1,-5 7,-4 1,-4 0,1-1,3-1,5-6,3-3,8-4,3-6,1-4,0-3,-2 1,0 1,2-1,1-1,4-1,0-2,-2 5,-3 4,3 6,0 4,2 7,0 4,3 1,-2 0,2-3,3 0,-1-1,1-2,-3 0,2 5,1 0,3 0,3-1,1-1,1-2,1 0,1 4,-1 0,1 0,-1-1,0-1,0-2,1 0,-1-1,0-4,0-2,0 0,0-3,-1-5,1 1,0-3,0-2,0-3,0-2,5-2,1 0,-1 3,0 2,2-5,1-2,2-1,1-1,2 1,-1 1,-2 0,-4 1,3 0,-2 1,4 4,-1 1,2 0,4-5,-1 1,1 0,2 1,7 3,-1 2,5-2,5 4,1 3,4 1,8-3,9 2,3 2,1 0,-2-4,-1 2,-3-2,-1 5,-1 2,8-4,-7 1,-3-2,-2-4,-4-2,-2-8,-7-2,-6-6,2-1,-2 1,5 2,-1-2,-1 1,3 2,0-3,-2 1,-3-3,3-4,0 1,-1-2,2-1,0 1,-2-1,3-1,-4 2,0 0,4-2,0 2,3 0,4 2,-1 0,0-2,3 2,3-2,1 3,6-1,2-3,0 2,0 0,3 1,0 0,3 2,4-1,-1-3,6 2,0-2,0-2,-3-2,0-2,-3-1,0-2,-2 0,1 0,3-1,-2 1,2-1,-2 1,4 0,0 0,-7 0,-7 0,6 0,0 0,0-4,-4-2,-10-3,-5-1,-5 1,-5 3,-3 1,2 3,-1 1,1 1,-7-5,-2 0,-1 0,1 1,0 1,1 1,2 1,-5-3,-4-2</inkml:trace>
+</inkml:ink>
+</file>
+
 <file path=ppt/ink/ink6.xml><?xml version="1.0" encoding="utf-8"?>
 <inkml:ink xmlns:inkml="http://www.w3.org/2003/InkML">
   <inkml:definitions>
@@ -15390,8 +15504,8 @@
           </a:xfrm>
         </p:spPr>
       </p:pic>
-      <mc:AlternateContent xmlns:mc="http://schemas.openxmlformats.org/markup-compatibility/2006">
-        <mc:Choice xmlns:p14="http://schemas.microsoft.com/office/powerpoint/2010/main" xmlns:aink="http://schemas.microsoft.com/office/drawing/2016/ink" Requires="p14 aink">
+      <mc:AlternateContent xmlns:mc="http://schemas.openxmlformats.org/markup-compatibility/2006" xmlns:p14="http://schemas.microsoft.com/office/powerpoint/2010/main" xmlns:aink="http://schemas.microsoft.com/office/drawing/2016/ink">
+        <mc:Choice Requires="p14 aink">
           <p:contentPart p14:bwMode="auto" r:id="rId3">
             <p14:nvContentPartPr>
               <p14:cNvPr id="10" name="Ink 9">
@@ -15410,7 +15524,7 @@
             </p14:xfrm>
           </p:contentPart>
         </mc:Choice>
-        <mc:Fallback>
+        <mc:Fallback xmlns="">
           <p:pic>
             <p:nvPicPr>
               <p:cNvPr id="10" name="Ink 9">
@@ -15441,8 +15555,8 @@
           </p:pic>
         </mc:Fallback>
       </mc:AlternateContent>
-      <mc:AlternateContent xmlns:mc="http://schemas.openxmlformats.org/markup-compatibility/2006">
-        <mc:Choice xmlns:p14="http://schemas.microsoft.com/office/powerpoint/2010/main" xmlns:aink="http://schemas.microsoft.com/office/drawing/2016/ink" Requires="p14 aink">
+      <mc:AlternateContent xmlns:mc="http://schemas.openxmlformats.org/markup-compatibility/2006" xmlns:p14="http://schemas.microsoft.com/office/powerpoint/2010/main" xmlns:aink="http://schemas.microsoft.com/office/drawing/2016/ink">
+        <mc:Choice Requires="p14 aink">
           <p:contentPart p14:bwMode="auto" r:id="rId5">
             <p14:nvContentPartPr>
               <p14:cNvPr id="7" name="Ink 6">
@@ -15461,7 +15575,7 @@
             </p14:xfrm>
           </p:contentPart>
         </mc:Choice>
-        <mc:Fallback>
+        <mc:Fallback xmlns="">
           <p:pic>
             <p:nvPicPr>
               <p:cNvPr id="7" name="Ink 6">
@@ -15492,8 +15606,8 @@
           </p:pic>
         </mc:Fallback>
       </mc:AlternateContent>
-      <mc:AlternateContent xmlns:mc="http://schemas.openxmlformats.org/markup-compatibility/2006">
-        <mc:Choice xmlns:p14="http://schemas.microsoft.com/office/powerpoint/2010/main" xmlns:aink="http://schemas.microsoft.com/office/drawing/2016/ink" Requires="p14 aink">
+      <mc:AlternateContent xmlns:mc="http://schemas.openxmlformats.org/markup-compatibility/2006" xmlns:p14="http://schemas.microsoft.com/office/powerpoint/2010/main" xmlns:aink="http://schemas.microsoft.com/office/drawing/2016/ink">
+        <mc:Choice Requires="p14 aink">
           <p:contentPart p14:bwMode="auto" r:id="rId7">
             <p14:nvContentPartPr>
               <p14:cNvPr id="8" name="Ink 7">
@@ -15512,7 +15626,7 @@
             </p14:xfrm>
           </p:contentPart>
         </mc:Choice>
-        <mc:Fallback>
+        <mc:Fallback xmlns="">
           <p:pic>
             <p:nvPicPr>
               <p:cNvPr id="8" name="Ink 7">
@@ -15563,8 +15677,8 @@
             <a:chExt cx="2424240" cy="945000"/>
           </a:xfrm>
         </p:grpSpPr>
-        <mc:AlternateContent xmlns:mc="http://schemas.openxmlformats.org/markup-compatibility/2006">
-          <mc:Choice xmlns:p14="http://schemas.microsoft.com/office/powerpoint/2010/main" xmlns:aink="http://schemas.microsoft.com/office/drawing/2016/ink" Requires="p14 aink">
+        <mc:AlternateContent xmlns:mc="http://schemas.openxmlformats.org/markup-compatibility/2006" xmlns:p14="http://schemas.microsoft.com/office/powerpoint/2010/main" xmlns:aink="http://schemas.microsoft.com/office/drawing/2016/ink">
+          <mc:Choice Requires="p14 aink">
             <p:contentPart p14:bwMode="auto" r:id="rId9">
               <p14:nvContentPartPr>
                 <p14:cNvPr id="11" name="Ink 10">
@@ -15583,7 +15697,7 @@
               </p14:xfrm>
             </p:contentPart>
           </mc:Choice>
-          <mc:Fallback>
+          <mc:Fallback xmlns="">
             <p:pic>
               <p:nvPicPr>
                 <p:cNvPr id="11" name="Ink 10">
@@ -15614,8 +15728,8 @@
             </p:pic>
           </mc:Fallback>
         </mc:AlternateContent>
-        <mc:AlternateContent xmlns:mc="http://schemas.openxmlformats.org/markup-compatibility/2006">
-          <mc:Choice xmlns:p14="http://schemas.microsoft.com/office/powerpoint/2010/main" xmlns:aink="http://schemas.microsoft.com/office/drawing/2016/ink" Requires="p14 aink">
+        <mc:AlternateContent xmlns:mc="http://schemas.openxmlformats.org/markup-compatibility/2006" xmlns:p14="http://schemas.microsoft.com/office/powerpoint/2010/main" xmlns:aink="http://schemas.microsoft.com/office/drawing/2016/ink">
+          <mc:Choice Requires="p14 aink">
             <p:contentPart p14:bwMode="auto" r:id="rId11">
               <p14:nvContentPartPr>
                 <p14:cNvPr id="13" name="Ink 12">
@@ -15634,7 +15748,7 @@
               </p14:xfrm>
             </p:contentPart>
           </mc:Choice>
-          <mc:Fallback>
+          <mc:Fallback xmlns="">
             <p:pic>
               <p:nvPicPr>
                 <p:cNvPr id="13" name="Ink 12">
@@ -15665,8 +15779,8 @@
             </p:pic>
           </mc:Fallback>
         </mc:AlternateContent>
-        <mc:AlternateContent xmlns:mc="http://schemas.openxmlformats.org/markup-compatibility/2006">
-          <mc:Choice xmlns:p14="http://schemas.microsoft.com/office/powerpoint/2010/main" xmlns:aink="http://schemas.microsoft.com/office/drawing/2016/ink" Requires="p14 aink">
+        <mc:AlternateContent xmlns:mc="http://schemas.openxmlformats.org/markup-compatibility/2006" xmlns:p14="http://schemas.microsoft.com/office/powerpoint/2010/main" xmlns:aink="http://schemas.microsoft.com/office/drawing/2016/ink">
+          <mc:Choice Requires="p14 aink">
             <p:contentPart p14:bwMode="auto" r:id="rId13">
               <p14:nvContentPartPr>
                 <p14:cNvPr id="14" name="Ink 13">
@@ -15685,7 +15799,7 @@
               </p14:xfrm>
             </p:contentPart>
           </mc:Choice>
-          <mc:Fallback>
+          <mc:Fallback xmlns="">
             <p:pic>
               <p:nvPicPr>
                 <p:cNvPr id="14" name="Ink 13">
@@ -18051,35 +18165,118 @@
           <a:bodyPr/>
           <a:lstStyle/>
           <a:p>
-            <a:endParaRPr lang="it-IT"/>
+            <a:pPr marL="0" indent="0">
+              <a:buNone/>
+            </a:pPr>
+            <a:r>
+              <a:rPr lang="it-IT" dirty="0" err="1"/>
+              <a:t>let</a:t>
+            </a:r>
+            <a:r>
+              <a:rPr lang="it-IT" dirty="0"/>
+              <a:t> </a:t>
+            </a:r>
+            <a:r>
+              <a:rPr lang="it-IT" dirty="0" err="1"/>
+              <a:t>ds</a:t>
+            </a:r>
+            <a:r>
+              <a:rPr lang="it-IT" dirty="0"/>
+              <a:t>=</a:t>
+            </a:r>
+            <a:r>
+              <a:rPr lang="it-IT" dirty="0" err="1"/>
+              <a:t>this.options.datastore</a:t>
+            </a:r>
+            <a:r>
+              <a:rPr lang="it-IT" dirty="0"/>
+              <a:t>;</a:t>
+            </a:r>
+          </a:p>
+          <a:p>
+            <a:pPr marL="0" indent="0">
+              <a:buNone/>
+            </a:pPr>
+            <a:r>
+              <a:rPr lang="it-IT" dirty="0"/>
+              <a:t>console.log(</a:t>
+            </a:r>
+            <a:r>
+              <a:rPr lang="it-IT" dirty="0" err="1"/>
+              <a:t>ds</a:t>
+            </a:r>
+            <a:r>
+              <a:rPr lang="it-IT" dirty="0"/>
+              <a:t>);</a:t>
+            </a:r>
+          </a:p>
+          <a:p>
+            <a:pPr marL="0" indent="0">
+              <a:buNone/>
+            </a:pPr>
+            <a:endParaRPr lang="it-IT" dirty="0"/>
           </a:p>
         </p:txBody>
       </p:sp>
-      <p:sp>
-        <p:nvSpPr>
-          <p:cNvPr id="4" name="Content Placeholder 3">
-            <a:extLst>
-              <a:ext uri="{FF2B5EF4-FFF2-40B4-BE49-F238E27FC236}">
-                <a16:creationId xmlns:a16="http://schemas.microsoft.com/office/drawing/2014/main" id="{F061BC9E-2BF3-211E-A7D1-E5FF6ABE38C3}"/>
-              </a:ext>
-            </a:extLst>
-          </p:cNvPr>
-          <p:cNvSpPr>
-            <a:spLocks noGrp="1"/>
-          </p:cNvSpPr>
+      <p:pic>
+        <p:nvPicPr>
+          <p:cNvPr id="6" name="Content Placeholder 5">
+            <a:extLst>
+              <a:ext uri="{FF2B5EF4-FFF2-40B4-BE49-F238E27FC236}">
+                <a16:creationId xmlns:a16="http://schemas.microsoft.com/office/drawing/2014/main" id="{B6A8C082-CCBC-CF65-0916-E3F5190018CF}"/>
+              </a:ext>
+            </a:extLst>
+          </p:cNvPr>
+          <p:cNvPicPr>
+            <a:picLocks noGrp="1" noChangeAspect="1"/>
+          </p:cNvPicPr>
           <p:nvPr>
             <p:ph sz="half" idx="2"/>
           </p:nvPr>
-        </p:nvSpPr>
-        <p:spPr/>
-        <p:txBody>
-          <a:bodyPr/>
-          <a:lstStyle/>
-          <a:p>
-            <a:endParaRPr lang="it-IT"/>
-          </a:p>
-        </p:txBody>
-      </p:sp>
+        </p:nvPicPr>
+        <p:blipFill>
+          <a:blip r:embed="rId2"/>
+          <a:stretch>
+            <a:fillRect/>
+          </a:stretch>
+        </p:blipFill>
+        <p:spPr>
+          <a:xfrm>
+            <a:off x="6846621" y="1253331"/>
+            <a:ext cx="4703612" cy="4351338"/>
+          </a:xfrm>
+        </p:spPr>
+      </p:pic>
+      <p:pic>
+        <p:nvPicPr>
+          <p:cNvPr id="8" name="Picture 7">
+            <a:extLst>
+              <a:ext uri="{FF2B5EF4-FFF2-40B4-BE49-F238E27FC236}">
+                <a16:creationId xmlns:a16="http://schemas.microsoft.com/office/drawing/2014/main" id="{723E6622-244C-3CB2-6508-82F32C5B85B7}"/>
+              </a:ext>
+            </a:extLst>
+          </p:cNvPr>
+          <p:cNvPicPr>
+            <a:picLocks noChangeAspect="1"/>
+          </p:cNvPicPr>
+          <p:nvPr/>
+        </p:nvPicPr>
+        <p:blipFill>
+          <a:blip r:embed="rId3"/>
+          <a:stretch>
+            <a:fillRect/>
+          </a:stretch>
+        </p:blipFill>
+        <p:spPr>
+          <a:xfrm>
+            <a:off x="239484" y="5579742"/>
+            <a:ext cx="8958943" cy="1036418"/>
+          </a:xfrm>
+          <a:prstGeom prst="rect">
+            <a:avLst/>
+          </a:prstGeom>
+        </p:spPr>
+      </p:pic>
     </p:spTree>
     <p:extLst>
       <p:ext uri="{BB962C8B-B14F-4D97-AF65-F5344CB8AC3E}">
@@ -18115,7 +18312,7 @@
           <p:cNvPr id="2" name="Title 1">
             <a:extLst>
               <a:ext uri="{FF2B5EF4-FFF2-40B4-BE49-F238E27FC236}">
-                <a16:creationId xmlns:a16="http://schemas.microsoft.com/office/drawing/2014/main" id="{4B0C1129-E756-8454-35B3-5BD61C15A7BD}"/>
+                <a16:creationId xmlns:a16="http://schemas.microsoft.com/office/drawing/2014/main" id="{F80C13E5-9901-370D-07A6-E723EAA6ED12}"/>
               </a:ext>
             </a:extLst>
           </p:cNvPr>
@@ -18131,16 +18328,28 @@
           <a:bodyPr/>
           <a:lstStyle/>
           <a:p>
-            <a:endParaRPr lang="it-IT"/>
+            <a:r>
+              <a:rPr lang="it-IT" dirty="0" err="1"/>
+              <a:t>Showing</a:t>
+            </a:r>
+            <a:r>
+              <a:rPr lang="it-IT" dirty="0"/>
+              <a:t> the data </a:t>
+            </a:r>
+            <a:r>
+              <a:rPr lang="it-IT" dirty="0" err="1"/>
+              <a:t>collection</a:t>
+            </a:r>
+            <a:endParaRPr lang="it-IT" dirty="0"/>
           </a:p>
         </p:txBody>
       </p:sp>
       <p:pic>
         <p:nvPicPr>
-          <p:cNvPr id="6" name="Content Placeholder 5">
-            <a:extLst>
-              <a:ext uri="{FF2B5EF4-FFF2-40B4-BE49-F238E27FC236}">
-                <a16:creationId xmlns:a16="http://schemas.microsoft.com/office/drawing/2014/main" id="{E2DC23CB-B9BF-C20E-11A5-67333BEA3D59}"/>
+          <p:cNvPr id="8" name="Content Placeholder 7">
+            <a:extLst>
+              <a:ext uri="{FF2B5EF4-FFF2-40B4-BE49-F238E27FC236}">
+                <a16:creationId xmlns:a16="http://schemas.microsoft.com/office/drawing/2014/main" id="{D0BD78F3-F996-3B00-B41B-B52B6DF428DD}"/>
               </a:ext>
             </a:extLst>
           </p:cNvPr>
@@ -18159,17 +18368,76 @@
         </p:blipFill>
         <p:spPr>
           <a:xfrm>
-            <a:off x="838200" y="3101860"/>
-            <a:ext cx="5181600" cy="1798868"/>
+            <a:off x="838200" y="3140042"/>
+            <a:ext cx="5181600" cy="1722503"/>
           </a:xfrm>
         </p:spPr>
       </p:pic>
+      <p:pic>
+        <p:nvPicPr>
+          <p:cNvPr id="6" name="Content Placeholder 5">
+            <a:extLst>
+              <a:ext uri="{FF2B5EF4-FFF2-40B4-BE49-F238E27FC236}">
+                <a16:creationId xmlns:a16="http://schemas.microsoft.com/office/drawing/2014/main" id="{9BE1A7C9-EF21-D77E-5D9C-BA5CF51EDFCA}"/>
+              </a:ext>
+            </a:extLst>
+          </p:cNvPr>
+          <p:cNvPicPr>
+            <a:picLocks noGrp="1" noChangeAspect="1"/>
+          </p:cNvPicPr>
+          <p:nvPr>
+            <p:ph sz="half" idx="2"/>
+          </p:nvPr>
+        </p:nvPicPr>
+        <p:blipFill>
+          <a:blip r:embed="rId3"/>
+          <a:stretch>
+            <a:fillRect/>
+          </a:stretch>
+        </p:blipFill>
+        <p:spPr>
+          <a:xfrm>
+            <a:off x="6172200" y="2740627"/>
+            <a:ext cx="5181600" cy="2521334"/>
+          </a:xfrm>
+        </p:spPr>
+      </p:pic>
+    </p:spTree>
+    <p:extLst>
+      <p:ext uri="{BB962C8B-B14F-4D97-AF65-F5344CB8AC3E}">
+        <p14:creationId xmlns:p14="http://schemas.microsoft.com/office/powerpoint/2010/main" val="1588837688"/>
+      </p:ext>
+    </p:extLst>
+  </p:cSld>
+  <p:clrMapOvr>
+    <a:masterClrMapping/>
+  </p:clrMapOvr>
+</p:sld>
+</file>
+
+<file path=ppt/slides/slide45.xml><?xml version="1.0" encoding="utf-8"?>
+<p:sld xmlns:a="http://schemas.openxmlformats.org/drawingml/2006/main" xmlns:r="http://schemas.openxmlformats.org/officeDocument/2006/relationships" xmlns:p="http://schemas.openxmlformats.org/presentationml/2006/main">
+  <p:cSld>
+    <p:spTree>
+      <p:nvGrpSpPr>
+        <p:cNvPr id="1" name=""/>
+        <p:cNvGrpSpPr/>
+        <p:nvPr/>
+      </p:nvGrpSpPr>
+      <p:grpSpPr>
+        <a:xfrm>
+          <a:off x="0" y="0"/>
+          <a:ext cx="0" cy="0"/>
+          <a:chOff x="0" y="0"/>
+          <a:chExt cx="0" cy="0"/>
+        </a:xfrm>
+      </p:grpSpPr>
       <p:sp>
         <p:nvSpPr>
-          <p:cNvPr id="4" name="Content Placeholder 3">
-            <a:extLst>
-              <a:ext uri="{FF2B5EF4-FFF2-40B4-BE49-F238E27FC236}">
-                <a16:creationId xmlns:a16="http://schemas.microsoft.com/office/drawing/2014/main" id="{8E7A46A6-0A6B-3DF3-4AFD-9F7236310D27}"/>
+          <p:cNvPr id="2" name="Title 1">
+            <a:extLst>
+              <a:ext uri="{FF2B5EF4-FFF2-40B4-BE49-F238E27FC236}">
+                <a16:creationId xmlns:a16="http://schemas.microsoft.com/office/drawing/2014/main" id="{3F1A4777-3B8E-9B9D-B54C-B63A6C13E736}"/>
               </a:ext>
             </a:extLst>
           </p:cNvPr>
@@ -18177,7 +18445,7 @@
             <a:spLocks noGrp="1"/>
           </p:cNvSpPr>
           <p:nvPr>
-            <p:ph sz="half" idx="2"/>
+            <p:ph type="title"/>
           </p:nvPr>
         </p:nvSpPr>
         <p:spPr/>
@@ -18185,14 +18453,1067 @@
           <a:bodyPr/>
           <a:lstStyle/>
           <a:p>
-            <a:endParaRPr lang="it-IT"/>
+            <a:r>
+              <a:rPr lang="it-IT" dirty="0"/>
+              <a:t>The data </a:t>
+            </a:r>
+            <a:r>
+              <a:rPr lang="it-IT" dirty="0" err="1"/>
+              <a:t>structure</a:t>
+            </a:r>
+            <a:endParaRPr lang="it-IT" dirty="0"/>
+          </a:p>
+        </p:txBody>
+      </p:sp>
+      <p:pic>
+        <p:nvPicPr>
+          <p:cNvPr id="7" name="Content Placeholder 6">
+            <a:extLst>
+              <a:ext uri="{FF2B5EF4-FFF2-40B4-BE49-F238E27FC236}">
+                <a16:creationId xmlns:a16="http://schemas.microsoft.com/office/drawing/2014/main" id="{CBBD12F0-98A9-F46C-EEA8-BE96F893DDB6}"/>
+              </a:ext>
+            </a:extLst>
+          </p:cNvPr>
+          <p:cNvPicPr>
+            <a:picLocks noGrp="1" noChangeAspect="1"/>
+          </p:cNvPicPr>
+          <p:nvPr>
+            <p:ph idx="1"/>
+          </p:nvPr>
+        </p:nvPicPr>
+        <p:blipFill>
+          <a:blip r:embed="rId2"/>
+          <a:stretch>
+            <a:fillRect/>
+          </a:stretch>
+        </p:blipFill>
+        <p:spPr>
+          <a:xfrm>
+            <a:off x="838200" y="3029863"/>
+            <a:ext cx="10515600" cy="1942861"/>
+          </a:xfrm>
+        </p:spPr>
+      </p:pic>
+      <p:grpSp>
+        <p:nvGrpSpPr>
+          <p:cNvPr id="13" name="Group 12">
+            <a:extLst>
+              <a:ext uri="{FF2B5EF4-FFF2-40B4-BE49-F238E27FC236}">
+                <a16:creationId xmlns:a16="http://schemas.microsoft.com/office/drawing/2014/main" id="{02DFBF6F-01C9-7B0A-43D6-DEB2B65DEE83}"/>
+              </a:ext>
+            </a:extLst>
+          </p:cNvPr>
+          <p:cNvGrpSpPr/>
+          <p:nvPr/>
+        </p:nvGrpSpPr>
+        <p:grpSpPr>
+          <a:xfrm>
+            <a:off x="282168" y="2221344"/>
+            <a:ext cx="1761480" cy="4134240"/>
+            <a:chOff x="282168" y="2221344"/>
+            <a:chExt cx="1761480" cy="4134240"/>
+          </a:xfrm>
+        </p:grpSpPr>
+        <mc:AlternateContent xmlns:mc="http://schemas.openxmlformats.org/markup-compatibility/2006">
+          <mc:Choice xmlns:p14="http://schemas.microsoft.com/office/powerpoint/2010/main" xmlns:aink="http://schemas.microsoft.com/office/drawing/2016/ink" Requires="p14 aink">
+            <p:contentPart p14:bwMode="auto" r:id="rId3">
+              <p14:nvContentPartPr>
+                <p14:cNvPr id="8" name="Ink 7">
+                  <a:extLst>
+                    <a:ext uri="{FF2B5EF4-FFF2-40B4-BE49-F238E27FC236}">
+                      <a16:creationId xmlns:a16="http://schemas.microsoft.com/office/drawing/2014/main" id="{C72B6B45-BC4F-9DDB-850E-7A9596331E11}"/>
+                    </a:ext>
+                  </a:extLst>
+                </p14:cNvPr>
+                <p14:cNvContentPartPr/>
+                <p14:nvPr/>
+              </p14:nvContentPartPr>
+              <p14:xfrm>
+                <a:off x="282168" y="2221344"/>
+                <a:ext cx="1116000" cy="1728720"/>
+              </p14:xfrm>
+            </p:contentPart>
+          </mc:Choice>
+          <mc:Fallback>
+            <p:pic>
+              <p:nvPicPr>
+                <p:cNvPr id="8" name="Ink 7">
+                  <a:extLst>
+                    <a:ext uri="{FF2B5EF4-FFF2-40B4-BE49-F238E27FC236}">
+                      <a16:creationId xmlns:a16="http://schemas.microsoft.com/office/drawing/2014/main" id="{C72B6B45-BC4F-9DDB-850E-7A9596331E11}"/>
+                    </a:ext>
+                  </a:extLst>
+                </p:cNvPr>
+                <p:cNvPicPr/>
+                <p:nvPr/>
+              </p:nvPicPr>
+              <p:blipFill>
+                <a:blip r:embed="rId4"/>
+                <a:stretch>
+                  <a:fillRect/>
+                </a:stretch>
+              </p:blipFill>
+              <p:spPr>
+                <a:xfrm>
+                  <a:off x="246528" y="2005344"/>
+                  <a:ext cx="1187640" cy="2160360"/>
+                </a:xfrm>
+                <a:prstGeom prst="rect">
+                  <a:avLst/>
+                </a:prstGeom>
+              </p:spPr>
+            </p:pic>
+          </mc:Fallback>
+        </mc:AlternateContent>
+        <mc:AlternateContent xmlns:mc="http://schemas.openxmlformats.org/markup-compatibility/2006">
+          <mc:Choice xmlns:p14="http://schemas.microsoft.com/office/powerpoint/2010/main" xmlns:aink="http://schemas.microsoft.com/office/drawing/2016/ink" Requires="p14 aink">
+            <p:contentPart p14:bwMode="auto" r:id="rId5">
+              <p14:nvContentPartPr>
+                <p14:cNvPr id="9" name="Ink 8">
+                  <a:extLst>
+                    <a:ext uri="{FF2B5EF4-FFF2-40B4-BE49-F238E27FC236}">
+                      <a16:creationId xmlns:a16="http://schemas.microsoft.com/office/drawing/2014/main" id="{1767F857-AFC1-2CFC-AEE1-4DCB903BAD61}"/>
+                    </a:ext>
+                  </a:extLst>
+                </p14:cNvPr>
+                <p14:cNvContentPartPr/>
+                <p14:nvPr/>
+              </p14:nvContentPartPr>
+              <p14:xfrm>
+                <a:off x="511848" y="3704184"/>
+                <a:ext cx="282600" cy="299520"/>
+              </p14:xfrm>
+            </p:contentPart>
+          </mc:Choice>
+          <mc:Fallback>
+            <p:pic>
+              <p:nvPicPr>
+                <p:cNvPr id="9" name="Ink 8">
+                  <a:extLst>
+                    <a:ext uri="{FF2B5EF4-FFF2-40B4-BE49-F238E27FC236}">
+                      <a16:creationId xmlns:a16="http://schemas.microsoft.com/office/drawing/2014/main" id="{1767F857-AFC1-2CFC-AEE1-4DCB903BAD61}"/>
+                    </a:ext>
+                  </a:extLst>
+                </p:cNvPr>
+                <p:cNvPicPr/>
+                <p:nvPr/>
+              </p:nvPicPr>
+              <p:blipFill>
+                <a:blip r:embed="rId6"/>
+                <a:stretch>
+                  <a:fillRect/>
+                </a:stretch>
+              </p:blipFill>
+              <p:spPr>
+                <a:xfrm>
+                  <a:off x="475848" y="3488184"/>
+                  <a:ext cx="354240" cy="731160"/>
+                </a:xfrm>
+                <a:prstGeom prst="rect">
+                  <a:avLst/>
+                </a:prstGeom>
+              </p:spPr>
+            </p:pic>
+          </mc:Fallback>
+        </mc:AlternateContent>
+        <mc:AlternateContent xmlns:mc="http://schemas.openxmlformats.org/markup-compatibility/2006">
+          <mc:Choice xmlns:p14="http://schemas.microsoft.com/office/powerpoint/2010/main" xmlns:aink="http://schemas.microsoft.com/office/drawing/2016/ink" Requires="p14 aink">
+            <p:contentPart p14:bwMode="auto" r:id="rId7">
+              <p14:nvContentPartPr>
+                <p14:cNvPr id="11" name="Ink 10">
+                  <a:extLst>
+                    <a:ext uri="{FF2B5EF4-FFF2-40B4-BE49-F238E27FC236}">
+                      <a16:creationId xmlns:a16="http://schemas.microsoft.com/office/drawing/2014/main" id="{EE4B7B74-4B16-8943-3BB2-FA33AE830789}"/>
+                    </a:ext>
+                  </a:extLst>
+                </p14:cNvPr>
+                <p14:cNvContentPartPr/>
+                <p14:nvPr/>
+              </p14:nvContentPartPr>
+              <p14:xfrm>
+                <a:off x="539208" y="4571784"/>
+                <a:ext cx="267120" cy="319320"/>
+              </p14:xfrm>
+            </p:contentPart>
+          </mc:Choice>
+          <mc:Fallback>
+            <p:pic>
+              <p:nvPicPr>
+                <p:cNvPr id="11" name="Ink 10">
+                  <a:extLst>
+                    <a:ext uri="{FF2B5EF4-FFF2-40B4-BE49-F238E27FC236}">
+                      <a16:creationId xmlns:a16="http://schemas.microsoft.com/office/drawing/2014/main" id="{EE4B7B74-4B16-8943-3BB2-FA33AE830789}"/>
+                    </a:ext>
+                  </a:extLst>
+                </p:cNvPr>
+                <p:cNvPicPr/>
+                <p:nvPr/>
+              </p:nvPicPr>
+              <p:blipFill>
+                <a:blip r:embed="rId8"/>
+                <a:stretch>
+                  <a:fillRect/>
+                </a:stretch>
+              </p:blipFill>
+              <p:spPr>
+                <a:xfrm>
+                  <a:off x="503568" y="4356144"/>
+                  <a:ext cx="338760" cy="750960"/>
+                </a:xfrm>
+                <a:prstGeom prst="rect">
+                  <a:avLst/>
+                </a:prstGeom>
+              </p:spPr>
+            </p:pic>
+          </mc:Fallback>
+        </mc:AlternateContent>
+        <mc:AlternateContent xmlns:mc="http://schemas.openxmlformats.org/markup-compatibility/2006">
+          <mc:Choice xmlns:p14="http://schemas.microsoft.com/office/powerpoint/2010/main" xmlns:aink="http://schemas.microsoft.com/office/drawing/2016/ink" Requires="p14 aink">
+            <p:contentPart p14:bwMode="auto" r:id="rId9">
+              <p14:nvContentPartPr>
+                <p14:cNvPr id="12" name="Ink 11">
+                  <a:extLst>
+                    <a:ext uri="{FF2B5EF4-FFF2-40B4-BE49-F238E27FC236}">
+                      <a16:creationId xmlns:a16="http://schemas.microsoft.com/office/drawing/2014/main" id="{3E2DDB89-BE1F-C2EB-DEEE-5121865DEDFF}"/>
+                    </a:ext>
+                  </a:extLst>
+                </p14:cNvPr>
+                <p14:cNvContentPartPr/>
+                <p14:nvPr/>
+              </p14:nvContentPartPr>
+              <p14:xfrm>
+                <a:off x="392328" y="4635504"/>
+                <a:ext cx="1651320" cy="1720080"/>
+              </p14:xfrm>
+            </p:contentPart>
+          </mc:Choice>
+          <mc:Fallback>
+            <p:pic>
+              <p:nvPicPr>
+                <p:cNvPr id="12" name="Ink 11">
+                  <a:extLst>
+                    <a:ext uri="{FF2B5EF4-FFF2-40B4-BE49-F238E27FC236}">
+                      <a16:creationId xmlns:a16="http://schemas.microsoft.com/office/drawing/2014/main" id="{3E2DDB89-BE1F-C2EB-DEEE-5121865DEDFF}"/>
+                    </a:ext>
+                  </a:extLst>
+                </p:cNvPr>
+                <p:cNvPicPr/>
+                <p:nvPr/>
+              </p:nvPicPr>
+              <p:blipFill>
+                <a:blip r:embed="rId10"/>
+                <a:stretch>
+                  <a:fillRect/>
+                </a:stretch>
+              </p:blipFill>
+              <p:spPr>
+                <a:xfrm>
+                  <a:off x="356328" y="4419864"/>
+                  <a:ext cx="1722960" cy="2151720"/>
+                </a:xfrm>
+                <a:prstGeom prst="rect">
+                  <a:avLst/>
+                </a:prstGeom>
+              </p:spPr>
+            </p:pic>
+          </mc:Fallback>
+        </mc:AlternateContent>
+      </p:grpSp>
+      <p:sp>
+        <p:nvSpPr>
+          <p:cNvPr id="14" name="TextBox 13">
+            <a:extLst>
+              <a:ext uri="{FF2B5EF4-FFF2-40B4-BE49-F238E27FC236}">
+                <a16:creationId xmlns:a16="http://schemas.microsoft.com/office/drawing/2014/main" id="{5A691705-DC7D-1D16-A292-7A37E3A597AC}"/>
+              </a:ext>
+            </a:extLst>
+          </p:cNvPr>
+          <p:cNvSpPr txBox="1"/>
+          <p:nvPr/>
+        </p:nvSpPr>
+        <p:spPr>
+          <a:xfrm>
+            <a:off x="1517904" y="1975104"/>
+            <a:ext cx="5961888" cy="369332"/>
+          </a:xfrm>
+          <a:prstGeom prst="rect">
+            <a:avLst/>
+          </a:prstGeom>
+          <a:noFill/>
+        </p:spPr>
+        <p:txBody>
+          <a:bodyPr wrap="square" rtlCol="0">
+            <a:spAutoFit/>
+          </a:bodyPr>
+          <a:lstStyle/>
+          <a:p>
+            <a:r>
+              <a:rPr lang="it-IT" dirty="0" err="1"/>
+              <a:t>While</a:t>
+            </a:r>
+            <a:r>
+              <a:rPr lang="it-IT" dirty="0"/>
+              <a:t> the code </a:t>
+            </a:r>
+            <a:r>
+              <a:rPr lang="it-IT" dirty="0" err="1"/>
+              <a:t>is</a:t>
+            </a:r>
+            <a:r>
+              <a:rPr lang="it-IT" dirty="0"/>
+              <a:t> </a:t>
+            </a:r>
+            <a:r>
+              <a:rPr lang="it-IT" dirty="0" err="1"/>
+              <a:t>executed</a:t>
+            </a:r>
+            <a:r>
+              <a:rPr lang="it-IT" dirty="0"/>
+              <a:t>, </a:t>
+            </a:r>
+            <a:r>
+              <a:rPr lang="it-IT" dirty="0" err="1"/>
+              <a:t>you</a:t>
+            </a:r>
+            <a:r>
+              <a:rPr lang="it-IT" dirty="0"/>
+              <a:t> </a:t>
+            </a:r>
+            <a:r>
+              <a:rPr lang="it-IT" dirty="0" err="1"/>
+              <a:t>have</a:t>
+            </a:r>
+            <a:r>
+              <a:rPr lang="it-IT" dirty="0"/>
+              <a:t> the state</a:t>
+            </a:r>
+          </a:p>
+        </p:txBody>
+      </p:sp>
+      <p:sp>
+        <p:nvSpPr>
+          <p:cNvPr id="15" name="TextBox 14">
+            <a:extLst>
+              <a:ext uri="{FF2B5EF4-FFF2-40B4-BE49-F238E27FC236}">
+                <a16:creationId xmlns:a16="http://schemas.microsoft.com/office/drawing/2014/main" id="{7267728D-66F3-5CF3-7A98-477DBF314182}"/>
+              </a:ext>
+            </a:extLst>
+          </p:cNvPr>
+          <p:cNvSpPr txBox="1"/>
+          <p:nvPr/>
+        </p:nvSpPr>
+        <p:spPr>
+          <a:xfrm>
+            <a:off x="1901952" y="5843016"/>
+            <a:ext cx="7397496" cy="646331"/>
+          </a:xfrm>
+          <a:prstGeom prst="rect">
+            <a:avLst/>
+          </a:prstGeom>
+          <a:noFill/>
+        </p:spPr>
+        <p:txBody>
+          <a:bodyPr wrap="square" rtlCol="0">
+            <a:spAutoFit/>
+          </a:bodyPr>
+          <a:lstStyle/>
+          <a:p>
+            <a:r>
+              <a:rPr lang="it-IT" dirty="0" err="1"/>
+              <a:t>Notice</a:t>
+            </a:r>
+            <a:r>
+              <a:rPr lang="it-IT" dirty="0"/>
+              <a:t> the «</a:t>
+            </a:r>
+            <a:r>
+              <a:rPr lang="it-IT" dirty="0" err="1"/>
+              <a:t>sender</a:t>
+            </a:r>
+            <a:r>
+              <a:rPr lang="it-IT" dirty="0"/>
+              <a:t>»: the database </a:t>
+            </a:r>
+            <a:r>
+              <a:rPr lang="it-IT" dirty="0" err="1"/>
+              <a:t>is</a:t>
+            </a:r>
+            <a:r>
+              <a:rPr lang="it-IT" dirty="0"/>
+              <a:t> «long», with </a:t>
+            </a:r>
+            <a:r>
+              <a:rPr lang="it-IT" dirty="0" err="1"/>
+              <a:t>each</a:t>
+            </a:r>
+            <a:r>
+              <a:rPr lang="it-IT" dirty="0"/>
+              <a:t> page playing the </a:t>
+            </a:r>
+            <a:r>
+              <a:rPr lang="it-IT" dirty="0" err="1"/>
+              <a:t>role</a:t>
+            </a:r>
+            <a:r>
+              <a:rPr lang="it-IT" dirty="0"/>
+              <a:t> of a «t» [</a:t>
+            </a:r>
+            <a:r>
+              <a:rPr lang="it-IT" dirty="0" err="1"/>
+              <a:t>as</a:t>
+            </a:r>
+            <a:r>
+              <a:rPr lang="it-IT" dirty="0"/>
+              <a:t> a «panel»]</a:t>
+            </a:r>
           </a:p>
         </p:txBody>
       </p:sp>
     </p:spTree>
     <p:extLst>
       <p:ext uri="{BB962C8B-B14F-4D97-AF65-F5344CB8AC3E}">
-        <p14:creationId xmlns:p14="http://schemas.microsoft.com/office/powerpoint/2010/main" val="2985669483"/>
+        <p14:creationId xmlns:p14="http://schemas.microsoft.com/office/powerpoint/2010/main" val="1659778127"/>
+      </p:ext>
+    </p:extLst>
+  </p:cSld>
+  <p:clrMapOvr>
+    <a:masterClrMapping/>
+  </p:clrMapOvr>
+</p:sld>
+</file>
+
+<file path=ppt/slides/slide46.xml><?xml version="1.0" encoding="utf-8"?>
+<p:sld xmlns:a="http://schemas.openxmlformats.org/drawingml/2006/main" xmlns:r="http://schemas.openxmlformats.org/officeDocument/2006/relationships" xmlns:p="http://schemas.openxmlformats.org/presentationml/2006/main">
+  <p:cSld>
+    <p:spTree>
+      <p:nvGrpSpPr>
+        <p:cNvPr id="1" name=""/>
+        <p:cNvGrpSpPr/>
+        <p:nvPr/>
+      </p:nvGrpSpPr>
+      <p:grpSpPr>
+        <a:xfrm>
+          <a:off x="0" y="0"/>
+          <a:ext cx="0" cy="0"/>
+          <a:chOff x="0" y="0"/>
+          <a:chExt cx="0" cy="0"/>
+        </a:xfrm>
+      </p:grpSpPr>
+      <p:sp>
+        <p:nvSpPr>
+          <p:cNvPr id="4" name="Title 3">
+            <a:extLst>
+              <a:ext uri="{FF2B5EF4-FFF2-40B4-BE49-F238E27FC236}">
+                <a16:creationId xmlns:a16="http://schemas.microsoft.com/office/drawing/2014/main" id="{DADBB959-561E-634F-22B0-1063EB1F812C}"/>
+              </a:ext>
+            </a:extLst>
+          </p:cNvPr>
+          <p:cNvSpPr>
+            <a:spLocks noGrp="1"/>
+          </p:cNvSpPr>
+          <p:nvPr>
+            <p:ph type="title"/>
+          </p:nvPr>
+        </p:nvSpPr>
+        <p:spPr/>
+        <p:txBody>
+          <a:bodyPr/>
+          <a:lstStyle/>
+          <a:p>
+            <a:r>
+              <a:rPr lang="it-IT" dirty="0" err="1"/>
+              <a:t>Lecture</a:t>
+            </a:r>
+            <a:r>
+              <a:rPr lang="it-IT" dirty="0"/>
+              <a:t> 5</a:t>
+            </a:r>
+          </a:p>
+        </p:txBody>
+      </p:sp>
+      <p:sp>
+        <p:nvSpPr>
+          <p:cNvPr id="5" name="Text Placeholder 4">
+            <a:extLst>
+              <a:ext uri="{FF2B5EF4-FFF2-40B4-BE49-F238E27FC236}">
+                <a16:creationId xmlns:a16="http://schemas.microsoft.com/office/drawing/2014/main" id="{03209A45-80D9-2BCE-9820-C23766986A9F}"/>
+              </a:ext>
+            </a:extLst>
+          </p:cNvPr>
+          <p:cNvSpPr>
+            <a:spLocks noGrp="1"/>
+          </p:cNvSpPr>
+          <p:nvPr>
+            <p:ph type="body" idx="1"/>
+          </p:nvPr>
+        </p:nvSpPr>
+        <p:spPr/>
+        <p:txBody>
+          <a:bodyPr/>
+          <a:lstStyle/>
+          <a:p>
+            <a:endParaRPr lang="it-IT"/>
+          </a:p>
+        </p:txBody>
+      </p:sp>
+    </p:spTree>
+    <p:extLst>
+      <p:ext uri="{BB962C8B-B14F-4D97-AF65-F5344CB8AC3E}">
+        <p14:creationId xmlns:p14="http://schemas.microsoft.com/office/powerpoint/2010/main" val="2546350658"/>
+      </p:ext>
+    </p:extLst>
+  </p:cSld>
+  <p:clrMapOvr>
+    <a:masterClrMapping/>
+  </p:clrMapOvr>
+</p:sld>
+</file>
+
+<file path=ppt/slides/slide47.xml><?xml version="1.0" encoding="utf-8"?>
+<p:sld xmlns:a="http://schemas.openxmlformats.org/drawingml/2006/main" xmlns:r="http://schemas.openxmlformats.org/officeDocument/2006/relationships" xmlns:p="http://schemas.openxmlformats.org/presentationml/2006/main">
+  <p:cSld>
+    <p:spTree>
+      <p:nvGrpSpPr>
+        <p:cNvPr id="1" name=""/>
+        <p:cNvGrpSpPr/>
+        <p:nvPr/>
+      </p:nvGrpSpPr>
+      <p:grpSpPr>
+        <a:xfrm>
+          <a:off x="0" y="0"/>
+          <a:ext cx="0" cy="0"/>
+          <a:chOff x="0" y="0"/>
+          <a:chExt cx="0" cy="0"/>
+        </a:xfrm>
+      </p:grpSpPr>
+      <p:sp>
+        <p:nvSpPr>
+          <p:cNvPr id="2" name="Title 1">
+            <a:extLst>
+              <a:ext uri="{FF2B5EF4-FFF2-40B4-BE49-F238E27FC236}">
+                <a16:creationId xmlns:a16="http://schemas.microsoft.com/office/drawing/2014/main" id="{073650DD-94A3-F284-7353-008F5C05BB54}"/>
+              </a:ext>
+            </a:extLst>
+          </p:cNvPr>
+          <p:cNvSpPr>
+            <a:spLocks noGrp="1"/>
+          </p:cNvSpPr>
+          <p:nvPr>
+            <p:ph type="title"/>
+          </p:nvPr>
+        </p:nvSpPr>
+        <p:spPr/>
+        <p:txBody>
+          <a:bodyPr/>
+          <a:lstStyle/>
+          <a:p>
+            <a:r>
+              <a:rPr lang="it-IT" dirty="0" err="1"/>
+              <a:t>Completing</a:t>
+            </a:r>
+            <a:r>
+              <a:rPr lang="it-IT" dirty="0"/>
+              <a:t> the task for MPL</a:t>
+            </a:r>
+          </a:p>
+        </p:txBody>
+      </p:sp>
+      <p:sp>
+        <p:nvSpPr>
+          <p:cNvPr id="3" name="Content Placeholder 2">
+            <a:extLst>
+              <a:ext uri="{FF2B5EF4-FFF2-40B4-BE49-F238E27FC236}">
+                <a16:creationId xmlns:a16="http://schemas.microsoft.com/office/drawing/2014/main" id="{781F60AB-0387-B8C1-9B9C-4C3505BC33E4}"/>
+              </a:ext>
+            </a:extLst>
+          </p:cNvPr>
+          <p:cNvSpPr>
+            <a:spLocks noGrp="1"/>
+          </p:cNvSpPr>
+          <p:nvPr>
+            <p:ph sz="half" idx="1"/>
+          </p:nvPr>
+        </p:nvSpPr>
+        <p:spPr/>
+        <p:txBody>
+          <a:bodyPr/>
+          <a:lstStyle/>
+          <a:p>
+            <a:r>
+              <a:rPr lang="it-IT" dirty="0" err="1"/>
+              <a:t>We</a:t>
+            </a:r>
+            <a:r>
+              <a:rPr lang="it-IT" dirty="0"/>
+              <a:t> can build a </a:t>
+            </a:r>
+            <a:r>
+              <a:rPr lang="it-IT" dirty="0" err="1"/>
+              <a:t>Table</a:t>
+            </a:r>
+            <a:r>
+              <a:rPr lang="it-IT" dirty="0"/>
+              <a:t> </a:t>
+            </a:r>
+            <a:r>
+              <a:rPr lang="it-IT" dirty="0" err="1"/>
+              <a:t>within</a:t>
+            </a:r>
+            <a:r>
+              <a:rPr lang="it-IT" dirty="0"/>
+              <a:t> a div </a:t>
+            </a:r>
+            <a:r>
+              <a:rPr lang="it-IT" dirty="0" err="1"/>
+              <a:t>environment</a:t>
+            </a:r>
+            <a:endParaRPr lang="it-IT" dirty="0"/>
+          </a:p>
+          <a:p>
+            <a:r>
+              <a:rPr lang="it-IT" dirty="0" err="1"/>
+              <a:t>We</a:t>
+            </a:r>
+            <a:r>
+              <a:rPr lang="it-IT" dirty="0"/>
+              <a:t> </a:t>
+            </a:r>
+            <a:r>
+              <a:rPr lang="it-IT" dirty="0" err="1"/>
+              <a:t>need</a:t>
+            </a:r>
+            <a:r>
+              <a:rPr lang="it-IT" dirty="0"/>
+              <a:t> to introduce CSS </a:t>
+            </a:r>
+            <a:r>
+              <a:rPr lang="it-IT" dirty="0" err="1"/>
+              <a:t>elements</a:t>
+            </a:r>
+            <a:endParaRPr lang="it-IT" dirty="0"/>
+          </a:p>
+          <a:p>
+            <a:r>
+              <a:rPr lang="it-IT" dirty="0" err="1"/>
+              <a:t>We</a:t>
+            </a:r>
+            <a:r>
+              <a:rPr lang="it-IT" dirty="0"/>
+              <a:t> use </a:t>
+            </a:r>
+            <a:r>
+              <a:rPr lang="it-IT" dirty="0" err="1"/>
+              <a:t>radiobuttons</a:t>
+            </a:r>
+            <a:r>
+              <a:rPr lang="it-IT" dirty="0"/>
+              <a:t> for </a:t>
+            </a:r>
+            <a:r>
+              <a:rPr lang="it-IT" dirty="0" err="1"/>
+              <a:t>each</a:t>
+            </a:r>
+            <a:r>
+              <a:rPr lang="it-IT" dirty="0"/>
+              <a:t> </a:t>
+            </a:r>
+            <a:r>
+              <a:rPr lang="it-IT" dirty="0" err="1"/>
+              <a:t>row</a:t>
+            </a:r>
+            <a:r>
+              <a:rPr lang="it-IT" dirty="0"/>
+              <a:t> of the MPL</a:t>
+            </a:r>
+          </a:p>
+        </p:txBody>
+      </p:sp>
+      <p:pic>
+        <p:nvPicPr>
+          <p:cNvPr id="6" name="Content Placeholder 5">
+            <a:extLst>
+              <a:ext uri="{FF2B5EF4-FFF2-40B4-BE49-F238E27FC236}">
+                <a16:creationId xmlns:a16="http://schemas.microsoft.com/office/drawing/2014/main" id="{6EB00B00-C0F2-823E-3951-B920ED22D750}"/>
+              </a:ext>
+            </a:extLst>
+          </p:cNvPr>
+          <p:cNvPicPr>
+            <a:picLocks noGrp="1" noChangeAspect="1"/>
+          </p:cNvPicPr>
+          <p:nvPr>
+            <p:ph sz="half" idx="2"/>
+          </p:nvPr>
+        </p:nvPicPr>
+        <p:blipFill>
+          <a:blip r:embed="rId2"/>
+          <a:stretch>
+            <a:fillRect/>
+          </a:stretch>
+        </p:blipFill>
+        <p:spPr>
+          <a:xfrm>
+            <a:off x="6172200" y="3519443"/>
+            <a:ext cx="5181600" cy="963701"/>
+          </a:xfrm>
+        </p:spPr>
+      </p:pic>
+    </p:spTree>
+    <p:extLst>
+      <p:ext uri="{BB962C8B-B14F-4D97-AF65-F5344CB8AC3E}">
+        <p14:creationId xmlns:p14="http://schemas.microsoft.com/office/powerpoint/2010/main" val="3252385256"/>
+      </p:ext>
+    </p:extLst>
+  </p:cSld>
+  <p:clrMapOvr>
+    <a:masterClrMapping/>
+  </p:clrMapOvr>
+</p:sld>
+</file>
+
+<file path=ppt/slides/slide48.xml><?xml version="1.0" encoding="utf-8"?>
+<p:sld xmlns:a="http://schemas.openxmlformats.org/drawingml/2006/main" xmlns:r="http://schemas.openxmlformats.org/officeDocument/2006/relationships" xmlns:p="http://schemas.openxmlformats.org/presentationml/2006/main">
+  <p:cSld>
+    <p:spTree>
+      <p:nvGrpSpPr>
+        <p:cNvPr id="1" name=""/>
+        <p:cNvGrpSpPr/>
+        <p:nvPr/>
+      </p:nvGrpSpPr>
+      <p:grpSpPr>
+        <a:xfrm>
+          <a:off x="0" y="0"/>
+          <a:ext cx="0" cy="0"/>
+          <a:chOff x="0" y="0"/>
+          <a:chExt cx="0" cy="0"/>
+        </a:xfrm>
+      </p:grpSpPr>
+      <p:sp>
+        <p:nvSpPr>
+          <p:cNvPr id="2" name="Title 1">
+            <a:extLst>
+              <a:ext uri="{FF2B5EF4-FFF2-40B4-BE49-F238E27FC236}">
+                <a16:creationId xmlns:a16="http://schemas.microsoft.com/office/drawing/2014/main" id="{5F618761-C828-C982-EED0-E701CF216A84}"/>
+              </a:ext>
+            </a:extLst>
+          </p:cNvPr>
+          <p:cNvSpPr>
+            <a:spLocks noGrp="1"/>
+          </p:cNvSpPr>
+          <p:nvPr>
+            <p:ph type="title"/>
+          </p:nvPr>
+        </p:nvSpPr>
+        <p:spPr/>
+        <p:txBody>
+          <a:bodyPr/>
+          <a:lstStyle/>
+          <a:p>
+            <a:r>
+              <a:rPr lang="it-IT" dirty="0" err="1"/>
+              <a:t>Introducing</a:t>
+            </a:r>
+            <a:r>
+              <a:rPr lang="it-IT" dirty="0"/>
+              <a:t> a </a:t>
+            </a:r>
+            <a:r>
+              <a:rPr lang="it-IT" dirty="0" err="1"/>
+              <a:t>sequence</a:t>
+            </a:r>
+            <a:endParaRPr lang="it-IT" dirty="0"/>
+          </a:p>
+        </p:txBody>
+      </p:sp>
+      <p:sp>
+        <p:nvSpPr>
+          <p:cNvPr id="3" name="Content Placeholder 2">
+            <a:extLst>
+              <a:ext uri="{FF2B5EF4-FFF2-40B4-BE49-F238E27FC236}">
+                <a16:creationId xmlns:a16="http://schemas.microsoft.com/office/drawing/2014/main" id="{3504F66E-CABA-128F-E126-358FEDFD188A}"/>
+              </a:ext>
+            </a:extLst>
+          </p:cNvPr>
+          <p:cNvSpPr>
+            <a:spLocks noGrp="1"/>
+          </p:cNvSpPr>
+          <p:nvPr>
+            <p:ph sz="half" idx="1"/>
+          </p:nvPr>
+        </p:nvSpPr>
+        <p:spPr/>
+        <p:txBody>
+          <a:bodyPr/>
+          <a:lstStyle/>
+          <a:p>
+            <a:r>
+              <a:rPr lang="it-IT" dirty="0" err="1"/>
+              <a:t>We</a:t>
+            </a:r>
+            <a:r>
+              <a:rPr lang="it-IT" dirty="0"/>
+              <a:t> can group </a:t>
+            </a:r>
+            <a:r>
+              <a:rPr lang="it-IT" dirty="0" err="1"/>
+              <a:t>together</a:t>
+            </a:r>
+            <a:r>
+              <a:rPr lang="it-IT" dirty="0"/>
+              <a:t> the MPL task</a:t>
+            </a:r>
+          </a:p>
+        </p:txBody>
+      </p:sp>
+      <p:pic>
+        <p:nvPicPr>
+          <p:cNvPr id="6" name="Content Placeholder 5">
+            <a:extLst>
+              <a:ext uri="{FF2B5EF4-FFF2-40B4-BE49-F238E27FC236}">
+                <a16:creationId xmlns:a16="http://schemas.microsoft.com/office/drawing/2014/main" id="{F6374F84-E0D7-3AF4-DC1A-C19324E11B97}"/>
+              </a:ext>
+            </a:extLst>
+          </p:cNvPr>
+          <p:cNvPicPr>
+            <a:picLocks noGrp="1" noChangeAspect="1"/>
+          </p:cNvPicPr>
+          <p:nvPr>
+            <p:ph sz="half" idx="2"/>
+          </p:nvPr>
+        </p:nvPicPr>
+        <p:blipFill>
+          <a:blip r:embed="rId2"/>
+          <a:stretch>
+            <a:fillRect/>
+          </a:stretch>
+        </p:blipFill>
+        <p:spPr>
+          <a:xfrm>
+            <a:off x="6211251" y="1825625"/>
+            <a:ext cx="5103497" cy="4351338"/>
+          </a:xfrm>
+        </p:spPr>
+      </p:pic>
+    </p:spTree>
+    <p:extLst>
+      <p:ext uri="{BB962C8B-B14F-4D97-AF65-F5344CB8AC3E}">
+        <p14:creationId xmlns:p14="http://schemas.microsoft.com/office/powerpoint/2010/main" val="863644615"/>
+      </p:ext>
+    </p:extLst>
+  </p:cSld>
+  <p:clrMapOvr>
+    <a:masterClrMapping/>
+  </p:clrMapOvr>
+</p:sld>
+</file>
+
+<file path=ppt/slides/slide49.xml><?xml version="1.0" encoding="utf-8"?>
+<p:sld xmlns:a="http://schemas.openxmlformats.org/drawingml/2006/main" xmlns:r="http://schemas.openxmlformats.org/officeDocument/2006/relationships" xmlns:p="http://schemas.openxmlformats.org/presentationml/2006/main">
+  <p:cSld>
+    <p:spTree>
+      <p:nvGrpSpPr>
+        <p:cNvPr id="1" name=""/>
+        <p:cNvGrpSpPr/>
+        <p:nvPr/>
+      </p:nvGrpSpPr>
+      <p:grpSpPr>
+        <a:xfrm>
+          <a:off x="0" y="0"/>
+          <a:ext cx="0" cy="0"/>
+          <a:chOff x="0" y="0"/>
+          <a:chExt cx="0" cy="0"/>
+        </a:xfrm>
+      </p:grpSpPr>
+      <p:sp>
+        <p:nvSpPr>
+          <p:cNvPr id="2" name="Title 1">
+            <a:extLst>
+              <a:ext uri="{FF2B5EF4-FFF2-40B4-BE49-F238E27FC236}">
+                <a16:creationId xmlns:a16="http://schemas.microsoft.com/office/drawing/2014/main" id="{3BB0066E-8855-4F43-46BF-471503568DBF}"/>
+              </a:ext>
+            </a:extLst>
+          </p:cNvPr>
+          <p:cNvSpPr>
+            <a:spLocks noGrp="1"/>
+          </p:cNvSpPr>
+          <p:nvPr>
+            <p:ph type="title"/>
+          </p:nvPr>
+        </p:nvSpPr>
+        <p:spPr/>
+        <p:txBody>
+          <a:bodyPr/>
+          <a:lstStyle/>
+          <a:p>
+            <a:r>
+              <a:rPr lang="it-IT" dirty="0"/>
+              <a:t>Using the </a:t>
+            </a:r>
+            <a:r>
+              <a:rPr lang="it-IT" dirty="0" err="1"/>
+              <a:t>sequence</a:t>
+            </a:r>
+            <a:r>
+              <a:rPr lang="it-IT" dirty="0"/>
+              <a:t> </a:t>
+            </a:r>
+            <a:r>
+              <a:rPr lang="it-IT" dirty="0" err="1"/>
+              <a:t>object</a:t>
+            </a:r>
+            <a:endParaRPr lang="it-IT" dirty="0"/>
+          </a:p>
+        </p:txBody>
+      </p:sp>
+      <p:sp>
+        <p:nvSpPr>
+          <p:cNvPr id="3" name="Content Placeholder 2">
+            <a:extLst>
+              <a:ext uri="{FF2B5EF4-FFF2-40B4-BE49-F238E27FC236}">
+                <a16:creationId xmlns:a16="http://schemas.microsoft.com/office/drawing/2014/main" id="{9C362916-FC6E-2F2D-8A83-29A08058274F}"/>
+              </a:ext>
+            </a:extLst>
+          </p:cNvPr>
+          <p:cNvSpPr>
+            <a:spLocks noGrp="1"/>
+          </p:cNvSpPr>
+          <p:nvPr>
+            <p:ph sz="half" idx="1"/>
+          </p:nvPr>
+        </p:nvSpPr>
+        <p:spPr/>
+        <p:txBody>
+          <a:bodyPr/>
+          <a:lstStyle/>
+          <a:p>
+            <a:r>
+              <a:rPr lang="it-IT" dirty="0"/>
+              <a:t>The </a:t>
+            </a:r>
+            <a:r>
+              <a:rPr lang="it-IT" dirty="0" err="1"/>
+              <a:t>sequence</a:t>
+            </a:r>
+            <a:r>
+              <a:rPr lang="it-IT" dirty="0"/>
+              <a:t> </a:t>
+            </a:r>
+            <a:r>
+              <a:rPr lang="it-IT" dirty="0" err="1"/>
+              <a:t>creates</a:t>
+            </a:r>
+            <a:r>
+              <a:rPr lang="it-IT" dirty="0"/>
+              <a:t> a group of pages</a:t>
+            </a:r>
+          </a:p>
+          <a:p>
+            <a:r>
+              <a:rPr lang="it-IT" dirty="0"/>
+              <a:t>The </a:t>
+            </a:r>
+            <a:r>
+              <a:rPr lang="it-IT" dirty="0" err="1"/>
+              <a:t>equivalent</a:t>
+            </a:r>
+            <a:r>
+              <a:rPr lang="it-IT" dirty="0"/>
+              <a:t> in </a:t>
+            </a:r>
+            <a:r>
+              <a:rPr lang="it-IT" dirty="0" err="1"/>
+              <a:t>Qualtrics</a:t>
+            </a:r>
+            <a:r>
+              <a:rPr lang="it-IT" dirty="0"/>
+              <a:t> </a:t>
+            </a:r>
+            <a:r>
+              <a:rPr lang="it-IT" dirty="0" err="1"/>
+              <a:t>is</a:t>
+            </a:r>
+            <a:r>
+              <a:rPr lang="it-IT" dirty="0"/>
+              <a:t> the «group» </a:t>
+            </a:r>
+            <a:r>
+              <a:rPr lang="it-IT" dirty="0" err="1"/>
+              <a:t>object</a:t>
+            </a:r>
+            <a:r>
+              <a:rPr lang="it-IT" dirty="0"/>
+              <a:t> in </a:t>
+            </a:r>
+            <a:r>
+              <a:rPr lang="it-IT" dirty="0" err="1"/>
+              <a:t>SurveyFlow</a:t>
+            </a:r>
+            <a:endParaRPr lang="it-IT" dirty="0"/>
+          </a:p>
+        </p:txBody>
+      </p:sp>
+      <p:pic>
+        <p:nvPicPr>
+          <p:cNvPr id="6" name="Content Placeholder 5">
+            <a:extLst>
+              <a:ext uri="{FF2B5EF4-FFF2-40B4-BE49-F238E27FC236}">
+                <a16:creationId xmlns:a16="http://schemas.microsoft.com/office/drawing/2014/main" id="{6FFB302F-56B2-D0E2-E777-73120AF67604}"/>
+              </a:ext>
+            </a:extLst>
+          </p:cNvPr>
+          <p:cNvPicPr>
+            <a:picLocks noGrp="1" noChangeAspect="1"/>
+          </p:cNvPicPr>
+          <p:nvPr>
+            <p:ph sz="half" idx="2"/>
+          </p:nvPr>
+        </p:nvPicPr>
+        <p:blipFill>
+          <a:blip r:embed="rId2"/>
+          <a:stretch>
+            <a:fillRect/>
+          </a:stretch>
+        </p:blipFill>
+        <p:spPr>
+          <a:xfrm>
+            <a:off x="6762471" y="1996001"/>
+            <a:ext cx="4001058" cy="4010585"/>
+          </a:xfrm>
+        </p:spPr>
+      </p:pic>
+      <p:pic>
+        <p:nvPicPr>
+          <p:cNvPr id="7" name="Content Placeholder 5">
+            <a:extLst>
+              <a:ext uri="{FF2B5EF4-FFF2-40B4-BE49-F238E27FC236}">
+                <a16:creationId xmlns:a16="http://schemas.microsoft.com/office/drawing/2014/main" id="{E2DC23CB-B9BF-C20E-11A5-67333BEA3D59}"/>
+              </a:ext>
+            </a:extLst>
+          </p:cNvPr>
+          <p:cNvPicPr>
+            <a:picLocks noChangeAspect="1"/>
+          </p:cNvPicPr>
+          <p:nvPr/>
+        </p:nvPicPr>
+        <p:blipFill>
+          <a:blip r:embed="rId3"/>
+          <a:stretch>
+            <a:fillRect/>
+          </a:stretch>
+        </p:blipFill>
+        <p:spPr>
+          <a:xfrm>
+            <a:off x="582168" y="4281436"/>
+            <a:ext cx="5181600" cy="1798868"/>
+          </a:xfrm>
+          <a:prstGeom prst="rect">
+            <a:avLst/>
+          </a:prstGeom>
+        </p:spPr>
+      </p:pic>
+    </p:spTree>
+    <p:extLst>
+      <p:ext uri="{BB962C8B-B14F-4D97-AF65-F5344CB8AC3E}">
+        <p14:creationId xmlns:p14="http://schemas.microsoft.com/office/powerpoint/2010/main" val="342250256"/>
       </p:ext>
     </p:extLst>
   </p:cSld>
@@ -18462,6 +19783,111 @@
     <p:extLst>
       <p:ext uri="{BB962C8B-B14F-4D97-AF65-F5344CB8AC3E}">
         <p14:creationId xmlns:p14="http://schemas.microsoft.com/office/powerpoint/2010/main" val="3844591061"/>
+      </p:ext>
+    </p:extLst>
+  </p:cSld>
+  <p:clrMapOvr>
+    <a:masterClrMapping/>
+  </p:clrMapOvr>
+</p:sld>
+</file>
+
+<file path=ppt/slides/slide50.xml><?xml version="1.0" encoding="utf-8"?>
+<p:sld xmlns:a="http://schemas.openxmlformats.org/drawingml/2006/main" xmlns:r="http://schemas.openxmlformats.org/officeDocument/2006/relationships" xmlns:p="http://schemas.openxmlformats.org/presentationml/2006/main">
+  <p:cSld>
+    <p:spTree>
+      <p:nvGrpSpPr>
+        <p:cNvPr id="1" name=""/>
+        <p:cNvGrpSpPr/>
+        <p:nvPr/>
+      </p:nvGrpSpPr>
+      <p:grpSpPr>
+        <a:xfrm>
+          <a:off x="0" y="0"/>
+          <a:ext cx="0" cy="0"/>
+          <a:chOff x="0" y="0"/>
+          <a:chExt cx="0" cy="0"/>
+        </a:xfrm>
+      </p:grpSpPr>
+      <p:sp>
+        <p:nvSpPr>
+          <p:cNvPr id="2" name="Title 1">
+            <a:extLst>
+              <a:ext uri="{FF2B5EF4-FFF2-40B4-BE49-F238E27FC236}">
+                <a16:creationId xmlns:a16="http://schemas.microsoft.com/office/drawing/2014/main" id="{4B0C1129-E756-8454-35B3-5BD61C15A7BD}"/>
+              </a:ext>
+            </a:extLst>
+          </p:cNvPr>
+          <p:cNvSpPr>
+            <a:spLocks noGrp="1"/>
+          </p:cNvSpPr>
+          <p:nvPr>
+            <p:ph type="title"/>
+          </p:nvPr>
+        </p:nvSpPr>
+        <p:spPr/>
+        <p:txBody>
+          <a:bodyPr/>
+          <a:lstStyle/>
+          <a:p>
+            <a:endParaRPr lang="it-IT"/>
+          </a:p>
+        </p:txBody>
+      </p:sp>
+      <p:sp>
+        <p:nvSpPr>
+          <p:cNvPr id="4" name="Content Placeholder 3">
+            <a:extLst>
+              <a:ext uri="{FF2B5EF4-FFF2-40B4-BE49-F238E27FC236}">
+                <a16:creationId xmlns:a16="http://schemas.microsoft.com/office/drawing/2014/main" id="{8E7A46A6-0A6B-3DF3-4AFD-9F7236310D27}"/>
+              </a:ext>
+            </a:extLst>
+          </p:cNvPr>
+          <p:cNvSpPr>
+            <a:spLocks noGrp="1"/>
+          </p:cNvSpPr>
+          <p:nvPr>
+            <p:ph sz="half" idx="2"/>
+          </p:nvPr>
+        </p:nvSpPr>
+        <p:spPr/>
+        <p:txBody>
+          <a:bodyPr/>
+          <a:lstStyle/>
+          <a:p>
+            <a:endParaRPr lang="it-IT"/>
+          </a:p>
+        </p:txBody>
+      </p:sp>
+      <p:sp>
+        <p:nvSpPr>
+          <p:cNvPr id="5" name="Content Placeholder 4">
+            <a:extLst>
+              <a:ext uri="{FF2B5EF4-FFF2-40B4-BE49-F238E27FC236}">
+                <a16:creationId xmlns:a16="http://schemas.microsoft.com/office/drawing/2014/main" id="{14B1D982-A21F-E64C-C4D5-5ED0E88FD2AA}"/>
+              </a:ext>
+            </a:extLst>
+          </p:cNvPr>
+          <p:cNvSpPr>
+            <a:spLocks noGrp="1"/>
+          </p:cNvSpPr>
+          <p:nvPr>
+            <p:ph sz="half" idx="1"/>
+          </p:nvPr>
+        </p:nvSpPr>
+        <p:spPr/>
+        <p:txBody>
+          <a:bodyPr/>
+          <a:lstStyle/>
+          <a:p>
+            <a:endParaRPr lang="it-IT"/>
+          </a:p>
+        </p:txBody>
+      </p:sp>
+    </p:spTree>
+    <p:extLst>
+      <p:ext uri="{BB962C8B-B14F-4D97-AF65-F5344CB8AC3E}">
+        <p14:creationId xmlns:p14="http://schemas.microsoft.com/office/powerpoint/2010/main" val="2985669483"/>
       </p:ext>
     </p:extLst>
   </p:cSld>

</xml_diff>

<commit_message>
up to lecture 6
</commit_message>
<xml_diff>
--- a/slides/Slides Labjs.pptx
+++ b/slides/Slides Labjs.pptx
@@ -55,6 +55,21 @@
     <p:sldId id="304" r:id="rId49"/>
     <p:sldId id="305" r:id="rId50"/>
     <p:sldId id="292" r:id="rId51"/>
+    <p:sldId id="306" r:id="rId52"/>
+    <p:sldId id="307" r:id="rId53"/>
+    <p:sldId id="308" r:id="rId54"/>
+    <p:sldId id="309" r:id="rId55"/>
+    <p:sldId id="310" r:id="rId56"/>
+    <p:sldId id="311" r:id="rId57"/>
+    <p:sldId id="312" r:id="rId58"/>
+    <p:sldId id="313" r:id="rId59"/>
+    <p:sldId id="314" r:id="rId60"/>
+    <p:sldId id="315" r:id="rId61"/>
+    <p:sldId id="316" r:id="rId62"/>
+    <p:sldId id="317" r:id="rId63"/>
+    <p:sldId id="318" r:id="rId64"/>
+    <p:sldId id="319" r:id="rId65"/>
+    <p:sldId id="320" r:id="rId66"/>
   </p:sldIdLst>
   <p:sldSz cx="12192000" cy="6858000"/>
   <p:notesSz cx="6858000" cy="9144000"/>
@@ -1533,6 +1548,143 @@
 </inkml:ink>
 </file>
 
+<file path=ppt/ink/ink55.xml><?xml version="1.0" encoding="utf-8"?>
+<inkml:ink xmlns:inkml="http://www.w3.org/2003/InkML">
+  <inkml:definitions>
+    <inkml:context xml:id="ctx0">
+      <inkml:inkSource xml:id="inkSrc0">
+        <inkml:traceFormat>
+          <inkml:channel name="X" type="integer" min="-2.14748E9" max="2.14748E9" units="cm"/>
+          <inkml:channel name="Y" type="integer" min="-2.14748E9" max="2.14748E9" units="cm"/>
+        </inkml:traceFormat>
+        <inkml:channelProperties>
+          <inkml:channelProperty channel="X" name="resolution" value="1000" units="1/cm"/>
+          <inkml:channelProperty channel="Y" name="resolution" value="1000" units="1/cm"/>
+        </inkml:channelProperties>
+      </inkml:inkSource>
+      <inkml:timestamp xml:id="ts0" timeString="2025-06-30T10:35:33.485"/>
+    </inkml:context>
+    <inkml:brush xml:id="br0">
+      <inkml:brushProperty name="width" value="0.2" units="cm"/>
+      <inkml:brushProperty name="height" value="1.2" units="cm"/>
+      <inkml:brushProperty name="ignorePressure" value="1"/>
+      <inkml:brushProperty name="inkEffects" value="pencil"/>
+    </inkml:brush>
+  </inkml:definitions>
+  <inkml:trace contextRef="#ctx0" brushRef="#br0">6912 39,'-4'0,"-7"0,-9 0,-10 0,-8 0,-8 0,-3 0,-2 0,-6 0,-2 0,1 0,2 0,1 0,2 0,0 0,2 0,-4 0,-1 0,0 0,1 0,1 0,2 0,4 0,3 0,0 0,-6 0,2 0,1 0,-5 0,-2 0,0 0,1 0,0 0,1 0,2 0,0 0,-5 0,0 0,0 0,1 0,1 0,-3 0,0 0,0 0,2 0,1 0,-3 0,0 0,0 0,2 0,6 0,6 0,3 0,-1 0,2 0,-1 0,-2 0,-3 0,-2 0,-2 0,0 0,-2 0,-1 0,1 0,-4 0,-2 0,-4 0,0 0,-3 4,1 2,2 0,-1 2,2 1,1-1,-5-2,-2 1,-1 1,-3 3,-3-1,-5 3,-4-2,1-1,0 1,1-2,1 3,2-1,4 2,3-2,3-2,6 1,3 0,4 2,2-1,2-3,0 3,0-2,4 3,6-2,1 3,3-1,-2 2,-2-2,1 1,-1 4,-3-2,1 1,5 2,-6 3,-3 1,-3 2,-2-3,0-2,3 1,2 2,0 0,-1 2,4 1,0-4,-2-1,4 0,-1 5,7 3,1 1,2 5,1-1,3-4,-3-4,3 3,3 1,1 0,1 4,-1 4,4 1,1 2,4-1,0-3,-1-3,-3 1,-3 3,-1 1,3 1,0 4,5-2,3 5,1-5,1-1,-2 2,2 2,2 2,3 2,2-3,1 0,2 0,0-2,0-5,1-5,-1 2,0-2,1 3,-1-1,0 3,0-2,0-2,0 2,4-1,2 2,-1-1,-1 3,3 2,1-1,3 2,0 2,2-7,-1 0,2 1,-2 4,-3 7,2 4,-1 1,2 1,-2-1,-1 0,1-2,-1 0,3-1,-1 0,2 0,-2-1,3-4,2-1,-1-4,-3 0,1-8,2-4,3 1,2 0,3-1,2 3,5 1,1-1,-4-2,-2-2,3 0,1-2,4 4,1 1,4 0,-1-2,2 4,-1 0,-3 3,1 0,-1-2,-2-3,-3-2,3-1,0 2,-2 2,3-2,-4-1,0 0,5-2,1-1,2 4,4 1,3 0,3-2,2 4,5 4,2 1,0-3,3-2,0-7,-2-3,3-2,0 0,5 1,2 1,1-4,-1-5,-1 0,2-2,-2 0,1-2,1 3,2-2,-3-2,1-3,-3-3,0-1,-3-1,2-2,10 1,6-1,7 1,9 0,6-1,12 1,7 0,0 0,6 0,2 0,-3 0,-2 0,-5 0,3 0,3 5,-4 0,0 1,-9-1,-1 2,-7 0,-13 0,-9-3,-9-1,-6-1,-4-1,-2-1,3 0,-1 0,-3-1,-4 1,3-4,-2-2,-1-4,-2 0,-1-3,-2 1,8-2,2 1,-1-1,-1 2,-4-2,-1-2,-3-4,0-1,3-7,1-3,4-4,1-5,-2-14,2-9,4-12,-1-7,-7-10,-8 2,0-2,-4 7,-6 1,-4 5,-5 8,-2 7,-6 2,-3 2,-5 4,0 1,-2 3,-4-4,-2-4,-4-2,0-11,-2-11,-1-12,1-3,-1-7,1-2,-1-4,1-1,0 7,0-2,0 2,0-4,-5 0,0-2,-5-1,-9-1,-5-13,1 3,0 5,0 6,-1 13,0 19,4 20,5 15,0 7,4 6,-1 4,2 3,2 1,-2 5,1 2,2 0,-2 2,0 0,-2-2,0-1,-2-3,-3-2,-3-5,-3-6,-2-2,-1-3,4-4,5 2,1-1,-1-1,-2-3,-3 3,-1 5,2 4,0 4,5 3,-1 2,-1 6,-3 1,3 0,0-2,-2 4,-2 4,-1 5,-2 3,-1 3,4-3,5-1</inkml:trace>
+</inkml:ink>
+</file>
+
+<file path=ppt/ink/ink56.xml><?xml version="1.0" encoding="utf-8"?>
+<inkml:ink xmlns:inkml="http://www.w3.org/2003/InkML">
+  <inkml:definitions>
+    <inkml:context xml:id="ctx0">
+      <inkml:inkSource xml:id="inkSrc0">
+        <inkml:traceFormat>
+          <inkml:channel name="X" type="integer" min="-2.14748E9" max="2.14748E9" units="cm"/>
+          <inkml:channel name="Y" type="integer" min="-2.14748E9" max="2.14748E9" units="cm"/>
+        </inkml:traceFormat>
+        <inkml:channelProperties>
+          <inkml:channelProperty channel="X" name="resolution" value="1000" units="1/cm"/>
+          <inkml:channelProperty channel="Y" name="resolution" value="1000" units="1/cm"/>
+        </inkml:channelProperties>
+      </inkml:inkSource>
+      <inkml:timestamp xml:id="ts0" timeString="2025-06-30T10:35:35.623"/>
+    </inkml:context>
+    <inkml:brush xml:id="br0">
+      <inkml:brushProperty name="width" value="0.2" units="cm"/>
+      <inkml:brushProperty name="height" value="1.2" units="cm"/>
+      <inkml:brushProperty name="ignorePressure" value="1"/>
+      <inkml:brushProperty name="inkEffects" value="pencil"/>
+    </inkml:brush>
+  </inkml:definitions>
+  <inkml:trace contextRef="#ctx0" brushRef="#br0">0 459,'9'0,"20"0,18 0,22 0,18 0,10-8,7-4,6-3,11 0,3 3,1 0,-3 1,7-2,0 2,-1-2,-4 1,-3 3,-4-1,-4 0,-10-1,-8 0,-8 2,-1-6,-2 0,-3 3,-2 2,-2 4,-4 2,-3 3,-4 1,4 0,-1-4,0-1,-2 1,-1 0,-2 1,-3-3,-4-1,-3 1,3 2,0-4,-1 1,-2 0,4 2,0 2,-1 2,-2 0,-1-3,-2-2,0 1,-1 1,3 2,-2 0,-2-3,-4-2,-7 2,-1 1,2 1,-1 1,0 1,-1 1,-3-5,1 0,-1-1,2 2,3 1,-1 1,2-3,3-1,2 1,2 1,-3 1,0 1,-4 2,-4-1,-5-3,-2-2,-3 1,-2 1,0 1,0 1,-5 1</inkml:trace>
+</inkml:ink>
+</file>
+
+<file path=ppt/ink/ink57.xml><?xml version="1.0" encoding="utf-8"?>
+<inkml:ink xmlns:inkml="http://www.w3.org/2003/InkML">
+  <inkml:definitions>
+    <inkml:context xml:id="ctx0">
+      <inkml:inkSource xml:id="inkSrc0">
+        <inkml:traceFormat>
+          <inkml:channel name="X" type="integer" min="-2.14748E9" max="2.14748E9" units="cm"/>
+          <inkml:channel name="Y" type="integer" min="-2.14748E9" max="2.14748E9" units="cm"/>
+        </inkml:traceFormat>
+        <inkml:channelProperties>
+          <inkml:channelProperty channel="X" name="resolution" value="1000" units="1/cm"/>
+          <inkml:channelProperty channel="Y" name="resolution" value="1000" units="1/cm"/>
+        </inkml:channelProperties>
+      </inkml:inkSource>
+      <inkml:timestamp xml:id="ts0" timeString="2025-06-30T10:35:37.529"/>
+    </inkml:context>
+    <inkml:brush xml:id="br0">
+      <inkml:brushProperty name="width" value="0.2" units="cm"/>
+      <inkml:brushProperty name="height" value="1.2" units="cm"/>
+      <inkml:brushProperty name="ignorePressure" value="1"/>
+      <inkml:brushProperty name="inkEffects" value="pencil"/>
+    </inkml:brush>
+  </inkml:definitions>
+  <inkml:trace contextRef="#ctx0" brushRef="#br0">0 1,'5'0,"5"0,1 4,3 2,4 4,3 0,2-2,1 3,2 3,0 0,0-3,0-3,0 1,0 4,-1-1,-4 2,-1-1,0-3,-4 1,1-1,1 2,2-1,2 1,1 0,2-3,0-3,1-3,-5 3,-1 1,-4 3,0 0,0-2,3-2,3-2,-3 2,-1 1,2 2,-3 6,0-1,-3 1,-4 4,-3 2,-3 1,-3 3,-1 0,0 0,-1 1,-4 0,-1 0,-5 0,-4-5,1-1,-2 0,-3-4,-2 1,2 1,1 2,-2 2,-1 1,-2 1,-1 2,4-1,0-3,5-2,-1 0,-1 1,-3-3,-1 0,2 1,0-3,4 1,4 1,4 2,-1 2,-4-2,1-2,-3-2,-3-1,-3 3,-2 1,2-2</inkml:trace>
+</inkml:ink>
+</file>
+
+<file path=ppt/ink/ink58.xml><?xml version="1.0" encoding="utf-8"?>
+<inkml:ink xmlns:inkml="http://www.w3.org/2003/InkML">
+  <inkml:definitions>
+    <inkml:context xml:id="ctx0">
+      <inkml:inkSource xml:id="inkSrc0">
+        <inkml:traceFormat>
+          <inkml:channel name="X" type="integer" min="-2.14748E9" max="2.14748E9" units="cm"/>
+          <inkml:channel name="Y" type="integer" min="-2.14748E9" max="2.14748E9" units="cm"/>
+          <inkml:channel name="F" type="integer" max="32767" units="dev"/>
+        </inkml:traceFormat>
+        <inkml:channelProperties>
+          <inkml:channelProperty channel="X" name="resolution" value="1000" units="1/cm"/>
+          <inkml:channelProperty channel="Y" name="resolution" value="1000" units="1/cm"/>
+          <inkml:channelProperty channel="F" name="resolution" value="0" units="1/dev"/>
+        </inkml:channelProperties>
+      </inkml:inkSource>
+      <inkml:timestamp xml:id="ts0" timeString="2025-06-30T10:35:41.410"/>
+    </inkml:context>
+    <inkml:brush xml:id="br0">
+      <inkml:brushProperty name="width" value="0.2" units="cm"/>
+      <inkml:brushProperty name="height" value="1.2" units="cm"/>
+      <inkml:brushProperty name="ignorePressure" value="1"/>
+      <inkml:brushProperty name="inkEffects" value="pencil"/>
+    </inkml:brush>
+  </inkml:definitions>
+  <inkml:trace contextRef="#ctx0" brushRef="#br0">0 3988 0,'5334'-3988'0</inkml:trace>
+</inkml:ink>
+</file>
+
+<file path=ppt/ink/ink59.xml><?xml version="1.0" encoding="utf-8"?>
+<inkml:ink xmlns:inkml="http://www.w3.org/2003/InkML">
+  <inkml:definitions>
+    <inkml:context xml:id="ctx0">
+      <inkml:inkSource xml:id="inkSrc0">
+        <inkml:traceFormat>
+          <inkml:channel name="X" type="integer" min="-2.14748E9" max="2.14748E9" units="cm"/>
+          <inkml:channel name="Y" type="integer" min="-2.14748E9" max="2.14748E9" units="cm"/>
+        </inkml:traceFormat>
+        <inkml:channelProperties>
+          <inkml:channelProperty channel="X" name="resolution" value="1000" units="1/cm"/>
+          <inkml:channelProperty channel="Y" name="resolution" value="1000" units="1/cm"/>
+        </inkml:channelProperties>
+      </inkml:inkSource>
+      <inkml:timestamp xml:id="ts0" timeString="2025-06-30T10:35:45.102"/>
+    </inkml:context>
+    <inkml:brush xml:id="br0">
+      <inkml:brushProperty name="width" value="0.2" units="cm"/>
+      <inkml:brushProperty name="height" value="1.2" units="cm"/>
+      <inkml:brushProperty name="ignorePressure" value="1"/>
+      <inkml:brushProperty name="inkEffects" value="pencil"/>
+    </inkml:brush>
+  </inkml:definitions>
+  <inkml:trace contextRef="#ctx0" brushRef="#br0">1 131,'4'0,"6"0,6-5,4-1,3-3,2-1,1 1,5-2,6-3,0 0,-1-1,-3 2,-2 2,-3 4,-1 3,-1 2,-1 2,0 0,0 1,0-1,0 1,0-1,0 1,1-1,-5 4,-6 6,-5 6,-4 4,-4 3,-1 2,-2 1,0 0,0 1,0-1,0 0,-4-4,-1-2,1 0,0 1,2 1,1 1,-3-3,-2-1,2 1,0 1,3 2,0 1,1 0,1 1,0 1,0-1,0-3</inkml:trace>
+</inkml:ink>
+</file>
+
 <file path=ppt/ink/ink6.xml><?xml version="1.0" encoding="utf-8"?>
 <inkml:ink xmlns:inkml="http://www.w3.org/2003/InkML">
   <inkml:definitions>
@@ -1557,6 +1709,143 @@
     </inkml:brush>
   </inkml:definitions>
   <inkml:trace contextRef="#ctx0" brushRef="#br0">1246 0,'-4'0,"-6"0,-6 0,-4 0,-3 0,-2 0,-5 0,-2 0,-5 0,1 0,1 5,3 1,-2 4,0 0,2-1,6 1,0 0,-2 2,1 0,-4 1,0-1,3 1,4 4,-3-2,-2 1,0 2,1 2,0 3,6 1,1-4,1 0,-1-4,-1 0,3 1,1 3,-2 1,0 2,-3-3,4 0,0 0,-1 1,-1 2,-1 0,2 2,1-4,-1-1,4 0,-1-3,3 0,-1 1,3 2,3 2,-1-3,1-1,2 2,3 1,1 2,2 1,0 1,6 0,1 1,4-1,0 1,3 0,-1-1,2 1,-1-1,-3 0,1 1,-2-1,-1 1,-3-1,2 1,0-1,4-4,3-1,0 0,2 1,2-3,-2-1,1 2,2-3,-3 1,1-3,1 0,3-2,1-3,2-3,1-2,0 1,1 2,0-2,-1-1,1-2,0 0,-1-1,1-1,-1 0,1-1,-1 1,0 0,5 0,1-1,0-3,3-6,1-6,-3 1,-1-3,-2-1,-2 2,0-1,-2 3,0 0,0-2,0 2,1-1,-5-2,-2 2,-3 0,-6-2,1-3,-1-1,1-2,-1-1,2 0,3-1,0 0,1 0,-2 1,-4-1,-3 1,-3-1,-2-4,-2-1,0 0,-1 1,1 2,-1 1,1 0,-1-3,1-1,0 0,0-2,0-2,0 3,0-3,0 0,0 2,0 3,0 1,0 2,0 1,0 0,0 1,0 0,0 0,-4 0,-6 0,-5 0,-5 4,1 1,0 0,2-1,1 3,-2 5,-2 4,-1 4,-3 3,-1 1,0 2,-1-1,1 1,-1 0,0 0,5-1</inkml:trace>
+</inkml:ink>
+</file>
+
+<file path=ppt/ink/ink60.xml><?xml version="1.0" encoding="utf-8"?>
+<inkml:ink xmlns:inkml="http://www.w3.org/2003/InkML">
+  <inkml:definitions>
+    <inkml:context xml:id="ctx0">
+      <inkml:inkSource xml:id="inkSrc0">
+        <inkml:traceFormat>
+          <inkml:channel name="X" type="integer" min="-2.14748E9" max="2.14748E9" units="cm"/>
+          <inkml:channel name="Y" type="integer" min="-2.14748E9" max="2.14748E9" units="cm"/>
+          <inkml:channel name="F" type="integer" max="32767" units="dev"/>
+        </inkml:traceFormat>
+        <inkml:channelProperties>
+          <inkml:channelProperty channel="X" name="resolution" value="1000" units="1/cm"/>
+          <inkml:channelProperty channel="Y" name="resolution" value="1000" units="1/cm"/>
+          <inkml:channelProperty channel="F" name="resolution" value="0" units="1/dev"/>
+        </inkml:channelProperties>
+      </inkml:inkSource>
+      <inkml:timestamp xml:id="ts0" timeString="2025-06-30T10:35:47.574"/>
+    </inkml:context>
+    <inkml:brush xml:id="br0">
+      <inkml:brushProperty name="width" value="0.2" units="cm"/>
+      <inkml:brushProperty name="height" value="1.2" units="cm"/>
+      <inkml:brushProperty name="ignorePressure" value="1"/>
+      <inkml:brushProperty name="inkEffects" value="pencil"/>
+    </inkml:brush>
+  </inkml:definitions>
+  <inkml:trace contextRef="#ctx0" brushRef="#br0">0 3861 0,'13209'-3861'0</inkml:trace>
+</inkml:ink>
+</file>
+
+<file path=ppt/ink/ink61.xml><?xml version="1.0" encoding="utf-8"?>
+<inkml:ink xmlns:inkml="http://www.w3.org/2003/InkML">
+  <inkml:definitions>
+    <inkml:context xml:id="ctx0">
+      <inkml:inkSource xml:id="inkSrc0">
+        <inkml:traceFormat>
+          <inkml:channel name="X" type="integer" min="-2.14748E9" max="2.14748E9" units="cm"/>
+          <inkml:channel name="Y" type="integer" min="-2.14748E9" max="2.14748E9" units="cm"/>
+        </inkml:traceFormat>
+        <inkml:channelProperties>
+          <inkml:channelProperty channel="X" name="resolution" value="1000" units="1/cm"/>
+          <inkml:channelProperty channel="Y" name="resolution" value="1000" units="1/cm"/>
+        </inkml:channelProperties>
+      </inkml:inkSource>
+      <inkml:timestamp xml:id="ts0" timeString="2025-06-30T10:35:51.212"/>
+    </inkml:context>
+    <inkml:brush xml:id="br0">
+      <inkml:brushProperty name="width" value="0.2" units="cm"/>
+      <inkml:brushProperty name="height" value="1.2" units="cm"/>
+      <inkml:brushProperty name="ignorePressure" value="1"/>
+      <inkml:brushProperty name="inkEffects" value="pencil"/>
+    </inkml:brush>
+  </inkml:definitions>
+  <inkml:trace contextRef="#ctx0" brushRef="#br0">0 130,'5'0,"5"0,6-4,4-2,3 1,-2-4,3 1,7 0,11 3,7-3,12 0,9-3,2 1,0-3,-2 1,-5 3,-1 3,-6 2,-5 2,-3 1,-5 1,-7 0,-4 1,-5-1,-2 1,-2-1,0 0,-1 0,-4 5,-5 5,-6 5,-4 5,-7-1,-8-4,-2 0,-3 2,1 2,-2 2,2 2,-1-3,2-1,-1-3,2 0,3 1,3 2,-2 3,0 1,-2-2,0-2,-2 1,-4 2,1 0,-1 2,2 1,-1-5,2 0,3 0,4 1,-2 2,0 1,-2-4,1-1,-4-3,2-1,2 2,-2 3,-3-3,1 0,-2 2,2 2,2 1,4-2</inkml:trace>
+</inkml:ink>
+</file>
+
+<file path=ppt/ink/ink62.xml><?xml version="1.0" encoding="utf-8"?>
+<inkml:ink xmlns:inkml="http://www.w3.org/2003/InkML">
+  <inkml:definitions>
+    <inkml:context xml:id="ctx0">
+      <inkml:inkSource xml:id="inkSrc0">
+        <inkml:traceFormat>
+          <inkml:channel name="X" type="integer" min="-2.14748E9" max="2.14748E9" units="cm"/>
+          <inkml:channel name="Y" type="integer" min="-2.14748E9" max="2.14748E9" units="cm"/>
+        </inkml:traceFormat>
+        <inkml:channelProperties>
+          <inkml:channelProperty channel="X" name="resolution" value="1000" units="1/cm"/>
+          <inkml:channelProperty channel="Y" name="resolution" value="1000" units="1/cm"/>
+        </inkml:channelProperties>
+      </inkml:inkSource>
+      <inkml:timestamp xml:id="ts0" timeString="2025-06-30T10:43:07.427"/>
+    </inkml:context>
+    <inkml:brush xml:id="br0">
+      <inkml:brushProperty name="width" value="0.2" units="cm"/>
+      <inkml:brushProperty name="height" value="1.2" units="cm"/>
+      <inkml:brushProperty name="ignorePressure" value="1"/>
+      <inkml:brushProperty name="inkEffects" value="pencil"/>
+    </inkml:brush>
+  </inkml:definitions>
+  <inkml:trace contextRef="#ctx0" brushRef="#br0">1680 588,'0'-4,"0"-6,0-5,0-5,0-3,0-3,-4-4,-6-7,-5 0,-5 0,-3 4,-2-2,4 0,0 3,-5 2,-1 1,-2 2,1 1,0 5,1 2,0 4,6 0,-3 3,-2 3,0 3,-5 3,-2 2,2 1,-4 0,0 1,2-1,3 1,1-1,1 0,2 1,-4-1,0 0,-5 0,-5 0,1 0,2 0,-1 4,1 6,3 2,-1 2,-4 4,5 2,0 8,-3 2,0 1,-2 3,1-3,-1-4,1-1,3-1,-1 0,6-1,7 1,4 0,0-5,0 0,3 0,-1 1,3 1,4 2,3 0,4 1,1 0,2 1,0-1,1 1,0 0,-1-1,1 1,-1-1,0 1,0-1,0 0,0 1,0-1,0 0,5 5,0 1,5 0,1 3,2 1,-1-3,2 4,-2-2,-2-1,-3 2,1-1,4-1,4 2,4-5,2-3,-2-2,0-6,1 0,0-1,3-2,0-5,-4 1,0-2,0 2,1-2,1 3,2-2,5-2,2-3,-1-3,1-1,-3-1,0-1,-1-1,-1 1,-1-1,0 1,0 0,1-1,-1 1,0 0,0 0,1 0,-1 0,1 0,-1 0,0 0,1-4,3-1,-2-5,-2 0,0-3,3-4,2 2,0-1,4-3,-1 2,-4 0,-4-6,-2-3,0-2,0 0,1-4,0 3,-4 2,0 2,-5-4,1-1,1 0,2 6,-2 2,0 4,-2 2,-4-1,0-2,3-2,-1-2,-3-1,-3-1,-2-1,1-4,0-1,0-1,2 2,0 2,3 0,0 2,-2 0,-3 0,-2 1,-1 0,-3 0,-4 4,-2 2,0-1,-4 3,1 1,1-2,-2 2,-4 9,1 5</inkml:trace>
+</inkml:ink>
+</file>
+
+<file path=ppt/ink/ink63.xml><?xml version="1.0" encoding="utf-8"?>
+<inkml:ink xmlns:inkml="http://www.w3.org/2003/InkML">
+  <inkml:definitions>
+    <inkml:context xml:id="ctx0">
+      <inkml:inkSource xml:id="inkSrc0">
+        <inkml:traceFormat>
+          <inkml:channel name="X" type="integer" min="-2.14748E9" max="2.14748E9" units="cm"/>
+          <inkml:channel name="Y" type="integer" min="-2.14748E9" max="2.14748E9" units="cm"/>
+        </inkml:traceFormat>
+        <inkml:channelProperties>
+          <inkml:channelProperty channel="X" name="resolution" value="1000" units="1/cm"/>
+          <inkml:channelProperty channel="Y" name="resolution" value="1000" units="1/cm"/>
+        </inkml:channelProperties>
+      </inkml:inkSource>
+      <inkml:timestamp xml:id="ts0" timeString="2025-06-30T10:43:14.292"/>
+    </inkml:context>
+    <inkml:brush xml:id="br0">
+      <inkml:brushProperty name="width" value="0.2" units="cm"/>
+      <inkml:brushProperty name="height" value="1.2" units="cm"/>
+      <inkml:brushProperty name="ignorePressure" value="1"/>
+      <inkml:brushProperty name="inkEffects" value="pencil"/>
+    </inkml:brush>
+  </inkml:definitions>
+  <inkml:trace contextRef="#ctx0" brushRef="#br0">968 199,'-4'0,"-2"-4,-4-1,-4-1,-5 2,-3 1,-2 1,-1 1,-2 1,1 0,4-4,2-2,0 1,-2 0,0 2,-1 1,-2 1,0 1,0 0,-1 0,0 0,1 1,-1-1,1 0,-1 0,1 0,0 0,-1 0,1 4,-1 2,1 0,-1-2,5 4,2-1,-1 4,-1-1,-2-1,4 2,1-1,3 1,4 5,0-2,-3-2,1 0,-1 3,1 3,3 3,4 2,2 2,2 0,2 1,0 0,0 0,1 0,0 0,-1-1,0 1,1-1,-1 1,0-1,0 0,0 1,4-1,1 0,0 1,4-5,0-1,-2 0,3 1,0 1,2-3,-1-1,2-3,-1 1,1 1,3-2,4 0,-3 3,1-2,2 1,1-4,2 2,1 2,1-2,0-3,1-4,0-3,-1-3,1-1,0-1,-1-1,1 0,-1-4,0-5,1-2,-5-3,-1 2,-5-2,0 2,2 3,-2-1,0 1,-1-2,0 1,-2-1,1-4,-1-3,-3-3,1 3,0-1,1 0,0-1,2-2,3-1,-2-1,3 4,-3 1,-4 0,-3-1,-2-2,1 0,0-2,-1 0,-2 0,0-1,-2 1,0-1,-1 0,-1 1,1-1,0 1,0-1,0 1,-5 4,0 2,-1-1,2-1,1-2,1 0,-3 3,-1 0,0 1,2-3,1 0,1-2,-3 4,-1 0,0 0,2-1,-3 3,-5 4,0 5</inkml:trace>
+</inkml:ink>
+</file>
+
+<file path=ppt/ink/ink64.xml><?xml version="1.0" encoding="utf-8"?>
+<inkml:ink xmlns:inkml="http://www.w3.org/2003/InkML">
+  <inkml:definitions>
+    <inkml:context xml:id="ctx0">
+      <inkml:inkSource xml:id="inkSrc0">
+        <inkml:traceFormat>
+          <inkml:channel name="X" type="integer" min="-2.14748E9" max="2.14748E9" units="cm"/>
+          <inkml:channel name="Y" type="integer" min="-2.14748E9" max="2.14748E9" units="cm"/>
+        </inkml:traceFormat>
+        <inkml:channelProperties>
+          <inkml:channelProperty channel="X" name="resolution" value="1000" units="1/cm"/>
+          <inkml:channelProperty channel="Y" name="resolution" value="1000" units="1/cm"/>
+        </inkml:channelProperties>
+      </inkml:inkSource>
+      <inkml:timestamp xml:id="ts0" timeString="2025-06-30T10:43:17.951"/>
+    </inkml:context>
+    <inkml:brush xml:id="br0">
+      <inkml:brushProperty name="width" value="0.2" units="cm"/>
+      <inkml:brushProperty name="height" value="1.2" units="cm"/>
+      <inkml:brushProperty name="ignorePressure" value="1"/>
+      <inkml:brushProperty name="inkEffects" value="pencil"/>
+    </inkml:brush>
+  </inkml:definitions>
+  <inkml:trace contextRef="#ctx0" brushRef="#br0">305 840,'5'4,"5"2,5 3,5 6,4-1,1-2,5 1,7 3,0-2,-1-3,-2-3,-3-3,-2-3,-2-1,-1-1,-1-1,0 0,-1 1,1-1,0 1,1 0,-1 4,0 1,5 1,1-2,0-1,3-1,5-1,4-1,-1 0,5 0,0 0,4-5,-3 0,1-5,-6 0,-4 1,-5-2,0 2,-1-3,-2 0,-1 4,-3-3,-1 1,0-1,-1 0,-4-2,-2-3,-4-3,-4-3,0-2,2-1,0-1,1 0,-1 0,-4 0,-2 1,-3-1,-7 0,-6 1,-2 0,-4 4,-3 5,-4 2,-1 3,-2-1,-1 1,0 3,0-1,0 0,0-2,-4 0,-1 2,4-1,3 1,-3-3,-2 1,0 3,-3-2,-1 0,1 3,-3 2,0 2,-2 2,0-4,-1-1,4-4,1 1,1 0,-3-1,1 0,-3-2,1-3,-3 0,2 3,-2 0,1 1,-1-1,2-4,-2 2,1 2,4 0,-2 2,1 2,-2-2,1 1,2 2,7-2,0 1,-1 1,1 2,0 2,1 2,0 0,1 1,-1 0,5 5,2 5,-1 2,3 2,1-1,2 2,0 3,2 2,3 2,3 2,3 1,6 1,7 0,5 0,2 0,-3-1,0 1,-2-1,1 1,-1-1,1 1,3-1,-1 0,-4 1,2-1,-3 1,3-5,-2-2,-3 1,-2 1,1 1,1 2,2-4,1-1,1-3,0-1,-3 2,-3 3,2-3,0 0,3 2,-1 2,3 1,-2 2,-2 1,2 0,-1 1,-3 0,3-5,-1-1,2-4,0-1,1 2,4 2,-1 3,-3 1,-4-3</inkml:trace>
 </inkml:ink>
 </file>
 
@@ -1792,7 +2081,7 @@
           <a:p>
             <a:fld id="{CEEB41F6-C09C-4ED5-B2A5-993957568E90}" type="datetimeFigureOut">
               <a:rPr lang="it-IT" smtClean="0"/>
-              <a:t>29/06/2025</a:t>
+              <a:t>30/06/2025</a:t>
             </a:fld>
             <a:endParaRPr lang="it-IT"/>
           </a:p>
@@ -1992,7 +2281,7 @@
           <a:p>
             <a:fld id="{CEEB41F6-C09C-4ED5-B2A5-993957568E90}" type="datetimeFigureOut">
               <a:rPr lang="it-IT" smtClean="0"/>
-              <a:t>29/06/2025</a:t>
+              <a:t>30/06/2025</a:t>
             </a:fld>
             <a:endParaRPr lang="it-IT"/>
           </a:p>
@@ -2202,7 +2491,7 @@
           <a:p>
             <a:fld id="{CEEB41F6-C09C-4ED5-B2A5-993957568E90}" type="datetimeFigureOut">
               <a:rPr lang="it-IT" smtClean="0"/>
-              <a:t>29/06/2025</a:t>
+              <a:t>30/06/2025</a:t>
             </a:fld>
             <a:endParaRPr lang="it-IT"/>
           </a:p>
@@ -2402,7 +2691,7 @@
           <a:p>
             <a:fld id="{CEEB41F6-C09C-4ED5-B2A5-993957568E90}" type="datetimeFigureOut">
               <a:rPr lang="it-IT" smtClean="0"/>
-              <a:t>29/06/2025</a:t>
+              <a:t>30/06/2025</a:t>
             </a:fld>
             <a:endParaRPr lang="it-IT"/>
           </a:p>
@@ -2678,7 +2967,7 @@
           <a:p>
             <a:fld id="{CEEB41F6-C09C-4ED5-B2A5-993957568E90}" type="datetimeFigureOut">
               <a:rPr lang="it-IT" smtClean="0"/>
-              <a:t>29/06/2025</a:t>
+              <a:t>30/06/2025</a:t>
             </a:fld>
             <a:endParaRPr lang="it-IT"/>
           </a:p>
@@ -2946,7 +3235,7 @@
           <a:p>
             <a:fld id="{CEEB41F6-C09C-4ED5-B2A5-993957568E90}" type="datetimeFigureOut">
               <a:rPr lang="it-IT" smtClean="0"/>
-              <a:t>29/06/2025</a:t>
+              <a:t>30/06/2025</a:t>
             </a:fld>
             <a:endParaRPr lang="it-IT"/>
           </a:p>
@@ -3361,7 +3650,7 @@
           <a:p>
             <a:fld id="{CEEB41F6-C09C-4ED5-B2A5-993957568E90}" type="datetimeFigureOut">
               <a:rPr lang="it-IT" smtClean="0"/>
-              <a:t>29/06/2025</a:t>
+              <a:t>30/06/2025</a:t>
             </a:fld>
             <a:endParaRPr lang="it-IT"/>
           </a:p>
@@ -3503,7 +3792,7 @@
           <a:p>
             <a:fld id="{CEEB41F6-C09C-4ED5-B2A5-993957568E90}" type="datetimeFigureOut">
               <a:rPr lang="it-IT" smtClean="0"/>
-              <a:t>29/06/2025</a:t>
+              <a:t>30/06/2025</a:t>
             </a:fld>
             <a:endParaRPr lang="it-IT"/>
           </a:p>
@@ -3616,7 +3905,7 @@
           <a:p>
             <a:fld id="{CEEB41F6-C09C-4ED5-B2A5-993957568E90}" type="datetimeFigureOut">
               <a:rPr lang="it-IT" smtClean="0"/>
-              <a:t>29/06/2025</a:t>
+              <a:t>30/06/2025</a:t>
             </a:fld>
             <a:endParaRPr lang="it-IT"/>
           </a:p>
@@ -3929,7 +4218,7 @@
           <a:p>
             <a:fld id="{CEEB41F6-C09C-4ED5-B2A5-993957568E90}" type="datetimeFigureOut">
               <a:rPr lang="it-IT" smtClean="0"/>
-              <a:t>29/06/2025</a:t>
+              <a:t>30/06/2025</a:t>
             </a:fld>
             <a:endParaRPr lang="it-IT"/>
           </a:p>
@@ -4218,7 +4507,7 @@
           <a:p>
             <a:fld id="{CEEB41F6-C09C-4ED5-B2A5-993957568E90}" type="datetimeFigureOut">
               <a:rPr lang="it-IT" smtClean="0"/>
-              <a:t>29/06/2025</a:t>
+              <a:t>30/06/2025</a:t>
             </a:fld>
             <a:endParaRPr lang="it-IT"/>
           </a:p>
@@ -4461,7 +4750,7 @@
           <a:p>
             <a:fld id="{CEEB41F6-C09C-4ED5-B2A5-993957568E90}" type="datetimeFigureOut">
               <a:rPr lang="it-IT" smtClean="0"/>
-              <a:t>29/06/2025</a:t>
+              <a:t>30/06/2025</a:t>
             </a:fld>
             <a:endParaRPr lang="it-IT"/>
           </a:p>
@@ -14743,20 +15032,8 @@
           <a:lstStyle/>
           <a:p>
             <a:r>
-              <a:rPr lang="it-IT" dirty="0"/>
-              <a:t>Who </a:t>
-            </a:r>
-            <a:r>
-              <a:rPr lang="it-IT" dirty="0" err="1"/>
-              <a:t>am</a:t>
-            </a:r>
-            <a:r>
-              <a:rPr lang="it-IT" dirty="0"/>
-              <a:t> I and </a:t>
-            </a:r>
-            <a:r>
-              <a:rPr lang="it-IT" dirty="0" err="1"/>
-              <a:t>why</a:t>
+              <a:rPr lang="it-IT" dirty="0" err="1"/>
+              <a:t>Why</a:t>
             </a:r>
             <a:r>
               <a:rPr lang="it-IT" dirty="0"/>
@@ -14799,7 +15076,239 @@
           <a:bodyPr/>
           <a:lstStyle/>
           <a:p>
-            <a:endParaRPr lang="it-IT"/>
+            <a:r>
+              <a:rPr lang="it-IT" dirty="0" err="1"/>
+              <a:t>This</a:t>
+            </a:r>
+            <a:r>
+              <a:rPr lang="it-IT" dirty="0"/>
+              <a:t> </a:t>
+            </a:r>
+            <a:r>
+              <a:rPr lang="it-IT" dirty="0" err="1"/>
+              <a:t>is</a:t>
+            </a:r>
+            <a:r>
+              <a:rPr lang="it-IT" dirty="0"/>
+              <a:t> </a:t>
+            </a:r>
+            <a:r>
+              <a:rPr lang="it-IT" dirty="0" err="1"/>
+              <a:t>not</a:t>
+            </a:r>
+            <a:r>
+              <a:rPr lang="it-IT" dirty="0"/>
+              <a:t> just </a:t>
+            </a:r>
+            <a:r>
+              <a:rPr lang="it-IT" dirty="0" err="1"/>
+              <a:t>another</a:t>
+            </a:r>
+            <a:r>
+              <a:rPr lang="it-IT" dirty="0"/>
+              <a:t> </a:t>
+            </a:r>
+            <a:r>
+              <a:rPr lang="it-IT" dirty="0" err="1"/>
+              <a:t>course</a:t>
+            </a:r>
+            <a:r>
+              <a:rPr lang="it-IT" dirty="0"/>
+              <a:t> on a </a:t>
+            </a:r>
+            <a:r>
+              <a:rPr lang="it-IT" dirty="0" err="1"/>
+              <a:t>platform</a:t>
+            </a:r>
+            <a:r>
+              <a:rPr lang="it-IT" dirty="0"/>
+              <a:t> for </a:t>
+            </a:r>
+            <a:r>
+              <a:rPr lang="it-IT" dirty="0" err="1"/>
+              <a:t>experiments</a:t>
+            </a:r>
+            <a:endParaRPr lang="it-IT" dirty="0"/>
+          </a:p>
+          <a:p>
+            <a:r>
+              <a:rPr lang="it-IT" dirty="0" err="1"/>
+              <a:t>This</a:t>
+            </a:r>
+            <a:r>
+              <a:rPr lang="it-IT" dirty="0"/>
+              <a:t> </a:t>
+            </a:r>
+            <a:r>
+              <a:rPr lang="it-IT" dirty="0" err="1"/>
+              <a:t>is</a:t>
+            </a:r>
+            <a:r>
+              <a:rPr lang="it-IT" dirty="0"/>
+              <a:t> a set of good practices + an </a:t>
+            </a:r>
+            <a:r>
+              <a:rPr lang="it-IT" dirty="0" err="1"/>
+              <a:t>introduction</a:t>
+            </a:r>
+            <a:r>
+              <a:rPr lang="it-IT" dirty="0"/>
+              <a:t> to JS</a:t>
+            </a:r>
+          </a:p>
+          <a:p>
+            <a:r>
+              <a:rPr lang="it-IT" dirty="0" err="1"/>
+              <a:t>It</a:t>
+            </a:r>
+            <a:r>
+              <a:rPr lang="it-IT" dirty="0"/>
+              <a:t> </a:t>
+            </a:r>
+            <a:r>
+              <a:rPr lang="it-IT" dirty="0" err="1"/>
+              <a:t>is</a:t>
+            </a:r>
+            <a:r>
+              <a:rPr lang="it-IT" dirty="0"/>
+              <a:t> </a:t>
+            </a:r>
+            <a:r>
+              <a:rPr lang="it-IT" dirty="0" err="1"/>
+              <a:t>based</a:t>
+            </a:r>
+            <a:r>
+              <a:rPr lang="it-IT" dirty="0"/>
+              <a:t> on one key </a:t>
+            </a:r>
+            <a:r>
+              <a:rPr lang="it-IT" dirty="0" err="1"/>
+              <a:t>principle</a:t>
+            </a:r>
+            <a:r>
+              <a:rPr lang="it-IT" dirty="0"/>
+              <a:t>:</a:t>
+            </a:r>
+          </a:p>
+          <a:p>
+            <a:pPr lvl="1"/>
+            <a:r>
+              <a:rPr lang="it-IT" dirty="0" err="1"/>
+              <a:t>As</a:t>
+            </a:r>
+            <a:r>
+              <a:rPr lang="it-IT" dirty="0"/>
+              <a:t> </a:t>
+            </a:r>
+            <a:r>
+              <a:rPr lang="it-IT" dirty="0" err="1"/>
+              <a:t>experimentalist</a:t>
+            </a:r>
+            <a:r>
+              <a:rPr lang="it-IT" dirty="0"/>
+              <a:t>, </a:t>
+            </a:r>
+            <a:r>
+              <a:rPr lang="it-IT" dirty="0" err="1"/>
+              <a:t>we</a:t>
+            </a:r>
+            <a:r>
+              <a:rPr lang="it-IT" dirty="0"/>
+              <a:t> </a:t>
+            </a:r>
+            <a:r>
+              <a:rPr lang="it-IT" dirty="0" err="1"/>
+              <a:t>rely</a:t>
+            </a:r>
+            <a:r>
+              <a:rPr lang="it-IT" dirty="0"/>
+              <a:t> on the design, so </a:t>
+            </a:r>
+            <a:r>
+              <a:rPr lang="it-IT" dirty="0" err="1"/>
+              <a:t>we</a:t>
+            </a:r>
+            <a:r>
+              <a:rPr lang="it-IT" dirty="0"/>
+              <a:t> </a:t>
+            </a:r>
+            <a:r>
+              <a:rPr lang="it-IT" dirty="0" err="1"/>
+              <a:t>need</a:t>
+            </a:r>
+            <a:r>
+              <a:rPr lang="it-IT" dirty="0"/>
+              <a:t> to </a:t>
+            </a:r>
+            <a:r>
+              <a:rPr lang="it-IT" dirty="0" err="1"/>
+              <a:t>try</a:t>
+            </a:r>
+            <a:r>
+              <a:rPr lang="it-IT" dirty="0"/>
+              <a:t> to solve </a:t>
+            </a:r>
+            <a:r>
+              <a:rPr lang="it-IT" dirty="0" err="1"/>
+              <a:t>as</a:t>
+            </a:r>
+            <a:r>
+              <a:rPr lang="it-IT" dirty="0"/>
+              <a:t> </a:t>
+            </a:r>
+            <a:r>
+              <a:rPr lang="it-IT" dirty="0" err="1"/>
+              <a:t>many</a:t>
+            </a:r>
+            <a:r>
+              <a:rPr lang="it-IT" dirty="0"/>
+              <a:t> </a:t>
+            </a:r>
+            <a:r>
+              <a:rPr lang="it-IT" dirty="0" err="1"/>
+              <a:t>problems</a:t>
+            </a:r>
+            <a:r>
+              <a:rPr lang="it-IT" dirty="0"/>
+              <a:t> </a:t>
+            </a:r>
+            <a:r>
+              <a:rPr lang="it-IT" dirty="0" err="1"/>
+              <a:t>as</a:t>
+            </a:r>
+            <a:r>
+              <a:rPr lang="it-IT" dirty="0"/>
+              <a:t> </a:t>
+            </a:r>
+            <a:r>
+              <a:rPr lang="it-IT" dirty="0" err="1"/>
+              <a:t>possible</a:t>
+            </a:r>
+            <a:r>
+              <a:rPr lang="it-IT" dirty="0"/>
+              <a:t> </a:t>
+            </a:r>
+            <a:r>
+              <a:rPr lang="it-IT" dirty="0" err="1"/>
+              <a:t>while</a:t>
+            </a:r>
+            <a:r>
+              <a:rPr lang="it-IT" dirty="0"/>
+              <a:t> </a:t>
+            </a:r>
+            <a:r>
+              <a:rPr lang="it-IT" dirty="0" err="1"/>
+              <a:t>designing</a:t>
+            </a:r>
+            <a:r>
+              <a:rPr lang="it-IT" dirty="0"/>
+              <a:t> the </a:t>
+            </a:r>
+            <a:r>
+              <a:rPr lang="it-IT"/>
+              <a:t>experiment</a:t>
+            </a:r>
+            <a:endParaRPr lang="it-IT" dirty="0"/>
           </a:p>
         </p:txBody>
       </p:sp>
@@ -18514,8 +19023,8 @@
             <a:chExt cx="1761480" cy="4134240"/>
           </a:xfrm>
         </p:grpSpPr>
-        <mc:AlternateContent xmlns:mc="http://schemas.openxmlformats.org/markup-compatibility/2006">
-          <mc:Choice xmlns:p14="http://schemas.microsoft.com/office/powerpoint/2010/main" xmlns:aink="http://schemas.microsoft.com/office/drawing/2016/ink" Requires="p14 aink">
+        <mc:AlternateContent xmlns:mc="http://schemas.openxmlformats.org/markup-compatibility/2006" xmlns:p14="http://schemas.microsoft.com/office/powerpoint/2010/main" xmlns:aink="http://schemas.microsoft.com/office/drawing/2016/ink">
+          <mc:Choice Requires="p14 aink">
             <p:contentPart p14:bwMode="auto" r:id="rId3">
               <p14:nvContentPartPr>
                 <p14:cNvPr id="8" name="Ink 7">
@@ -18534,7 +19043,7 @@
               </p14:xfrm>
             </p:contentPart>
           </mc:Choice>
-          <mc:Fallback>
+          <mc:Fallback xmlns="">
             <p:pic>
               <p:nvPicPr>
                 <p:cNvPr id="8" name="Ink 7">
@@ -18565,8 +19074,8 @@
             </p:pic>
           </mc:Fallback>
         </mc:AlternateContent>
-        <mc:AlternateContent xmlns:mc="http://schemas.openxmlformats.org/markup-compatibility/2006">
-          <mc:Choice xmlns:p14="http://schemas.microsoft.com/office/powerpoint/2010/main" xmlns:aink="http://schemas.microsoft.com/office/drawing/2016/ink" Requires="p14 aink">
+        <mc:AlternateContent xmlns:mc="http://schemas.openxmlformats.org/markup-compatibility/2006" xmlns:p14="http://schemas.microsoft.com/office/powerpoint/2010/main" xmlns:aink="http://schemas.microsoft.com/office/drawing/2016/ink">
+          <mc:Choice Requires="p14 aink">
             <p:contentPart p14:bwMode="auto" r:id="rId5">
               <p14:nvContentPartPr>
                 <p14:cNvPr id="9" name="Ink 8">
@@ -18585,7 +19094,7 @@
               </p14:xfrm>
             </p:contentPart>
           </mc:Choice>
-          <mc:Fallback>
+          <mc:Fallback xmlns="">
             <p:pic>
               <p:nvPicPr>
                 <p:cNvPr id="9" name="Ink 8">
@@ -18616,8 +19125,8 @@
             </p:pic>
           </mc:Fallback>
         </mc:AlternateContent>
-        <mc:AlternateContent xmlns:mc="http://schemas.openxmlformats.org/markup-compatibility/2006">
-          <mc:Choice xmlns:p14="http://schemas.microsoft.com/office/powerpoint/2010/main" xmlns:aink="http://schemas.microsoft.com/office/drawing/2016/ink" Requires="p14 aink">
+        <mc:AlternateContent xmlns:mc="http://schemas.openxmlformats.org/markup-compatibility/2006" xmlns:p14="http://schemas.microsoft.com/office/powerpoint/2010/main" xmlns:aink="http://schemas.microsoft.com/office/drawing/2016/ink">
+          <mc:Choice Requires="p14 aink">
             <p:contentPart p14:bwMode="auto" r:id="rId7">
               <p14:nvContentPartPr>
                 <p14:cNvPr id="11" name="Ink 10">
@@ -18636,7 +19145,7 @@
               </p14:xfrm>
             </p:contentPart>
           </mc:Choice>
-          <mc:Fallback>
+          <mc:Fallback xmlns="">
             <p:pic>
               <p:nvPicPr>
                 <p:cNvPr id="11" name="Ink 10">
@@ -18667,8 +19176,8 @@
             </p:pic>
           </mc:Fallback>
         </mc:AlternateContent>
-        <mc:AlternateContent xmlns:mc="http://schemas.openxmlformats.org/markup-compatibility/2006">
-          <mc:Choice xmlns:p14="http://schemas.microsoft.com/office/powerpoint/2010/main" xmlns:aink="http://schemas.microsoft.com/office/drawing/2016/ink" Requires="p14 aink">
+        <mc:AlternateContent xmlns:mc="http://schemas.openxmlformats.org/markup-compatibility/2006" xmlns:p14="http://schemas.microsoft.com/office/powerpoint/2010/main" xmlns:aink="http://schemas.microsoft.com/office/drawing/2016/ink">
+          <mc:Choice Requires="p14 aink">
             <p:contentPart p14:bwMode="auto" r:id="rId9">
               <p14:nvContentPartPr>
                 <p14:cNvPr id="12" name="Ink 11">
@@ -18687,7 +19196,7 @@
               </p14:xfrm>
             </p:contentPart>
           </mc:Choice>
-          <mc:Fallback>
+          <mc:Fallback xmlns="">
             <p:pic>
               <p:nvPicPr>
                 <p:cNvPr id="12" name="Ink 11">
@@ -19830,7 +20339,181 @@
           <a:bodyPr/>
           <a:lstStyle/>
           <a:p>
-            <a:endParaRPr lang="it-IT"/>
+            <a:r>
+              <a:rPr lang="it-IT" dirty="0"/>
+              <a:t>The Loop</a:t>
+            </a:r>
+          </a:p>
+        </p:txBody>
+      </p:sp>
+      <p:sp>
+        <p:nvSpPr>
+          <p:cNvPr id="3" name="Content Placeholder 2">
+            <a:extLst>
+              <a:ext uri="{FF2B5EF4-FFF2-40B4-BE49-F238E27FC236}">
+                <a16:creationId xmlns:a16="http://schemas.microsoft.com/office/drawing/2014/main" id="{604B957D-D17C-C7D4-13B0-0D97F84984C2}"/>
+              </a:ext>
+            </a:extLst>
+          </p:cNvPr>
+          <p:cNvSpPr>
+            <a:spLocks noGrp="1"/>
+          </p:cNvSpPr>
+          <p:nvPr>
+            <p:ph idx="1"/>
+          </p:nvPr>
+        </p:nvSpPr>
+        <p:spPr/>
+        <p:txBody>
+          <a:bodyPr/>
+          <a:lstStyle/>
+          <a:p>
+            <a:r>
+              <a:rPr lang="it-IT" dirty="0"/>
+              <a:t>The </a:t>
+            </a:r>
+            <a:r>
+              <a:rPr lang="it-IT" dirty="0" err="1"/>
+              <a:t>other</a:t>
+            </a:r>
+            <a:r>
+              <a:rPr lang="it-IT" dirty="0"/>
+              <a:t> key </a:t>
+            </a:r>
+            <a:r>
+              <a:rPr lang="it-IT" dirty="0" err="1"/>
+              <a:t>sequence</a:t>
+            </a:r>
+            <a:r>
+              <a:rPr lang="it-IT" dirty="0"/>
+              <a:t> tool </a:t>
+            </a:r>
+            <a:r>
+              <a:rPr lang="it-IT" dirty="0" err="1"/>
+              <a:t>is</a:t>
+            </a:r>
+            <a:r>
+              <a:rPr lang="it-IT" dirty="0"/>
+              <a:t> the loop.</a:t>
+            </a:r>
+          </a:p>
+          <a:p>
+            <a:r>
+              <a:rPr lang="it-IT" dirty="0" err="1"/>
+              <a:t>We</a:t>
+            </a:r>
+            <a:r>
+              <a:rPr lang="it-IT" dirty="0"/>
+              <a:t> </a:t>
+            </a:r>
+            <a:r>
+              <a:rPr lang="it-IT" dirty="0" err="1"/>
+              <a:t>will</a:t>
+            </a:r>
+            <a:r>
+              <a:rPr lang="it-IT" dirty="0"/>
+              <a:t> </a:t>
+            </a:r>
+            <a:r>
+              <a:rPr lang="it-IT" dirty="0" err="1"/>
+              <a:t>see</a:t>
+            </a:r>
+            <a:r>
+              <a:rPr lang="it-IT" dirty="0"/>
+              <a:t> </a:t>
+            </a:r>
+            <a:r>
+              <a:rPr lang="it-IT" dirty="0" err="1"/>
+              <a:t>how</a:t>
+            </a:r>
+            <a:r>
+              <a:rPr lang="it-IT" dirty="0"/>
+              <a:t> </a:t>
+            </a:r>
+            <a:r>
+              <a:rPr lang="it-IT" dirty="0" err="1"/>
+              <a:t>it</a:t>
+            </a:r>
+            <a:r>
+              <a:rPr lang="it-IT" dirty="0"/>
+              <a:t> works in the </a:t>
+            </a:r>
+            <a:r>
+              <a:rPr lang="it-IT" dirty="0" err="1"/>
+              <a:t>context</a:t>
+            </a:r>
+            <a:r>
+              <a:rPr lang="it-IT" dirty="0"/>
+              <a:t> of the treatment </a:t>
+            </a:r>
+            <a:r>
+              <a:rPr lang="it-IT" dirty="0" err="1"/>
+              <a:t>assignment</a:t>
+            </a:r>
+            <a:endParaRPr lang="it-IT" dirty="0"/>
+          </a:p>
+          <a:p>
+            <a:pPr marL="0" indent="0">
+              <a:buNone/>
+            </a:pPr>
+            <a:endParaRPr lang="it-IT" dirty="0"/>
+          </a:p>
+        </p:txBody>
+      </p:sp>
+    </p:spTree>
+    <p:extLst>
+      <p:ext uri="{BB962C8B-B14F-4D97-AF65-F5344CB8AC3E}">
+        <p14:creationId xmlns:p14="http://schemas.microsoft.com/office/powerpoint/2010/main" val="2985669483"/>
+      </p:ext>
+    </p:extLst>
+  </p:cSld>
+  <p:clrMapOvr>
+    <a:masterClrMapping/>
+  </p:clrMapOvr>
+</p:sld>
+</file>
+
+<file path=ppt/slides/slide51.xml><?xml version="1.0" encoding="utf-8"?>
+<p:sld xmlns:a="http://schemas.openxmlformats.org/drawingml/2006/main" xmlns:r="http://schemas.openxmlformats.org/officeDocument/2006/relationships" xmlns:p="http://schemas.openxmlformats.org/presentationml/2006/main">
+  <p:cSld>
+    <p:spTree>
+      <p:nvGrpSpPr>
+        <p:cNvPr id="1" name=""/>
+        <p:cNvGrpSpPr/>
+        <p:nvPr/>
+      </p:nvGrpSpPr>
+      <p:grpSpPr>
+        <a:xfrm>
+          <a:off x="0" y="0"/>
+          <a:ext cx="0" cy="0"/>
+          <a:chOff x="0" y="0"/>
+          <a:chExt cx="0" cy="0"/>
+        </a:xfrm>
+      </p:grpSpPr>
+      <p:sp>
+        <p:nvSpPr>
+          <p:cNvPr id="2" name="Title 1">
+            <a:extLst>
+              <a:ext uri="{FF2B5EF4-FFF2-40B4-BE49-F238E27FC236}">
+                <a16:creationId xmlns:a16="http://schemas.microsoft.com/office/drawing/2014/main" id="{3A866136-BD51-36B5-B237-DB6FB8F339C5}"/>
+              </a:ext>
+            </a:extLst>
+          </p:cNvPr>
+          <p:cNvSpPr>
+            <a:spLocks noGrp="1"/>
+          </p:cNvSpPr>
+          <p:nvPr>
+            <p:ph type="title"/>
+          </p:nvPr>
+        </p:nvSpPr>
+        <p:spPr/>
+        <p:txBody>
+          <a:bodyPr/>
+          <a:lstStyle/>
+          <a:p>
+            <a:r>
+              <a:rPr lang="it-IT" dirty="0"/>
+              <a:t>The Loop</a:t>
+            </a:r>
           </a:p>
         </p:txBody>
       </p:sp>
@@ -19839,7 +20522,1027 @@
           <p:cNvPr id="4" name="Content Placeholder 3">
             <a:extLst>
               <a:ext uri="{FF2B5EF4-FFF2-40B4-BE49-F238E27FC236}">
-                <a16:creationId xmlns:a16="http://schemas.microsoft.com/office/drawing/2014/main" id="{8E7A46A6-0A6B-3DF3-4AFD-9F7236310D27}"/>
+                <a16:creationId xmlns:a16="http://schemas.microsoft.com/office/drawing/2014/main" id="{9F162862-76FA-A834-DC6D-3A4CCD72908A}"/>
+              </a:ext>
+            </a:extLst>
+          </p:cNvPr>
+          <p:cNvSpPr>
+            <a:spLocks noGrp="1"/>
+          </p:cNvSpPr>
+          <p:nvPr>
+            <p:ph sz="half" idx="1"/>
+          </p:nvPr>
+        </p:nvSpPr>
+        <p:spPr/>
+        <p:txBody>
+          <a:bodyPr>
+            <a:normAutofit/>
+          </a:bodyPr>
+          <a:lstStyle/>
+          <a:p>
+            <a:r>
+              <a:rPr lang="it-IT" sz="2000" dirty="0" err="1"/>
+              <a:t>We</a:t>
+            </a:r>
+            <a:r>
+              <a:rPr lang="it-IT" sz="2000" dirty="0"/>
+              <a:t> can </a:t>
+            </a:r>
+            <a:r>
+              <a:rPr lang="it-IT" sz="2000" dirty="0" err="1"/>
+              <a:t>manipulate</a:t>
+            </a:r>
+            <a:r>
+              <a:rPr lang="it-IT" sz="2000" dirty="0"/>
+              <a:t> social </a:t>
+            </a:r>
+            <a:r>
+              <a:rPr lang="it-IT" sz="2000" dirty="0" err="1"/>
+              <a:t>identity</a:t>
+            </a:r>
+            <a:r>
+              <a:rPr lang="it-IT" sz="2000" dirty="0"/>
+              <a:t> </a:t>
+            </a:r>
+            <a:r>
+              <a:rPr lang="it-IT" sz="2000" dirty="0" err="1"/>
+              <a:t>using</a:t>
+            </a:r>
+            <a:r>
+              <a:rPr lang="it-IT" sz="2000" dirty="0"/>
+              <a:t> the art </a:t>
+            </a:r>
+            <a:r>
+              <a:rPr lang="it-IT" sz="2000" dirty="0" err="1"/>
+              <a:t>preferences</a:t>
+            </a:r>
+            <a:r>
+              <a:rPr lang="it-IT" sz="2000" dirty="0"/>
+              <a:t> task by Chen and Li</a:t>
+            </a:r>
+          </a:p>
+          <a:p>
+            <a:r>
+              <a:rPr lang="it-IT" sz="2000" dirty="0" err="1"/>
+              <a:t>Requirements</a:t>
+            </a:r>
+            <a:r>
+              <a:rPr lang="it-IT" sz="2000" dirty="0"/>
+              <a:t>:</a:t>
+            </a:r>
+          </a:p>
+          <a:p>
+            <a:pPr marL="457200" indent="-457200">
+              <a:buFont typeface="+mj-lt"/>
+              <a:buAutoNum type="arabicPeriod"/>
+            </a:pPr>
+            <a:r>
+              <a:rPr lang="it-IT" sz="2000" dirty="0"/>
+              <a:t>A </a:t>
+            </a:r>
+            <a:r>
+              <a:rPr lang="it-IT" sz="2000" dirty="0" err="1"/>
+              <a:t>Table</a:t>
+            </a:r>
+            <a:r>
+              <a:rPr lang="it-IT" sz="2000" dirty="0"/>
+              <a:t>, with </a:t>
+            </a:r>
+            <a:r>
+              <a:rPr lang="it-IT" sz="2000" dirty="0" err="1"/>
+              <a:t>two</a:t>
+            </a:r>
+            <a:r>
+              <a:rPr lang="it-IT" sz="2000" dirty="0"/>
+              <a:t> pictures and </a:t>
+            </a:r>
+            <a:r>
+              <a:rPr lang="it-IT" sz="2000" dirty="0" err="1"/>
+              <a:t>two</a:t>
+            </a:r>
+            <a:r>
+              <a:rPr lang="it-IT" sz="2000" dirty="0"/>
+              <a:t> </a:t>
+            </a:r>
+            <a:r>
+              <a:rPr lang="it-IT" sz="2000" dirty="0" err="1"/>
+              <a:t>buttons</a:t>
+            </a:r>
+            <a:endParaRPr lang="it-IT" sz="2000" dirty="0"/>
+          </a:p>
+          <a:p>
+            <a:pPr marL="457200" indent="-457200">
+              <a:buFont typeface="+mj-lt"/>
+              <a:buAutoNum type="arabicPeriod"/>
+            </a:pPr>
+            <a:r>
+              <a:rPr lang="it-IT" sz="2000" dirty="0"/>
+              <a:t>A loop of </a:t>
+            </a:r>
+            <a:r>
+              <a:rPr lang="it-IT" sz="2000" dirty="0" err="1"/>
+              <a:t>five</a:t>
+            </a:r>
+            <a:r>
+              <a:rPr lang="it-IT" sz="2000" dirty="0"/>
+              <a:t> rounds</a:t>
+            </a:r>
+          </a:p>
+          <a:p>
+            <a:pPr marL="457200" indent="-457200">
+              <a:buFont typeface="+mj-lt"/>
+              <a:buAutoNum type="arabicPeriod"/>
+            </a:pPr>
+            <a:r>
+              <a:rPr lang="it-IT" sz="2000" dirty="0" err="1"/>
+              <a:t>We</a:t>
+            </a:r>
+            <a:r>
+              <a:rPr lang="it-IT" sz="2000" dirty="0"/>
+              <a:t> </a:t>
+            </a:r>
+            <a:r>
+              <a:rPr lang="it-IT" sz="2000" dirty="0" err="1"/>
+              <a:t>need</a:t>
+            </a:r>
+            <a:r>
+              <a:rPr lang="it-IT" sz="2000" dirty="0"/>
+              <a:t> to </a:t>
+            </a:r>
+            <a:r>
+              <a:rPr lang="it-IT" sz="2000" dirty="0" err="1"/>
+              <a:t>keep</a:t>
+            </a:r>
+            <a:r>
+              <a:rPr lang="it-IT" sz="2000" dirty="0"/>
+              <a:t> track of </a:t>
+            </a:r>
+            <a:r>
+              <a:rPr lang="it-IT" sz="2000" dirty="0" err="1"/>
+              <a:t>choices</a:t>
+            </a:r>
+            <a:r>
+              <a:rPr lang="it-IT" sz="2000" dirty="0"/>
+              <a:t> so </a:t>
+            </a:r>
+            <a:r>
+              <a:rPr lang="it-IT" sz="2000" dirty="0" err="1"/>
+              <a:t>that</a:t>
+            </a:r>
+            <a:r>
+              <a:rPr lang="it-IT" sz="2000" dirty="0"/>
+              <a:t> </a:t>
+            </a:r>
+            <a:r>
+              <a:rPr lang="it-IT" sz="2000" dirty="0" err="1"/>
+              <a:t>we</a:t>
+            </a:r>
+            <a:r>
+              <a:rPr lang="it-IT" sz="2000" dirty="0"/>
+              <a:t> are </a:t>
+            </a:r>
+            <a:r>
+              <a:rPr lang="it-IT" sz="2000" dirty="0" err="1"/>
+              <a:t>able</a:t>
+            </a:r>
+            <a:r>
+              <a:rPr lang="it-IT" sz="2000" dirty="0"/>
+              <a:t> to </a:t>
+            </a:r>
+            <a:r>
+              <a:rPr lang="it-IT" sz="2000" dirty="0" err="1"/>
+              <a:t>distinguish</a:t>
+            </a:r>
+            <a:r>
+              <a:rPr lang="it-IT" sz="2000" dirty="0"/>
+              <a:t> </a:t>
+            </a:r>
+            <a:r>
+              <a:rPr lang="it-IT" sz="2000" dirty="0" err="1"/>
+              <a:t>those</a:t>
+            </a:r>
+            <a:r>
+              <a:rPr lang="it-IT" sz="2000" dirty="0"/>
+              <a:t> </a:t>
+            </a:r>
+            <a:r>
+              <a:rPr lang="it-IT" sz="2000" dirty="0" err="1"/>
+              <a:t>who</a:t>
+            </a:r>
+            <a:r>
+              <a:rPr lang="it-IT" sz="2000" dirty="0"/>
+              <a:t> </a:t>
+            </a:r>
+            <a:r>
+              <a:rPr lang="it-IT" sz="2000" dirty="0" err="1"/>
+              <a:t>select</a:t>
+            </a:r>
+            <a:r>
+              <a:rPr lang="it-IT" sz="2000" dirty="0"/>
+              <a:t> </a:t>
+            </a:r>
+            <a:r>
+              <a:rPr lang="it-IT" sz="2000" dirty="0" err="1"/>
+              <a:t>left</a:t>
+            </a:r>
+            <a:r>
+              <a:rPr lang="it-IT" sz="2000" dirty="0"/>
+              <a:t>/</a:t>
+            </a:r>
+            <a:r>
+              <a:rPr lang="it-IT" sz="2000" dirty="0" err="1"/>
+              <a:t>right</a:t>
+            </a:r>
+            <a:r>
+              <a:rPr lang="it-IT" sz="2000" dirty="0"/>
+              <a:t> </a:t>
+            </a:r>
+            <a:r>
+              <a:rPr lang="it-IT" sz="2000" dirty="0" err="1"/>
+              <a:t>most</a:t>
+            </a:r>
+            <a:r>
+              <a:rPr lang="it-IT" sz="2000" dirty="0"/>
+              <a:t> of the times</a:t>
+            </a:r>
+          </a:p>
+          <a:p>
+            <a:pPr marL="457200" indent="-457200">
+              <a:buFont typeface="+mj-lt"/>
+              <a:buAutoNum type="arabicPeriod"/>
+            </a:pPr>
+            <a:endParaRPr lang="it-IT" sz="2000" dirty="0"/>
+          </a:p>
+        </p:txBody>
+      </p:sp>
+      <p:pic>
+        <p:nvPicPr>
+          <p:cNvPr id="7" name="Content Placeholder 6">
+            <a:extLst>
+              <a:ext uri="{FF2B5EF4-FFF2-40B4-BE49-F238E27FC236}">
+                <a16:creationId xmlns:a16="http://schemas.microsoft.com/office/drawing/2014/main" id="{138D9154-8095-F19A-6783-1095B12187FC}"/>
+              </a:ext>
+            </a:extLst>
+          </p:cNvPr>
+          <p:cNvPicPr>
+            <a:picLocks noGrp="1" noChangeAspect="1"/>
+          </p:cNvPicPr>
+          <p:nvPr>
+            <p:ph sz="half" idx="2"/>
+          </p:nvPr>
+        </p:nvPicPr>
+        <p:blipFill>
+          <a:blip r:embed="rId2"/>
+          <a:stretch>
+            <a:fillRect/>
+          </a:stretch>
+        </p:blipFill>
+        <p:spPr>
+          <a:xfrm>
+            <a:off x="6172200" y="2239361"/>
+            <a:ext cx="5181600" cy="3523866"/>
+          </a:xfrm>
+        </p:spPr>
+      </p:pic>
+    </p:spTree>
+    <p:extLst>
+      <p:ext uri="{BB962C8B-B14F-4D97-AF65-F5344CB8AC3E}">
+        <p14:creationId xmlns:p14="http://schemas.microsoft.com/office/powerpoint/2010/main" val="477529032"/>
+      </p:ext>
+    </p:extLst>
+  </p:cSld>
+  <p:clrMapOvr>
+    <a:masterClrMapping/>
+  </p:clrMapOvr>
+</p:sld>
+</file>
+
+<file path=ppt/slides/slide52.xml><?xml version="1.0" encoding="utf-8"?>
+<p:sld xmlns:a="http://schemas.openxmlformats.org/drawingml/2006/main" xmlns:r="http://schemas.openxmlformats.org/officeDocument/2006/relationships" xmlns:p="http://schemas.openxmlformats.org/presentationml/2006/main">
+  <p:cSld>
+    <p:spTree>
+      <p:nvGrpSpPr>
+        <p:cNvPr id="1" name=""/>
+        <p:cNvGrpSpPr/>
+        <p:nvPr/>
+      </p:nvGrpSpPr>
+      <p:grpSpPr>
+        <a:xfrm>
+          <a:off x="0" y="0"/>
+          <a:ext cx="0" cy="0"/>
+          <a:chOff x="0" y="0"/>
+          <a:chExt cx="0" cy="0"/>
+        </a:xfrm>
+      </p:grpSpPr>
+      <p:sp>
+        <p:nvSpPr>
+          <p:cNvPr id="14" name="TextBox 13">
+            <a:extLst>
+              <a:ext uri="{FF2B5EF4-FFF2-40B4-BE49-F238E27FC236}">
+                <a16:creationId xmlns:a16="http://schemas.microsoft.com/office/drawing/2014/main" id="{2269CAE7-2454-E59D-8C61-9ADF5441E11A}"/>
+              </a:ext>
+            </a:extLst>
+          </p:cNvPr>
+          <p:cNvSpPr txBox="1"/>
+          <p:nvPr/>
+        </p:nvSpPr>
+        <p:spPr>
+          <a:xfrm>
+            <a:off x="365760" y="2350008"/>
+            <a:ext cx="1170288" cy="369332"/>
+          </a:xfrm>
+          <a:prstGeom prst="rect">
+            <a:avLst/>
+          </a:prstGeom>
+          <a:noFill/>
+        </p:spPr>
+        <p:txBody>
+          <a:bodyPr wrap="square" rtlCol="0">
+            <a:spAutoFit/>
+          </a:bodyPr>
+          <a:lstStyle/>
+          <a:p>
+            <a:r>
+              <a:rPr lang="it-IT" dirty="0"/>
+              <a:t>loop</a:t>
+            </a:r>
+          </a:p>
+        </p:txBody>
+      </p:sp>
+      <p:pic>
+        <p:nvPicPr>
+          <p:cNvPr id="19" name="Picture 18">
+            <a:extLst>
+              <a:ext uri="{FF2B5EF4-FFF2-40B4-BE49-F238E27FC236}">
+                <a16:creationId xmlns:a16="http://schemas.microsoft.com/office/drawing/2014/main" id="{ED579C94-7F53-8EFE-B28F-5EB50F025E75}"/>
+              </a:ext>
+            </a:extLst>
+          </p:cNvPr>
+          <p:cNvPicPr>
+            <a:picLocks noChangeAspect="1"/>
+          </p:cNvPicPr>
+          <p:nvPr/>
+        </p:nvPicPr>
+        <p:blipFill>
+          <a:blip r:embed="rId2"/>
+          <a:stretch>
+            <a:fillRect/>
+          </a:stretch>
+        </p:blipFill>
+        <p:spPr>
+          <a:xfrm>
+            <a:off x="1665124" y="0"/>
+            <a:ext cx="8861751" cy="6858000"/>
+          </a:xfrm>
+          <a:prstGeom prst="rect">
+            <a:avLst/>
+          </a:prstGeom>
+        </p:spPr>
+      </p:pic>
+      <p:grpSp>
+        <p:nvGrpSpPr>
+          <p:cNvPr id="23" name="Group 22">
+            <a:extLst>
+              <a:ext uri="{FF2B5EF4-FFF2-40B4-BE49-F238E27FC236}">
+                <a16:creationId xmlns:a16="http://schemas.microsoft.com/office/drawing/2014/main" id="{63E8752F-1215-9116-37C9-1EDB0CB83EF2}"/>
+              </a:ext>
+            </a:extLst>
+          </p:cNvPr>
+          <p:cNvGrpSpPr/>
+          <p:nvPr/>
+        </p:nvGrpSpPr>
+        <p:grpSpPr>
+          <a:xfrm>
+            <a:off x="1014768" y="1714104"/>
+            <a:ext cx="4765320" cy="1861920"/>
+            <a:chOff x="1014768" y="1714104"/>
+            <a:chExt cx="4765320" cy="1861920"/>
+          </a:xfrm>
+        </p:grpSpPr>
+        <mc:AlternateContent xmlns:mc="http://schemas.openxmlformats.org/markup-compatibility/2006">
+          <mc:Choice xmlns:p14="http://schemas.microsoft.com/office/powerpoint/2010/main" xmlns:aink="http://schemas.microsoft.com/office/drawing/2016/ink" Requires="p14 aink">
+            <p:contentPart p14:bwMode="auto" r:id="rId3">
+              <p14:nvContentPartPr>
+                <p14:cNvPr id="20" name="Ink 19">
+                  <a:extLst>
+                    <a:ext uri="{FF2B5EF4-FFF2-40B4-BE49-F238E27FC236}">
+                      <a16:creationId xmlns:a16="http://schemas.microsoft.com/office/drawing/2014/main" id="{C1D73C86-DB7B-55AE-04FB-05CA1D7FCFE7}"/>
+                    </a:ext>
+                  </a:extLst>
+                </p14:cNvPr>
+                <p14:cNvContentPartPr/>
+                <p14:nvPr/>
+              </p14:nvContentPartPr>
+              <p14:xfrm>
+                <a:off x="3025728" y="1714104"/>
+                <a:ext cx="2754360" cy="1861920"/>
+              </p14:xfrm>
+            </p:contentPart>
+          </mc:Choice>
+          <mc:Fallback>
+            <p:pic>
+              <p:nvPicPr>
+                <p:cNvPr id="20" name="Ink 19">
+                  <a:extLst>
+                    <a:ext uri="{FF2B5EF4-FFF2-40B4-BE49-F238E27FC236}">
+                      <a16:creationId xmlns:a16="http://schemas.microsoft.com/office/drawing/2014/main" id="{C1D73C86-DB7B-55AE-04FB-05CA1D7FCFE7}"/>
+                    </a:ext>
+                  </a:extLst>
+                </p:cNvPr>
+                <p:cNvPicPr/>
+                <p:nvPr/>
+              </p:nvPicPr>
+              <p:blipFill>
+                <a:blip r:embed="rId4"/>
+                <a:stretch>
+                  <a:fillRect/>
+                </a:stretch>
+              </p:blipFill>
+              <p:spPr>
+                <a:xfrm>
+                  <a:off x="2990088" y="1498104"/>
+                  <a:ext cx="2826000" cy="2293560"/>
+                </a:xfrm>
+                <a:prstGeom prst="rect">
+                  <a:avLst/>
+                </a:prstGeom>
+              </p:spPr>
+            </p:pic>
+          </mc:Fallback>
+        </mc:AlternateContent>
+        <mc:AlternateContent xmlns:mc="http://schemas.openxmlformats.org/markup-compatibility/2006">
+          <mc:Choice xmlns:p14="http://schemas.microsoft.com/office/powerpoint/2010/main" xmlns:aink="http://schemas.microsoft.com/office/drawing/2016/ink" Requires="p14 aink">
+            <p:contentPart p14:bwMode="auto" r:id="rId5">
+              <p14:nvContentPartPr>
+                <p14:cNvPr id="21" name="Ink 20">
+                  <a:extLst>
+                    <a:ext uri="{FF2B5EF4-FFF2-40B4-BE49-F238E27FC236}">
+                      <a16:creationId xmlns:a16="http://schemas.microsoft.com/office/drawing/2014/main" id="{C05DDAE4-4620-F597-A952-FA5CF2B6AB7D}"/>
+                    </a:ext>
+                  </a:extLst>
+                </p14:cNvPr>
+                <p14:cNvContentPartPr/>
+                <p14:nvPr/>
+              </p14:nvContentPartPr>
+              <p14:xfrm>
+                <a:off x="1014768" y="2468304"/>
+                <a:ext cx="1883880" cy="165600"/>
+              </p14:xfrm>
+            </p:contentPart>
+          </mc:Choice>
+          <mc:Fallback>
+            <p:pic>
+              <p:nvPicPr>
+                <p:cNvPr id="21" name="Ink 20">
+                  <a:extLst>
+                    <a:ext uri="{FF2B5EF4-FFF2-40B4-BE49-F238E27FC236}">
+                      <a16:creationId xmlns:a16="http://schemas.microsoft.com/office/drawing/2014/main" id="{C05DDAE4-4620-F597-A952-FA5CF2B6AB7D}"/>
+                    </a:ext>
+                  </a:extLst>
+                </p:cNvPr>
+                <p:cNvPicPr/>
+                <p:nvPr/>
+              </p:nvPicPr>
+              <p:blipFill>
+                <a:blip r:embed="rId6"/>
+                <a:stretch>
+                  <a:fillRect/>
+                </a:stretch>
+              </p:blipFill>
+              <p:spPr>
+                <a:xfrm>
+                  <a:off x="978768" y="2252664"/>
+                  <a:ext cx="1955520" cy="597240"/>
+                </a:xfrm>
+                <a:prstGeom prst="rect">
+                  <a:avLst/>
+                </a:prstGeom>
+              </p:spPr>
+            </p:pic>
+          </mc:Fallback>
+        </mc:AlternateContent>
+        <mc:AlternateContent xmlns:mc="http://schemas.openxmlformats.org/markup-compatibility/2006">
+          <mc:Choice xmlns:p14="http://schemas.microsoft.com/office/powerpoint/2010/main" xmlns:aink="http://schemas.microsoft.com/office/drawing/2016/ink" Requires="p14 aink">
+            <p:contentPart p14:bwMode="auto" r:id="rId7">
+              <p14:nvContentPartPr>
+                <p14:cNvPr id="22" name="Ink 21">
+                  <a:extLst>
+                    <a:ext uri="{FF2B5EF4-FFF2-40B4-BE49-F238E27FC236}">
+                      <a16:creationId xmlns:a16="http://schemas.microsoft.com/office/drawing/2014/main" id="{FB0835E8-12D5-9D8C-0855-965C36A932BE}"/>
+                    </a:ext>
+                  </a:extLst>
+                </p14:cNvPr>
+                <p14:cNvContentPartPr/>
+                <p14:nvPr/>
+              </p14:nvContentPartPr>
+              <p14:xfrm>
+                <a:off x="2688048" y="2267424"/>
+                <a:ext cx="294480" cy="438480"/>
+              </p14:xfrm>
+            </p:contentPart>
+          </mc:Choice>
+          <mc:Fallback>
+            <p:pic>
+              <p:nvPicPr>
+                <p:cNvPr id="22" name="Ink 21">
+                  <a:extLst>
+                    <a:ext uri="{FF2B5EF4-FFF2-40B4-BE49-F238E27FC236}">
+                      <a16:creationId xmlns:a16="http://schemas.microsoft.com/office/drawing/2014/main" id="{FB0835E8-12D5-9D8C-0855-965C36A932BE}"/>
+                    </a:ext>
+                  </a:extLst>
+                </p:cNvPr>
+                <p:cNvPicPr/>
+                <p:nvPr/>
+              </p:nvPicPr>
+              <p:blipFill>
+                <a:blip r:embed="rId8"/>
+                <a:stretch>
+                  <a:fillRect/>
+                </a:stretch>
+              </p:blipFill>
+              <p:spPr>
+                <a:xfrm>
+                  <a:off x="2652048" y="2051784"/>
+                  <a:ext cx="366120" cy="870120"/>
+                </a:xfrm>
+                <a:prstGeom prst="rect">
+                  <a:avLst/>
+                </a:prstGeom>
+              </p:spPr>
+            </p:pic>
+          </mc:Fallback>
+        </mc:AlternateContent>
+      </p:grpSp>
+      <mc:AlternateContent xmlns:mc="http://schemas.openxmlformats.org/markup-compatibility/2006">
+        <mc:Choice xmlns:p14="http://schemas.microsoft.com/office/powerpoint/2010/main" xmlns:aink="http://schemas.microsoft.com/office/drawing/2016/ink" Requires="p14 aink">
+          <p:contentPart p14:bwMode="auto" r:id="rId9">
+            <p14:nvContentPartPr>
+              <p14:cNvPr id="25" name="Ink 24">
+                <a:extLst>
+                  <a:ext uri="{FF2B5EF4-FFF2-40B4-BE49-F238E27FC236}">
+                    <a16:creationId xmlns:a16="http://schemas.microsoft.com/office/drawing/2014/main" id="{06C73945-0EA3-196A-2D33-A270CAB7AF65}"/>
+                  </a:ext>
+                </a:extLst>
+              </p14:cNvPr>
+              <p14:cNvContentPartPr/>
+              <p14:nvPr/>
+            </p14:nvContentPartPr>
+            <p14:xfrm>
+              <a:off x="2112048" y="4087224"/>
+              <a:ext cx="1920600" cy="1435680"/>
+            </p14:xfrm>
+          </p:contentPart>
+        </mc:Choice>
+        <mc:Fallback>
+          <p:pic>
+            <p:nvPicPr>
+              <p:cNvPr id="25" name="Ink 24">
+                <a:extLst>
+                  <a:ext uri="{FF2B5EF4-FFF2-40B4-BE49-F238E27FC236}">
+                    <a16:creationId xmlns:a16="http://schemas.microsoft.com/office/drawing/2014/main" id="{06C73945-0EA3-196A-2D33-A270CAB7AF65}"/>
+                  </a:ext>
+                </a:extLst>
+              </p:cNvPr>
+              <p:cNvPicPr/>
+              <p:nvPr/>
+            </p:nvPicPr>
+            <p:blipFill>
+              <a:blip r:embed="rId10"/>
+              <a:stretch>
+                <a:fillRect/>
+              </a:stretch>
+            </p:blipFill>
+            <p:spPr>
+              <a:xfrm>
+                <a:off x="2076048" y="3871224"/>
+                <a:ext cx="1992240" cy="1867320"/>
+              </a:xfrm>
+              <a:prstGeom prst="rect">
+                <a:avLst/>
+              </a:prstGeom>
+            </p:spPr>
+          </p:pic>
+        </mc:Fallback>
+      </mc:AlternateContent>
+      <mc:AlternateContent xmlns:mc="http://schemas.openxmlformats.org/markup-compatibility/2006">
+        <mc:Choice xmlns:p14="http://schemas.microsoft.com/office/powerpoint/2010/main" xmlns:aink="http://schemas.microsoft.com/office/drawing/2016/ink" Requires="p14 aink">
+          <p:contentPart p14:bwMode="auto" r:id="rId11">
+            <p14:nvContentPartPr>
+              <p14:cNvPr id="26" name="Ink 25">
+                <a:extLst>
+                  <a:ext uri="{FF2B5EF4-FFF2-40B4-BE49-F238E27FC236}">
+                    <a16:creationId xmlns:a16="http://schemas.microsoft.com/office/drawing/2014/main" id="{7B751BF6-69AD-82F7-A9AE-C84CCEDA3EC0}"/>
+                  </a:ext>
+                </a:extLst>
+              </p14:cNvPr>
+              <p14:cNvContentPartPr/>
+              <p14:nvPr/>
+            </p14:nvContentPartPr>
+            <p14:xfrm>
+              <a:off x="3831048" y="4067784"/>
+              <a:ext cx="240120" cy="219600"/>
+            </p14:xfrm>
+          </p:contentPart>
+        </mc:Choice>
+        <mc:Fallback>
+          <p:pic>
+            <p:nvPicPr>
+              <p:cNvPr id="26" name="Ink 25">
+                <a:extLst>
+                  <a:ext uri="{FF2B5EF4-FFF2-40B4-BE49-F238E27FC236}">
+                    <a16:creationId xmlns:a16="http://schemas.microsoft.com/office/drawing/2014/main" id="{7B751BF6-69AD-82F7-A9AE-C84CCEDA3EC0}"/>
+                  </a:ext>
+                </a:extLst>
+              </p:cNvPr>
+              <p:cNvPicPr/>
+              <p:nvPr/>
+            </p:nvPicPr>
+            <p:blipFill>
+              <a:blip r:embed="rId12"/>
+              <a:stretch>
+                <a:fillRect/>
+              </a:stretch>
+            </p:blipFill>
+            <p:spPr>
+              <a:xfrm>
+                <a:off x="3795408" y="3852144"/>
+                <a:ext cx="311760" cy="651240"/>
+              </a:xfrm>
+              <a:prstGeom prst="rect">
+                <a:avLst/>
+              </a:prstGeom>
+            </p:spPr>
+          </p:pic>
+        </mc:Fallback>
+      </mc:AlternateContent>
+      <mc:AlternateContent xmlns:mc="http://schemas.openxmlformats.org/markup-compatibility/2006">
+        <mc:Choice xmlns:p14="http://schemas.microsoft.com/office/powerpoint/2010/main" xmlns:aink="http://schemas.microsoft.com/office/drawing/2016/ink" Requires="p14 aink">
+          <p:contentPart p14:bwMode="auto" r:id="rId13">
+            <p14:nvContentPartPr>
+              <p14:cNvPr id="28" name="Ink 27">
+                <a:extLst>
+                  <a:ext uri="{FF2B5EF4-FFF2-40B4-BE49-F238E27FC236}">
+                    <a16:creationId xmlns:a16="http://schemas.microsoft.com/office/drawing/2014/main" id="{6C45D2C9-5487-A5A6-1508-C14E8F18F86E}"/>
+                  </a:ext>
+                </a:extLst>
+              </p14:cNvPr>
+              <p14:cNvContentPartPr/>
+              <p14:nvPr/>
+            </p14:nvContentPartPr>
+            <p14:xfrm>
+              <a:off x="2112048" y="4132944"/>
+              <a:ext cx="4755600" cy="1390320"/>
+            </p14:xfrm>
+          </p:contentPart>
+        </mc:Choice>
+        <mc:Fallback>
+          <p:pic>
+            <p:nvPicPr>
+              <p:cNvPr id="28" name="Ink 27">
+                <a:extLst>
+                  <a:ext uri="{FF2B5EF4-FFF2-40B4-BE49-F238E27FC236}">
+                    <a16:creationId xmlns:a16="http://schemas.microsoft.com/office/drawing/2014/main" id="{6C45D2C9-5487-A5A6-1508-C14E8F18F86E}"/>
+                  </a:ext>
+                </a:extLst>
+              </p:cNvPr>
+              <p:cNvPicPr/>
+              <p:nvPr/>
+            </p:nvPicPr>
+            <p:blipFill>
+              <a:blip r:embed="rId14"/>
+              <a:stretch>
+                <a:fillRect/>
+              </a:stretch>
+            </p:blipFill>
+            <p:spPr>
+              <a:xfrm>
+                <a:off x="2076048" y="3916944"/>
+                <a:ext cx="4827240" cy="1821960"/>
+              </a:xfrm>
+              <a:prstGeom prst="rect">
+                <a:avLst/>
+              </a:prstGeom>
+            </p:spPr>
+          </p:pic>
+        </mc:Fallback>
+      </mc:AlternateContent>
+      <mc:AlternateContent xmlns:mc="http://schemas.openxmlformats.org/markup-compatibility/2006">
+        <mc:Choice xmlns:p14="http://schemas.microsoft.com/office/powerpoint/2010/main" xmlns:aink="http://schemas.microsoft.com/office/drawing/2016/ink" Requires="p14 aink">
+          <p:contentPart p14:bwMode="auto" r:id="rId15">
+            <p14:nvContentPartPr>
+              <p14:cNvPr id="29" name="Ink 28">
+                <a:extLst>
+                  <a:ext uri="{FF2B5EF4-FFF2-40B4-BE49-F238E27FC236}">
+                    <a16:creationId xmlns:a16="http://schemas.microsoft.com/office/drawing/2014/main" id="{758E2F03-ABB5-9305-8682-B1E661FF98BF}"/>
+                  </a:ext>
+                </a:extLst>
+              </p14:cNvPr>
+              <p14:cNvContentPartPr/>
+              <p14:nvPr/>
+            </p14:nvContentPartPr>
+            <p14:xfrm>
+              <a:off x="6528528" y="4086144"/>
+              <a:ext cx="422280" cy="301680"/>
+            </p14:xfrm>
+          </p:contentPart>
+        </mc:Choice>
+        <mc:Fallback>
+          <p:pic>
+            <p:nvPicPr>
+              <p:cNvPr id="29" name="Ink 28">
+                <a:extLst>
+                  <a:ext uri="{FF2B5EF4-FFF2-40B4-BE49-F238E27FC236}">
+                    <a16:creationId xmlns:a16="http://schemas.microsoft.com/office/drawing/2014/main" id="{758E2F03-ABB5-9305-8682-B1E661FF98BF}"/>
+                  </a:ext>
+                </a:extLst>
+              </p:cNvPr>
+              <p:cNvPicPr/>
+              <p:nvPr/>
+            </p:nvPicPr>
+            <p:blipFill>
+              <a:blip r:embed="rId16"/>
+              <a:stretch>
+                <a:fillRect/>
+              </a:stretch>
+            </p:blipFill>
+            <p:spPr>
+              <a:xfrm>
+                <a:off x="6492528" y="3870504"/>
+                <a:ext cx="493920" cy="733320"/>
+              </a:xfrm>
+              <a:prstGeom prst="rect">
+                <a:avLst/>
+              </a:prstGeom>
+            </p:spPr>
+          </p:pic>
+        </mc:Fallback>
+      </mc:AlternateContent>
+      <p:sp>
+        <p:nvSpPr>
+          <p:cNvPr id="30" name="TextBox 29">
+            <a:extLst>
+              <a:ext uri="{FF2B5EF4-FFF2-40B4-BE49-F238E27FC236}">
+                <a16:creationId xmlns:a16="http://schemas.microsoft.com/office/drawing/2014/main" id="{848E8114-DD77-829C-EF91-5EB425F1A430}"/>
+              </a:ext>
+            </a:extLst>
+          </p:cNvPr>
+          <p:cNvSpPr txBox="1"/>
+          <p:nvPr/>
+        </p:nvSpPr>
+        <p:spPr>
+          <a:xfrm>
+            <a:off x="804672" y="5385816"/>
+            <a:ext cx="1764792" cy="369332"/>
+          </a:xfrm>
+          <a:prstGeom prst="rect">
+            <a:avLst/>
+          </a:prstGeom>
+          <a:noFill/>
+        </p:spPr>
+        <p:txBody>
+          <a:bodyPr wrap="square" rtlCol="0">
+            <a:spAutoFit/>
+          </a:bodyPr>
+          <a:lstStyle/>
+          <a:p>
+            <a:r>
+              <a:rPr lang="it-IT" dirty="0" err="1"/>
+              <a:t>choices</a:t>
+            </a:r>
+            <a:endParaRPr lang="it-IT" dirty="0"/>
+          </a:p>
+        </p:txBody>
+      </p:sp>
+    </p:spTree>
+    <p:extLst>
+      <p:ext uri="{BB962C8B-B14F-4D97-AF65-F5344CB8AC3E}">
+        <p14:creationId xmlns:p14="http://schemas.microsoft.com/office/powerpoint/2010/main" val="346338675"/>
+      </p:ext>
+    </p:extLst>
+  </p:cSld>
+  <p:clrMapOvr>
+    <a:masterClrMapping/>
+  </p:clrMapOvr>
+</p:sld>
+</file>
+
+<file path=ppt/slides/slide53.xml><?xml version="1.0" encoding="utf-8"?>
+<p:sld xmlns:a="http://schemas.openxmlformats.org/drawingml/2006/main" xmlns:r="http://schemas.openxmlformats.org/officeDocument/2006/relationships" xmlns:p="http://schemas.openxmlformats.org/presentationml/2006/main">
+  <p:cSld>
+    <p:spTree>
+      <p:nvGrpSpPr>
+        <p:cNvPr id="1" name=""/>
+        <p:cNvGrpSpPr/>
+        <p:nvPr/>
+      </p:nvGrpSpPr>
+      <p:grpSpPr>
+        <a:xfrm>
+          <a:off x="0" y="0"/>
+          <a:ext cx="0" cy="0"/>
+          <a:chOff x="0" y="0"/>
+          <a:chExt cx="0" cy="0"/>
+        </a:xfrm>
+      </p:grpSpPr>
+      <p:pic>
+        <p:nvPicPr>
+          <p:cNvPr id="3" name="Picture 2">
+            <a:extLst>
+              <a:ext uri="{FF2B5EF4-FFF2-40B4-BE49-F238E27FC236}">
+                <a16:creationId xmlns:a16="http://schemas.microsoft.com/office/drawing/2014/main" id="{59A1DCD7-ECBB-22B3-027E-B108BF367ED0}"/>
+              </a:ext>
+            </a:extLst>
+          </p:cNvPr>
+          <p:cNvPicPr>
+            <a:picLocks noChangeAspect="1"/>
+          </p:cNvPicPr>
+          <p:nvPr/>
+        </p:nvPicPr>
+        <p:blipFill>
+          <a:blip r:embed="rId2"/>
+          <a:stretch>
+            <a:fillRect/>
+          </a:stretch>
+        </p:blipFill>
+        <p:spPr>
+          <a:xfrm>
+            <a:off x="0" y="672368"/>
+            <a:ext cx="12192000" cy="5513264"/>
+          </a:xfrm>
+          <a:prstGeom prst="rect">
+            <a:avLst/>
+          </a:prstGeom>
+        </p:spPr>
+      </p:pic>
+    </p:spTree>
+    <p:extLst>
+      <p:ext uri="{BB962C8B-B14F-4D97-AF65-F5344CB8AC3E}">
+        <p14:creationId xmlns:p14="http://schemas.microsoft.com/office/powerpoint/2010/main" val="1276073025"/>
+      </p:ext>
+    </p:extLst>
+  </p:cSld>
+  <p:clrMapOvr>
+    <a:masterClrMapping/>
+  </p:clrMapOvr>
+</p:sld>
+</file>
+
+<file path=ppt/slides/slide54.xml><?xml version="1.0" encoding="utf-8"?>
+<p:sld xmlns:a="http://schemas.openxmlformats.org/drawingml/2006/main" xmlns:r="http://schemas.openxmlformats.org/officeDocument/2006/relationships" xmlns:p="http://schemas.openxmlformats.org/presentationml/2006/main">
+  <p:cSld>
+    <p:spTree>
+      <p:nvGrpSpPr>
+        <p:cNvPr id="1" name=""/>
+        <p:cNvGrpSpPr/>
+        <p:nvPr/>
+      </p:nvGrpSpPr>
+      <p:grpSpPr>
+        <a:xfrm>
+          <a:off x="0" y="0"/>
+          <a:ext cx="0" cy="0"/>
+          <a:chOff x="0" y="0"/>
+          <a:chExt cx="0" cy="0"/>
+        </a:xfrm>
+      </p:grpSpPr>
+      <p:sp>
+        <p:nvSpPr>
+          <p:cNvPr id="2" name="Title 1">
+            <a:extLst>
+              <a:ext uri="{FF2B5EF4-FFF2-40B4-BE49-F238E27FC236}">
+                <a16:creationId xmlns:a16="http://schemas.microsoft.com/office/drawing/2014/main" id="{8C8DD76B-3DCC-BEBA-D3A3-52F987F28D15}"/>
+              </a:ext>
+            </a:extLst>
+          </p:cNvPr>
+          <p:cNvSpPr>
+            <a:spLocks noGrp="1"/>
+          </p:cNvSpPr>
+          <p:nvPr>
+            <p:ph type="title"/>
+          </p:nvPr>
+        </p:nvSpPr>
+        <p:spPr/>
+        <p:txBody>
+          <a:bodyPr/>
+          <a:lstStyle/>
+          <a:p>
+            <a:r>
+              <a:rPr lang="it-IT" dirty="0"/>
+              <a:t>[just to </a:t>
+            </a:r>
+            <a:r>
+              <a:rPr lang="it-IT" dirty="0" err="1"/>
+              <a:t>have</a:t>
+            </a:r>
+            <a:r>
+              <a:rPr lang="it-IT" dirty="0"/>
+              <a:t> </a:t>
+            </a:r>
+            <a:r>
+              <a:rPr lang="it-IT" dirty="0" err="1"/>
+              <a:t>them</a:t>
+            </a:r>
+            <a:r>
+              <a:rPr lang="it-IT" dirty="0"/>
+              <a:t> ready]</a:t>
+            </a:r>
+          </a:p>
+        </p:txBody>
+      </p:sp>
+      <p:sp>
+        <p:nvSpPr>
+          <p:cNvPr id="3" name="Content Placeholder 2">
+            <a:extLst>
+              <a:ext uri="{FF2B5EF4-FFF2-40B4-BE49-F238E27FC236}">
+                <a16:creationId xmlns:a16="http://schemas.microsoft.com/office/drawing/2014/main" id="{C99A4C52-E725-B636-7CF6-F4D26501DF42}"/>
+              </a:ext>
+            </a:extLst>
+          </p:cNvPr>
+          <p:cNvSpPr>
+            <a:spLocks noGrp="1"/>
+          </p:cNvSpPr>
+          <p:nvPr>
+            <p:ph sz="half" idx="1"/>
+          </p:nvPr>
+        </p:nvSpPr>
+        <p:spPr/>
+        <p:txBody>
+          <a:bodyPr>
+            <a:normAutofit fontScale="70000" lnSpcReduction="20000"/>
+          </a:bodyPr>
+          <a:lstStyle/>
+          <a:p>
+            <a:pPr marL="0" indent="0">
+              <a:buNone/>
+            </a:pPr>
+            <a:r>
+              <a:rPr lang="it-IT" dirty="0">
+                <a:hlinkClick r:id="rId2"/>
+              </a:rPr>
+              <a:t>https://www.bellasartes.gob.ar/media/uploads/coleccion/7966.jpg</a:t>
+            </a:r>
+            <a:endParaRPr lang="it-IT" dirty="0"/>
+          </a:p>
+          <a:p>
+            <a:pPr marL="0" indent="0">
+              <a:buNone/>
+            </a:pPr>
+            <a:r>
+              <a:rPr lang="it-IT" dirty="0">
+                <a:hlinkClick r:id="rId3"/>
+              </a:rPr>
+              <a:t>https://www.3minutosdearte.com/wp-content/uploads/2018/09/Klee-Magia-de-los-peces-1925-e1633369586262.jpg</a:t>
+            </a:r>
+            <a:endParaRPr lang="it-IT" dirty="0"/>
+          </a:p>
+          <a:p>
+            <a:pPr marL="0" indent="0">
+              <a:buNone/>
+            </a:pPr>
+            <a:r>
+              <a:rPr lang="it-IT" dirty="0">
+                <a:hlinkClick r:id="rId4"/>
+              </a:rPr>
+              <a:t>https://es.wahooart.com/Art.nsf/O/8XYQN9/$File/Paul-Klee-Landscape-with-Yellow-Birds.jpg</a:t>
+            </a:r>
+            <a:endParaRPr lang="it-IT" dirty="0"/>
+          </a:p>
+          <a:p>
+            <a:pPr marL="0" indent="0">
+              <a:buNone/>
+            </a:pPr>
+            <a:r>
+              <a:rPr lang="it-IT" dirty="0">
+                <a:hlinkClick r:id="rId5"/>
+              </a:rPr>
+              <a:t>https://www.artmajeur.com/medias/mini/t/o/tony-rubino/artwork/15522313_klee-burggarten-1919-painting-in-high-resolution-by-paul-klee-original-from-the-kunstmuseum-basel.jpg</a:t>
+            </a:r>
+            <a:endParaRPr lang="it-IT" dirty="0"/>
+          </a:p>
+          <a:p>
+            <a:pPr marL="0" indent="0">
+              <a:buNone/>
+            </a:pPr>
+            <a:r>
+              <a:rPr lang="it-IT" dirty="0">
+                <a:hlinkClick r:id="rId6"/>
+              </a:rPr>
+              <a:t>https://image.invaluable.com/housePhotos/ROGALLERY/49/736249/H4175-L309842541.jpg</a:t>
+            </a:r>
+            <a:endParaRPr lang="it-IT" dirty="0"/>
+          </a:p>
+          <a:p>
+            <a:pPr marL="0" indent="0">
+              <a:buNone/>
+            </a:pPr>
+            <a:endParaRPr lang="it-IT" dirty="0"/>
+          </a:p>
+        </p:txBody>
+      </p:sp>
+      <p:sp>
+        <p:nvSpPr>
+          <p:cNvPr id="4" name="Content Placeholder 3">
+            <a:extLst>
+              <a:ext uri="{FF2B5EF4-FFF2-40B4-BE49-F238E27FC236}">
+                <a16:creationId xmlns:a16="http://schemas.microsoft.com/office/drawing/2014/main" id="{EC217578-7E02-3FC2-3B24-AB002BAAEAF3}"/>
               </a:ext>
             </a:extLst>
           </p:cNvPr>
@@ -19852,19 +21555,511 @@
         </p:nvSpPr>
         <p:spPr/>
         <p:txBody>
+          <a:bodyPr>
+            <a:normAutofit fontScale="70000" lnSpcReduction="20000"/>
+          </a:bodyPr>
+          <a:lstStyle/>
+          <a:p>
+            <a:pPr marL="0" indent="0">
+              <a:buNone/>
+            </a:pPr>
+            <a:r>
+              <a:rPr lang="it-IT" dirty="0">
+                <a:hlinkClick r:id="rId7"/>
+              </a:rPr>
+              <a:t>https://www.biografiasyvidas.com/biografia/k/fotos/kandinsky_4.jpg</a:t>
+            </a:r>
+            <a:endParaRPr lang="it-IT" dirty="0"/>
+          </a:p>
+          <a:p>
+            <a:pPr marL="0" indent="0">
+              <a:buNone/>
+            </a:pPr>
+            <a:r>
+              <a:rPr lang="it-IT" dirty="0">
+                <a:hlinkClick r:id="rId8"/>
+              </a:rPr>
+              <a:t>https://upload.wikimedia.org/wikipedia/commons/f/f0/Vassily_Kandinsky%2C_1923_-_Circles_in_a_Circle.jpg</a:t>
+            </a:r>
+            <a:endParaRPr lang="it-IT" dirty="0"/>
+          </a:p>
+          <a:p>
+            <a:pPr marL="0" indent="0">
+              <a:buNone/>
+            </a:pPr>
+            <a:r>
+              <a:rPr lang="it-IT" dirty="0">
+                <a:hlinkClick r:id="rId9"/>
+              </a:rPr>
+              <a:t>https://cdn.pixabay.com/photo/2021/05/24/20/36/wassily-kandinsky-6280547_1280.jpg</a:t>
+            </a:r>
+            <a:endParaRPr lang="it-IT" dirty="0"/>
+          </a:p>
+          <a:p>
+            <a:pPr marL="0" indent="0">
+              <a:buNone/>
+            </a:pPr>
+            <a:r>
+              <a:rPr lang="it-IT" dirty="0">
+                <a:hlinkClick r:id="rId10"/>
+              </a:rPr>
+              <a:t>https://www.artmajeur.com/medias/standard/a/d/administrator/blog/6448f069731476.45206248_wassily-kandinsky-composition-7.jpg</a:t>
+            </a:r>
+            <a:endParaRPr lang="it-IT" dirty="0"/>
+          </a:p>
+          <a:p>
+            <a:pPr marL="0" indent="0">
+              <a:buNone/>
+            </a:pPr>
+            <a:r>
+              <a:rPr lang="it-IT" dirty="0">
+                <a:hlinkClick r:id="rId11"/>
+              </a:rPr>
+              <a:t>https://www.nacion.com/resizer/I265CujoyKVOSEa7IStTSuNqm5s=/1440x0/filters:format(png):quality(70)/cloudfront-us-east-1.images.arcpublishing.com/gruponacion/CW7JQBRSA5HVVETEJVN3HVRIC4.png</a:t>
+            </a:r>
+            <a:endParaRPr lang="it-IT" dirty="0"/>
+          </a:p>
+          <a:p>
+            <a:pPr marL="0" indent="0">
+              <a:buNone/>
+            </a:pPr>
+            <a:endParaRPr lang="it-IT" dirty="0"/>
+          </a:p>
+        </p:txBody>
+      </p:sp>
+    </p:spTree>
+    <p:extLst>
+      <p:ext uri="{BB962C8B-B14F-4D97-AF65-F5344CB8AC3E}">
+        <p14:creationId xmlns:p14="http://schemas.microsoft.com/office/powerpoint/2010/main" val="3702255133"/>
+      </p:ext>
+    </p:extLst>
+  </p:cSld>
+  <p:clrMapOvr>
+    <a:masterClrMapping/>
+  </p:clrMapOvr>
+</p:sld>
+</file>
+
+<file path=ppt/slides/slide55.xml><?xml version="1.0" encoding="utf-8"?>
+<p:sld xmlns:a="http://schemas.openxmlformats.org/drawingml/2006/main" xmlns:r="http://schemas.openxmlformats.org/officeDocument/2006/relationships" xmlns:p="http://schemas.openxmlformats.org/presentationml/2006/main">
+  <p:cSld>
+    <p:spTree>
+      <p:nvGrpSpPr>
+        <p:cNvPr id="1" name=""/>
+        <p:cNvGrpSpPr/>
+        <p:nvPr/>
+      </p:nvGrpSpPr>
+      <p:grpSpPr>
+        <a:xfrm>
+          <a:off x="0" y="0"/>
+          <a:ext cx="0" cy="0"/>
+          <a:chOff x="0" y="0"/>
+          <a:chExt cx="0" cy="0"/>
+        </a:xfrm>
+      </p:grpSpPr>
+      <p:pic>
+        <p:nvPicPr>
+          <p:cNvPr id="6" name="Picture 5">
+            <a:extLst>
+              <a:ext uri="{FF2B5EF4-FFF2-40B4-BE49-F238E27FC236}">
+                <a16:creationId xmlns:a16="http://schemas.microsoft.com/office/drawing/2014/main" id="{9C8509A9-9EF5-FAF9-A5B0-F249D056FE3E}"/>
+              </a:ext>
+            </a:extLst>
+          </p:cNvPr>
+          <p:cNvPicPr>
+            <a:picLocks noChangeAspect="1"/>
+          </p:cNvPicPr>
+          <p:nvPr/>
+        </p:nvPicPr>
+        <p:blipFill>
+          <a:blip r:embed="rId2"/>
+          <a:stretch>
+            <a:fillRect/>
+          </a:stretch>
+        </p:blipFill>
+        <p:spPr>
+          <a:xfrm>
+            <a:off x="1514286" y="0"/>
+            <a:ext cx="9163428" cy="6858000"/>
+          </a:xfrm>
+          <a:prstGeom prst="rect">
+            <a:avLst/>
+          </a:prstGeom>
+        </p:spPr>
+      </p:pic>
+      <mc:AlternateContent xmlns:mc="http://schemas.openxmlformats.org/markup-compatibility/2006">
+        <mc:Choice xmlns:p14="http://schemas.microsoft.com/office/powerpoint/2010/main" xmlns:aink="http://schemas.microsoft.com/office/drawing/2016/ink" Requires="p14 aink">
+          <p:contentPart p14:bwMode="auto" r:id="rId3">
+            <p14:nvContentPartPr>
+              <p14:cNvPr id="7" name="Ink 6">
+                <a:extLst>
+                  <a:ext uri="{FF2B5EF4-FFF2-40B4-BE49-F238E27FC236}">
+                    <a16:creationId xmlns:a16="http://schemas.microsoft.com/office/drawing/2014/main" id="{D1788D5E-3E97-2C81-3C71-18B64D512C19}"/>
+                  </a:ext>
+                </a:extLst>
+              </p14:cNvPr>
+              <p14:cNvContentPartPr/>
+              <p14:nvPr/>
+            </p14:nvContentPartPr>
+            <p14:xfrm>
+              <a:off x="9060048" y="1269504"/>
+              <a:ext cx="624240" cy="587520"/>
+            </p14:xfrm>
+          </p:contentPart>
+        </mc:Choice>
+        <mc:Fallback>
+          <p:pic>
+            <p:nvPicPr>
+              <p:cNvPr id="7" name="Ink 6">
+                <a:extLst>
+                  <a:ext uri="{FF2B5EF4-FFF2-40B4-BE49-F238E27FC236}">
+                    <a16:creationId xmlns:a16="http://schemas.microsoft.com/office/drawing/2014/main" id="{D1788D5E-3E97-2C81-3C71-18B64D512C19}"/>
+                  </a:ext>
+                </a:extLst>
+              </p:cNvPr>
+              <p:cNvPicPr/>
+              <p:nvPr/>
+            </p:nvPicPr>
+            <p:blipFill>
+              <a:blip r:embed="rId4"/>
+              <a:stretch>
+                <a:fillRect/>
+              </a:stretch>
+            </p:blipFill>
+            <p:spPr>
+              <a:xfrm>
+                <a:off x="9024408" y="1053864"/>
+                <a:ext cx="695880" cy="1019160"/>
+              </a:xfrm>
+              <a:prstGeom prst="rect">
+                <a:avLst/>
+              </a:prstGeom>
+            </p:spPr>
+          </p:pic>
+        </mc:Fallback>
+      </mc:AlternateContent>
+      <mc:AlternateContent xmlns:mc="http://schemas.openxmlformats.org/markup-compatibility/2006">
+        <mc:Choice xmlns:p14="http://schemas.microsoft.com/office/powerpoint/2010/main" xmlns:aink="http://schemas.microsoft.com/office/drawing/2016/ink" Requires="p14 aink">
+          <p:contentPart p14:bwMode="auto" r:id="rId5">
+            <p14:nvContentPartPr>
+              <p14:cNvPr id="8" name="Ink 7">
+                <a:extLst>
+                  <a:ext uri="{FF2B5EF4-FFF2-40B4-BE49-F238E27FC236}">
+                    <a16:creationId xmlns:a16="http://schemas.microsoft.com/office/drawing/2014/main" id="{0C91F85E-71ED-1C05-B73F-A51D86168300}"/>
+                  </a:ext>
+                </a:extLst>
+              </p14:cNvPr>
+              <p14:cNvContentPartPr/>
+              <p14:nvPr/>
+            </p14:nvContentPartPr>
+            <p14:xfrm>
+              <a:off x="9481248" y="1784304"/>
+              <a:ext cx="348840" cy="421200"/>
+            </p14:xfrm>
+          </p:contentPart>
+        </mc:Choice>
+        <mc:Fallback>
+          <p:pic>
+            <p:nvPicPr>
+              <p:cNvPr id="8" name="Ink 7">
+                <a:extLst>
+                  <a:ext uri="{FF2B5EF4-FFF2-40B4-BE49-F238E27FC236}">
+                    <a16:creationId xmlns:a16="http://schemas.microsoft.com/office/drawing/2014/main" id="{0C91F85E-71ED-1C05-B73F-A51D86168300}"/>
+                  </a:ext>
+                </a:extLst>
+              </p:cNvPr>
+              <p:cNvPicPr/>
+              <p:nvPr/>
+            </p:nvPicPr>
+            <p:blipFill>
+              <a:blip r:embed="rId6"/>
+              <a:stretch>
+                <a:fillRect/>
+              </a:stretch>
+            </p:blipFill>
+            <p:spPr>
+              <a:xfrm>
+                <a:off x="9445608" y="1568304"/>
+                <a:ext cx="420480" cy="852840"/>
+              </a:xfrm>
+              <a:prstGeom prst="rect">
+                <a:avLst/>
+              </a:prstGeom>
+            </p:spPr>
+          </p:pic>
+        </mc:Fallback>
+      </mc:AlternateContent>
+      <mc:AlternateContent xmlns:mc="http://schemas.openxmlformats.org/markup-compatibility/2006">
+        <mc:Choice xmlns:p14="http://schemas.microsoft.com/office/powerpoint/2010/main" xmlns:aink="http://schemas.microsoft.com/office/drawing/2016/ink" Requires="p14 aink">
+          <p:contentPart p14:bwMode="auto" r:id="rId7">
+            <p14:nvContentPartPr>
+              <p14:cNvPr id="9" name="Ink 8">
+                <a:extLst>
+                  <a:ext uri="{FF2B5EF4-FFF2-40B4-BE49-F238E27FC236}">
+                    <a16:creationId xmlns:a16="http://schemas.microsoft.com/office/drawing/2014/main" id="{F6FA3E29-9FB9-C3E6-7FCD-0339A6ECEFC8}"/>
+                  </a:ext>
+                </a:extLst>
+              </p14:cNvPr>
+              <p14:cNvContentPartPr/>
+              <p14:nvPr/>
+            </p14:nvContentPartPr>
+            <p14:xfrm>
+              <a:off x="3739608" y="2002104"/>
+              <a:ext cx="677520" cy="428760"/>
+            </p14:xfrm>
+          </p:contentPart>
+        </mc:Choice>
+        <mc:Fallback>
+          <p:pic>
+            <p:nvPicPr>
+              <p:cNvPr id="9" name="Ink 8">
+                <a:extLst>
+                  <a:ext uri="{FF2B5EF4-FFF2-40B4-BE49-F238E27FC236}">
+                    <a16:creationId xmlns:a16="http://schemas.microsoft.com/office/drawing/2014/main" id="{F6FA3E29-9FB9-C3E6-7FCD-0339A6ECEFC8}"/>
+                  </a:ext>
+                </a:extLst>
+              </p:cNvPr>
+              <p:cNvPicPr/>
+              <p:nvPr/>
+            </p:nvPicPr>
+            <p:blipFill>
+              <a:blip r:embed="rId8"/>
+              <a:stretch>
+                <a:fillRect/>
+              </a:stretch>
+            </p:blipFill>
+            <p:spPr>
+              <a:xfrm>
+                <a:off x="3703608" y="1786104"/>
+                <a:ext cx="749160" cy="860400"/>
+              </a:xfrm>
+              <a:prstGeom prst="rect">
+                <a:avLst/>
+              </a:prstGeom>
+            </p:spPr>
+          </p:pic>
+        </mc:Fallback>
+      </mc:AlternateContent>
+      <p:sp>
+        <p:nvSpPr>
+          <p:cNvPr id="10" name="TextBox 9">
+            <a:extLst>
+              <a:ext uri="{FF2B5EF4-FFF2-40B4-BE49-F238E27FC236}">
+                <a16:creationId xmlns:a16="http://schemas.microsoft.com/office/drawing/2014/main" id="{AF617172-7483-DAE1-3E11-3F1145F32248}"/>
+              </a:ext>
+            </a:extLst>
+          </p:cNvPr>
+          <p:cNvSpPr txBox="1"/>
+          <p:nvPr/>
+        </p:nvSpPr>
+        <p:spPr>
+          <a:xfrm>
+            <a:off x="1024128" y="2496312"/>
+            <a:ext cx="1536192" cy="1477328"/>
+          </a:xfrm>
+          <a:prstGeom prst="rect">
+            <a:avLst/>
+          </a:prstGeom>
+          <a:noFill/>
+        </p:spPr>
+        <p:txBody>
+          <a:bodyPr wrap="square" rtlCol="0">
+            <a:spAutoFit/>
+          </a:bodyPr>
+          <a:lstStyle/>
+          <a:p>
+            <a:r>
+              <a:rPr lang="it-IT" dirty="0" err="1"/>
+              <a:t>We</a:t>
+            </a:r>
+            <a:r>
+              <a:rPr lang="it-IT" dirty="0"/>
+              <a:t> </a:t>
+            </a:r>
+            <a:r>
+              <a:rPr lang="it-IT" dirty="0" err="1"/>
+              <a:t>add</a:t>
+            </a:r>
+            <a:r>
+              <a:rPr lang="it-IT" dirty="0"/>
+              <a:t> tags to </a:t>
+            </a:r>
+            <a:r>
+              <a:rPr lang="it-IT" dirty="0" err="1"/>
+              <a:t>dynamically</a:t>
+            </a:r>
+            <a:r>
+              <a:rPr lang="it-IT" dirty="0"/>
+              <a:t> </a:t>
+            </a:r>
+            <a:r>
+              <a:rPr lang="it-IT" dirty="0" err="1"/>
+              <a:t>adjust</a:t>
+            </a:r>
+            <a:r>
+              <a:rPr lang="it-IT" dirty="0"/>
+              <a:t> the text</a:t>
+            </a:r>
+          </a:p>
+        </p:txBody>
+      </p:sp>
+    </p:spTree>
+    <p:extLst>
+      <p:ext uri="{BB962C8B-B14F-4D97-AF65-F5344CB8AC3E}">
+        <p14:creationId xmlns:p14="http://schemas.microsoft.com/office/powerpoint/2010/main" val="2176782757"/>
+      </p:ext>
+    </p:extLst>
+  </p:cSld>
+  <p:clrMapOvr>
+    <a:masterClrMapping/>
+  </p:clrMapOvr>
+</p:sld>
+</file>
+
+<file path=ppt/slides/slide56.xml><?xml version="1.0" encoding="utf-8"?>
+<p:sld xmlns:a="http://schemas.openxmlformats.org/drawingml/2006/main" xmlns:r="http://schemas.openxmlformats.org/officeDocument/2006/relationships" xmlns:p="http://schemas.openxmlformats.org/presentationml/2006/main">
+  <p:cSld>
+    <p:spTree>
+      <p:nvGrpSpPr>
+        <p:cNvPr id="1" name="">
+          <a:extLst>
+            <a:ext uri="{FF2B5EF4-FFF2-40B4-BE49-F238E27FC236}">
+              <a16:creationId xmlns:a16="http://schemas.microsoft.com/office/drawing/2014/main" id="{FACF965F-CD4D-9511-5902-3B1FB0739D1F}"/>
+            </a:ext>
+          </a:extLst>
+        </p:cNvPr>
+        <p:cNvGrpSpPr/>
+        <p:nvPr/>
+      </p:nvGrpSpPr>
+      <p:grpSpPr>
+        <a:xfrm>
+          <a:off x="0" y="0"/>
+          <a:ext cx="0" cy="0"/>
+          <a:chOff x="0" y="0"/>
+          <a:chExt cx="0" cy="0"/>
+        </a:xfrm>
+      </p:grpSpPr>
+      <p:sp>
+        <p:nvSpPr>
+          <p:cNvPr id="4" name="Title 3">
+            <a:extLst>
+              <a:ext uri="{FF2B5EF4-FFF2-40B4-BE49-F238E27FC236}">
+                <a16:creationId xmlns:a16="http://schemas.microsoft.com/office/drawing/2014/main" id="{01A02D69-356C-EEB3-2F9D-975136273691}"/>
+              </a:ext>
+            </a:extLst>
+          </p:cNvPr>
+          <p:cNvSpPr>
+            <a:spLocks noGrp="1"/>
+          </p:cNvSpPr>
+          <p:nvPr>
+            <p:ph type="title"/>
+          </p:nvPr>
+        </p:nvSpPr>
+        <p:spPr/>
+        <p:txBody>
           <a:bodyPr/>
           <a:lstStyle/>
           <a:p>
-            <a:endParaRPr lang="it-IT"/>
+            <a:r>
+              <a:rPr lang="it-IT" dirty="0" err="1"/>
+              <a:t>Lecture</a:t>
+            </a:r>
+            <a:r>
+              <a:rPr lang="it-IT" dirty="0"/>
+              <a:t> 6</a:t>
+            </a:r>
           </a:p>
         </p:txBody>
       </p:sp>
       <p:sp>
         <p:nvSpPr>
-          <p:cNvPr id="5" name="Content Placeholder 4">
+          <p:cNvPr id="5" name="Text Placeholder 4">
             <a:extLst>
               <a:ext uri="{FF2B5EF4-FFF2-40B4-BE49-F238E27FC236}">
-                <a16:creationId xmlns:a16="http://schemas.microsoft.com/office/drawing/2014/main" id="{14B1D982-A21F-E64C-C4D5-5ED0E88FD2AA}"/>
+                <a16:creationId xmlns:a16="http://schemas.microsoft.com/office/drawing/2014/main" id="{148AD7C8-3BE6-EAE3-690B-B0CBE6352064}"/>
+              </a:ext>
+            </a:extLst>
+          </p:cNvPr>
+          <p:cNvSpPr>
+            <a:spLocks noGrp="1"/>
+          </p:cNvSpPr>
+          <p:nvPr>
+            <p:ph type="body" idx="1"/>
+          </p:nvPr>
+        </p:nvSpPr>
+        <p:spPr/>
+        <p:txBody>
+          <a:bodyPr/>
+          <a:lstStyle/>
+          <a:p>
+            <a:endParaRPr lang="it-IT"/>
+          </a:p>
+        </p:txBody>
+      </p:sp>
+    </p:spTree>
+    <p:extLst>
+      <p:ext uri="{BB962C8B-B14F-4D97-AF65-F5344CB8AC3E}">
+        <p14:creationId xmlns:p14="http://schemas.microsoft.com/office/powerpoint/2010/main" val="3893265511"/>
+      </p:ext>
+    </p:extLst>
+  </p:cSld>
+  <p:clrMapOvr>
+    <a:masterClrMapping/>
+  </p:clrMapOvr>
+</p:sld>
+</file>
+
+<file path=ppt/slides/slide57.xml><?xml version="1.0" encoding="utf-8"?>
+<p:sld xmlns:a="http://schemas.openxmlformats.org/drawingml/2006/main" xmlns:r="http://schemas.openxmlformats.org/officeDocument/2006/relationships" xmlns:p="http://schemas.openxmlformats.org/presentationml/2006/main">
+  <p:cSld>
+    <p:spTree>
+      <p:nvGrpSpPr>
+        <p:cNvPr id="1" name=""/>
+        <p:cNvGrpSpPr/>
+        <p:nvPr/>
+      </p:nvGrpSpPr>
+      <p:grpSpPr>
+        <a:xfrm>
+          <a:off x="0" y="0"/>
+          <a:ext cx="0" cy="0"/>
+          <a:chOff x="0" y="0"/>
+          <a:chExt cx="0" cy="0"/>
+        </a:xfrm>
+      </p:grpSpPr>
+      <p:sp>
+        <p:nvSpPr>
+          <p:cNvPr id="4" name="Title 3">
+            <a:extLst>
+              <a:ext uri="{FF2B5EF4-FFF2-40B4-BE49-F238E27FC236}">
+                <a16:creationId xmlns:a16="http://schemas.microsoft.com/office/drawing/2014/main" id="{96672916-8F60-A1FC-0580-601EA787F18F}"/>
+              </a:ext>
+            </a:extLst>
+          </p:cNvPr>
+          <p:cNvSpPr>
+            <a:spLocks noGrp="1"/>
+          </p:cNvSpPr>
+          <p:nvPr>
+            <p:ph type="title"/>
+          </p:nvPr>
+        </p:nvSpPr>
+        <p:spPr/>
+        <p:txBody>
+          <a:bodyPr/>
+          <a:lstStyle/>
+          <a:p>
+            <a:r>
+              <a:rPr lang="it-IT" dirty="0"/>
+              <a:t>Single switch</a:t>
+            </a:r>
+          </a:p>
+        </p:txBody>
+      </p:sp>
+      <p:sp>
+        <p:nvSpPr>
+          <p:cNvPr id="6" name="Content Placeholder 5">
+            <a:extLst>
+              <a:ext uri="{FF2B5EF4-FFF2-40B4-BE49-F238E27FC236}">
+                <a16:creationId xmlns:a16="http://schemas.microsoft.com/office/drawing/2014/main" id="{83AEC8A4-5691-3EBC-717A-7454DAB9002B}"/>
               </a:ext>
             </a:extLst>
           </p:cNvPr>
@@ -19877,17 +22072,857 @@
         </p:nvSpPr>
         <p:spPr/>
         <p:txBody>
+          <a:bodyPr>
+            <a:normAutofit/>
+          </a:bodyPr>
+          <a:lstStyle/>
+          <a:p>
+            <a:r>
+              <a:rPr lang="it-IT" sz="2000" dirty="0" err="1"/>
+              <a:t>We</a:t>
+            </a:r>
+            <a:r>
+              <a:rPr lang="it-IT" sz="2000" dirty="0"/>
+              <a:t> </a:t>
+            </a:r>
+            <a:r>
+              <a:rPr lang="it-IT" sz="2000" dirty="0" err="1"/>
+              <a:t>have</a:t>
+            </a:r>
+            <a:r>
+              <a:rPr lang="it-IT" sz="2000" dirty="0"/>
+              <a:t> </a:t>
+            </a:r>
+            <a:r>
+              <a:rPr lang="it-IT" sz="2000" dirty="0" err="1"/>
+              <a:t>this</a:t>
+            </a:r>
+            <a:r>
+              <a:rPr lang="it-IT" sz="2000" dirty="0"/>
+              <a:t> MDG </a:t>
+            </a:r>
+            <a:r>
+              <a:rPr lang="it-IT" sz="2000" dirty="0" err="1"/>
+              <a:t>which</a:t>
+            </a:r>
+            <a:r>
+              <a:rPr lang="it-IT" sz="2000" dirty="0"/>
+              <a:t> </a:t>
+            </a:r>
+            <a:r>
+              <a:rPr lang="it-IT" sz="2000" dirty="0" err="1"/>
+              <a:t>is</a:t>
+            </a:r>
+            <a:r>
+              <a:rPr lang="it-IT" sz="2000" dirty="0"/>
+              <a:t> an MPL</a:t>
+            </a:r>
+          </a:p>
+          <a:p>
+            <a:r>
+              <a:rPr lang="it-IT" sz="2000" dirty="0" err="1"/>
+              <a:t>Especially</a:t>
+            </a:r>
+            <a:r>
+              <a:rPr lang="it-IT" sz="2000" dirty="0"/>
+              <a:t> for online </a:t>
+            </a:r>
+            <a:r>
+              <a:rPr lang="it-IT" sz="2000" dirty="0" err="1"/>
+              <a:t>exp</a:t>
+            </a:r>
+            <a:r>
+              <a:rPr lang="it-IT" sz="2000" dirty="0"/>
+              <a:t>, </a:t>
+            </a:r>
+            <a:r>
+              <a:rPr lang="it-IT" sz="2000" dirty="0" err="1"/>
+              <a:t>you</a:t>
+            </a:r>
+            <a:r>
+              <a:rPr lang="it-IT" sz="2000" dirty="0"/>
+              <a:t> can end up with multiple switch </a:t>
+            </a:r>
+            <a:r>
+              <a:rPr lang="it-IT" sz="2000" dirty="0" err="1"/>
+              <a:t>because</a:t>
+            </a:r>
+            <a:r>
+              <a:rPr lang="it-IT" sz="2000" dirty="0"/>
+              <a:t> of </a:t>
+            </a:r>
+            <a:r>
+              <a:rPr lang="it-IT" sz="2000" dirty="0" err="1"/>
+              <a:t>tiredom</a:t>
+            </a:r>
+            <a:r>
+              <a:rPr lang="it-IT" sz="2000" dirty="0"/>
+              <a:t>, </a:t>
+            </a:r>
+            <a:r>
+              <a:rPr lang="it-IT" sz="2000" dirty="0" err="1"/>
+              <a:t>lack</a:t>
+            </a:r>
+            <a:r>
+              <a:rPr lang="it-IT" sz="2000" dirty="0"/>
+              <a:t> of </a:t>
+            </a:r>
+            <a:r>
+              <a:rPr lang="it-IT" sz="2000" dirty="0" err="1"/>
+              <a:t>attentions</a:t>
+            </a:r>
+            <a:r>
+              <a:rPr lang="it-IT" sz="2000" dirty="0"/>
+              <a:t> </a:t>
+            </a:r>
+            <a:r>
+              <a:rPr lang="it-IT" sz="2000" dirty="0" err="1"/>
+              <a:t>etc</a:t>
+            </a:r>
+            <a:endParaRPr lang="it-IT" sz="2000" dirty="0"/>
+          </a:p>
+          <a:p>
+            <a:r>
+              <a:rPr lang="it-IT" sz="2000" dirty="0" err="1"/>
+              <a:t>We</a:t>
+            </a:r>
+            <a:r>
+              <a:rPr lang="it-IT" sz="2000" dirty="0"/>
+              <a:t> can force single switch, </a:t>
+            </a:r>
+            <a:r>
+              <a:rPr lang="it-IT" sz="2000" dirty="0" err="1"/>
+              <a:t>especially</a:t>
+            </a:r>
+            <a:r>
+              <a:rPr lang="it-IT" sz="2000" dirty="0"/>
+              <a:t> </a:t>
+            </a:r>
+            <a:r>
+              <a:rPr lang="it-IT" sz="2000" dirty="0" err="1"/>
+              <a:t>if</a:t>
+            </a:r>
+            <a:r>
+              <a:rPr lang="it-IT" sz="2000" dirty="0"/>
+              <a:t> </a:t>
+            </a:r>
+            <a:r>
+              <a:rPr lang="it-IT" sz="2000" dirty="0" err="1"/>
+              <a:t>we</a:t>
+            </a:r>
+            <a:r>
+              <a:rPr lang="it-IT" sz="2000" dirty="0"/>
+              <a:t> </a:t>
+            </a:r>
+            <a:r>
+              <a:rPr lang="it-IT" sz="2000" dirty="0" err="1"/>
+              <a:t>measure</a:t>
+            </a:r>
+            <a:r>
+              <a:rPr lang="it-IT" sz="2000" dirty="0"/>
+              <a:t> multiple </a:t>
+            </a:r>
+            <a:r>
+              <a:rPr lang="it-IT" sz="2000" dirty="0" err="1"/>
+              <a:t>things</a:t>
+            </a:r>
+            <a:r>
+              <a:rPr lang="it-IT" sz="2000" dirty="0"/>
+              <a:t> (</a:t>
+            </a:r>
+            <a:r>
+              <a:rPr lang="it-IT" sz="2000" dirty="0" err="1"/>
+              <a:t>see</a:t>
+            </a:r>
+            <a:r>
+              <a:rPr lang="it-IT" sz="2000" dirty="0"/>
+              <a:t> </a:t>
+            </a:r>
+            <a:r>
+              <a:rPr lang="it-IT" sz="2000" dirty="0" err="1"/>
+              <a:t>Econographics</a:t>
+            </a:r>
+            <a:r>
+              <a:rPr lang="it-IT" sz="2000" dirty="0"/>
+              <a:t>)</a:t>
+            </a:r>
+          </a:p>
+        </p:txBody>
+      </p:sp>
+      <p:pic>
+        <p:nvPicPr>
+          <p:cNvPr id="9" name="Content Placeholder 8">
+            <a:extLst>
+              <a:ext uri="{FF2B5EF4-FFF2-40B4-BE49-F238E27FC236}">
+                <a16:creationId xmlns:a16="http://schemas.microsoft.com/office/drawing/2014/main" id="{58825B1A-81BE-AF09-A8C3-ED5E894935DF}"/>
+              </a:ext>
+            </a:extLst>
+          </p:cNvPr>
+          <p:cNvPicPr>
+            <a:picLocks noGrp="1" noChangeAspect="1"/>
+          </p:cNvPicPr>
+          <p:nvPr>
+            <p:ph sz="half" idx="2"/>
+          </p:nvPr>
+        </p:nvPicPr>
+        <p:blipFill>
+          <a:blip r:embed="rId2"/>
+          <a:stretch>
+            <a:fillRect/>
+          </a:stretch>
+        </p:blipFill>
+        <p:spPr>
+          <a:xfrm>
+            <a:off x="6172200" y="2219051"/>
+            <a:ext cx="5181600" cy="3564485"/>
+          </a:xfrm>
+        </p:spPr>
+      </p:pic>
+    </p:spTree>
+    <p:extLst>
+      <p:ext uri="{BB962C8B-B14F-4D97-AF65-F5344CB8AC3E}">
+        <p14:creationId xmlns:p14="http://schemas.microsoft.com/office/powerpoint/2010/main" val="3494744449"/>
+      </p:ext>
+    </p:extLst>
+  </p:cSld>
+  <p:clrMapOvr>
+    <a:masterClrMapping/>
+  </p:clrMapOvr>
+</p:sld>
+</file>
+
+<file path=ppt/slides/slide58.xml><?xml version="1.0" encoding="utf-8"?>
+<p:sld xmlns:a="http://schemas.openxmlformats.org/drawingml/2006/main" xmlns:r="http://schemas.openxmlformats.org/officeDocument/2006/relationships" xmlns:p="http://schemas.openxmlformats.org/presentationml/2006/main">
+  <p:cSld>
+    <p:spTree>
+      <p:nvGrpSpPr>
+        <p:cNvPr id="1" name=""/>
+        <p:cNvGrpSpPr/>
+        <p:nvPr/>
+      </p:nvGrpSpPr>
+      <p:grpSpPr>
+        <a:xfrm>
+          <a:off x="0" y="0"/>
+          <a:ext cx="0" cy="0"/>
+          <a:chOff x="0" y="0"/>
+          <a:chExt cx="0" cy="0"/>
+        </a:xfrm>
+      </p:grpSpPr>
+      <p:sp>
+        <p:nvSpPr>
+          <p:cNvPr id="2" name="Title 1">
+            <a:extLst>
+              <a:ext uri="{FF2B5EF4-FFF2-40B4-BE49-F238E27FC236}">
+                <a16:creationId xmlns:a16="http://schemas.microsoft.com/office/drawing/2014/main" id="{9A6A1F47-D245-F97B-C8D9-76CABD883356}"/>
+              </a:ext>
+            </a:extLst>
+          </p:cNvPr>
+          <p:cNvSpPr>
+            <a:spLocks noGrp="1"/>
+          </p:cNvSpPr>
+          <p:nvPr>
+            <p:ph type="title"/>
+          </p:nvPr>
+        </p:nvSpPr>
+        <p:spPr/>
+        <p:txBody>
           <a:bodyPr/>
           <a:lstStyle/>
           <a:p>
-            <a:endParaRPr lang="it-IT"/>
+            <a:r>
+              <a:rPr lang="it-IT" dirty="0"/>
+              <a:t>Single switch</a:t>
+            </a:r>
+          </a:p>
+        </p:txBody>
+      </p:sp>
+      <p:sp>
+        <p:nvSpPr>
+          <p:cNvPr id="3" name="Content Placeholder 2">
+            <a:extLst>
+              <a:ext uri="{FF2B5EF4-FFF2-40B4-BE49-F238E27FC236}">
+                <a16:creationId xmlns:a16="http://schemas.microsoft.com/office/drawing/2014/main" id="{122F9D84-20AF-D854-F8A6-BB62BAA5F830}"/>
+              </a:ext>
+            </a:extLst>
+          </p:cNvPr>
+          <p:cNvSpPr>
+            <a:spLocks noGrp="1"/>
+          </p:cNvSpPr>
+          <p:nvPr>
+            <p:ph sz="half" idx="1"/>
+          </p:nvPr>
+        </p:nvSpPr>
+        <p:spPr/>
+        <p:txBody>
+          <a:bodyPr>
+            <a:normAutofit/>
+          </a:bodyPr>
+          <a:lstStyle/>
+          <a:p>
+            <a:r>
+              <a:rPr lang="it-IT" sz="2000" dirty="0" err="1"/>
+              <a:t>Every</a:t>
+            </a:r>
+            <a:r>
+              <a:rPr lang="it-IT" sz="2000" dirty="0"/>
+              <a:t> time a </a:t>
+            </a:r>
+            <a:r>
+              <a:rPr lang="it-IT" sz="2000" dirty="0" err="1"/>
+              <a:t>left</a:t>
+            </a:r>
+            <a:r>
+              <a:rPr lang="it-IT" sz="2000" dirty="0"/>
+              <a:t> </a:t>
+            </a:r>
+            <a:r>
+              <a:rPr lang="it-IT" sz="2000" dirty="0" err="1"/>
+              <a:t>is</a:t>
+            </a:r>
+            <a:r>
+              <a:rPr lang="it-IT" sz="2000" dirty="0"/>
+              <a:t> </a:t>
+            </a:r>
+            <a:r>
+              <a:rPr lang="it-IT" sz="2000" dirty="0" err="1"/>
+              <a:t>selected</a:t>
+            </a:r>
+            <a:r>
+              <a:rPr lang="it-IT" sz="2000" dirty="0"/>
+              <a:t>, </a:t>
+            </a:r>
+            <a:r>
+              <a:rPr lang="it-IT" sz="2000" dirty="0" err="1"/>
+              <a:t>left</a:t>
+            </a:r>
+            <a:r>
+              <a:rPr lang="it-IT" sz="2000" dirty="0"/>
+              <a:t> </a:t>
+            </a:r>
+            <a:r>
+              <a:rPr lang="it-IT" sz="2000" dirty="0" err="1"/>
+              <a:t>is</a:t>
+            </a:r>
+            <a:r>
+              <a:rPr lang="it-IT" sz="2000" dirty="0"/>
+              <a:t> </a:t>
+            </a:r>
+            <a:r>
+              <a:rPr lang="it-IT" sz="2000" dirty="0" err="1"/>
+              <a:t>selected</a:t>
+            </a:r>
+            <a:r>
+              <a:rPr lang="it-IT" sz="2000" dirty="0"/>
+              <a:t> </a:t>
+            </a:r>
+            <a:r>
+              <a:rPr lang="it-IT" sz="2000" dirty="0" err="1"/>
+              <a:t>above</a:t>
+            </a:r>
+            <a:r>
+              <a:rPr lang="it-IT" sz="2000" dirty="0"/>
+              <a:t> and </a:t>
+            </a:r>
+            <a:r>
+              <a:rPr lang="it-IT" sz="2000" dirty="0" err="1"/>
+              <a:t>right</a:t>
+            </a:r>
+            <a:r>
+              <a:rPr lang="it-IT" sz="2000" dirty="0"/>
+              <a:t> </a:t>
+            </a:r>
+            <a:r>
+              <a:rPr lang="it-IT" sz="2000" dirty="0" err="1"/>
+              <a:t>below</a:t>
+            </a:r>
+            <a:r>
+              <a:rPr lang="it-IT" sz="2000" dirty="0"/>
+              <a:t>.</a:t>
+            </a:r>
+          </a:p>
+          <a:p>
+            <a:r>
+              <a:rPr lang="it-IT" sz="2000" dirty="0" err="1"/>
+              <a:t>Every</a:t>
+            </a:r>
+            <a:r>
+              <a:rPr lang="it-IT" sz="2000" dirty="0"/>
+              <a:t> time </a:t>
+            </a:r>
+            <a:r>
+              <a:rPr lang="it-IT" sz="2000" dirty="0" err="1"/>
+              <a:t>right</a:t>
+            </a:r>
+            <a:r>
+              <a:rPr lang="it-IT" sz="2000" dirty="0"/>
+              <a:t> </a:t>
+            </a:r>
+            <a:r>
+              <a:rPr lang="it-IT" sz="2000" dirty="0" err="1"/>
+              <a:t>is</a:t>
+            </a:r>
+            <a:r>
+              <a:rPr lang="it-IT" sz="2000" dirty="0"/>
+              <a:t> </a:t>
+            </a:r>
+            <a:r>
+              <a:rPr lang="it-IT" sz="2000" dirty="0" err="1"/>
+              <a:t>selected</a:t>
+            </a:r>
+            <a:r>
+              <a:rPr lang="it-IT" sz="2000" dirty="0"/>
+              <a:t>, </a:t>
+            </a:r>
+            <a:r>
+              <a:rPr lang="it-IT" sz="2000" dirty="0" err="1"/>
+              <a:t>right</a:t>
+            </a:r>
+            <a:r>
+              <a:rPr lang="it-IT" sz="2000" dirty="0"/>
+              <a:t> </a:t>
+            </a:r>
+            <a:r>
+              <a:rPr lang="it-IT" sz="2000" dirty="0" err="1"/>
+              <a:t>is</a:t>
+            </a:r>
+            <a:r>
+              <a:rPr lang="it-IT" sz="2000" dirty="0"/>
+              <a:t> </a:t>
+            </a:r>
+            <a:r>
+              <a:rPr lang="it-IT" sz="2000" dirty="0" err="1"/>
+              <a:t>selected</a:t>
+            </a:r>
+            <a:r>
+              <a:rPr lang="it-IT" sz="2000" dirty="0"/>
+              <a:t> </a:t>
+            </a:r>
+            <a:r>
+              <a:rPr lang="it-IT" sz="2000" dirty="0" err="1"/>
+              <a:t>below</a:t>
+            </a:r>
+            <a:r>
+              <a:rPr lang="it-IT" sz="2000" dirty="0"/>
+              <a:t> and </a:t>
+            </a:r>
+            <a:r>
+              <a:rPr lang="it-IT" sz="2000" dirty="0" err="1"/>
+              <a:t>left</a:t>
+            </a:r>
+            <a:r>
+              <a:rPr lang="it-IT" sz="2000" dirty="0"/>
+              <a:t> </a:t>
+            </a:r>
+            <a:r>
+              <a:rPr lang="it-IT" sz="2000" dirty="0" err="1"/>
+              <a:t>is</a:t>
+            </a:r>
+            <a:r>
+              <a:rPr lang="it-IT" sz="2000" dirty="0"/>
+              <a:t> </a:t>
+            </a:r>
+            <a:r>
+              <a:rPr lang="it-IT" sz="2000" dirty="0" err="1"/>
+              <a:t>selected</a:t>
+            </a:r>
+            <a:r>
+              <a:rPr lang="it-IT" sz="2000" dirty="0"/>
+              <a:t> </a:t>
+            </a:r>
+            <a:r>
+              <a:rPr lang="it-IT" sz="2000" dirty="0" err="1"/>
+              <a:t>above</a:t>
+            </a:r>
+            <a:endParaRPr lang="it-IT" sz="2000" dirty="0"/>
+          </a:p>
+          <a:p>
+            <a:r>
+              <a:rPr lang="it-IT" sz="2000" dirty="0" err="1"/>
+              <a:t>It</a:t>
+            </a:r>
+            <a:r>
+              <a:rPr lang="it-IT" sz="2000" dirty="0"/>
+              <a:t> </a:t>
+            </a:r>
+            <a:r>
+              <a:rPr lang="it-IT" sz="2000" dirty="0" err="1"/>
+              <a:t>should</a:t>
+            </a:r>
+            <a:r>
+              <a:rPr lang="it-IT" sz="2000" dirty="0"/>
+              <a:t> works </a:t>
+            </a:r>
+            <a:r>
+              <a:rPr lang="it-IT" sz="2000" dirty="0" err="1"/>
+              <a:t>at</a:t>
+            </a:r>
+            <a:r>
+              <a:rPr lang="it-IT" sz="2000" dirty="0"/>
+              <a:t> the </a:t>
+            </a:r>
+            <a:r>
+              <a:rPr lang="it-IT" sz="2000" dirty="0" err="1"/>
+              <a:t>extremes</a:t>
+            </a:r>
+            <a:r>
+              <a:rPr lang="it-IT" sz="2000" dirty="0"/>
+              <a:t>.</a:t>
+            </a:r>
+          </a:p>
+        </p:txBody>
+      </p:sp>
+      <p:pic>
+        <p:nvPicPr>
+          <p:cNvPr id="6" name="Content Placeholder 5">
+            <a:extLst>
+              <a:ext uri="{FF2B5EF4-FFF2-40B4-BE49-F238E27FC236}">
+                <a16:creationId xmlns:a16="http://schemas.microsoft.com/office/drawing/2014/main" id="{80CF0DDD-695F-0F35-DE78-DD51FB58E8E2}"/>
+              </a:ext>
+            </a:extLst>
+          </p:cNvPr>
+          <p:cNvPicPr>
+            <a:picLocks noGrp="1" noChangeAspect="1"/>
+          </p:cNvPicPr>
+          <p:nvPr>
+            <p:ph sz="half" idx="2"/>
+          </p:nvPr>
+        </p:nvPicPr>
+        <p:blipFill>
+          <a:blip r:embed="rId2"/>
+          <a:stretch>
+            <a:fillRect/>
+          </a:stretch>
+        </p:blipFill>
+        <p:spPr>
+          <a:xfrm>
+            <a:off x="6172200" y="1900173"/>
+            <a:ext cx="5181600" cy="4202242"/>
+          </a:xfrm>
+        </p:spPr>
+      </p:pic>
+    </p:spTree>
+    <p:extLst>
+      <p:ext uri="{BB962C8B-B14F-4D97-AF65-F5344CB8AC3E}">
+        <p14:creationId xmlns:p14="http://schemas.microsoft.com/office/powerpoint/2010/main" val="3469814822"/>
+      </p:ext>
+    </p:extLst>
+  </p:cSld>
+  <p:clrMapOvr>
+    <a:masterClrMapping/>
+  </p:clrMapOvr>
+</p:sld>
+</file>
+
+<file path=ppt/slides/slide59.xml><?xml version="1.0" encoding="utf-8"?>
+<p:sld xmlns:a="http://schemas.openxmlformats.org/drawingml/2006/main" xmlns:r="http://schemas.openxmlformats.org/officeDocument/2006/relationships" xmlns:p="http://schemas.openxmlformats.org/presentationml/2006/main">
+  <p:cSld>
+    <p:spTree>
+      <p:nvGrpSpPr>
+        <p:cNvPr id="1" name=""/>
+        <p:cNvGrpSpPr/>
+        <p:nvPr/>
+      </p:nvGrpSpPr>
+      <p:grpSpPr>
+        <a:xfrm>
+          <a:off x="0" y="0"/>
+          <a:ext cx="0" cy="0"/>
+          <a:chOff x="0" y="0"/>
+          <a:chExt cx="0" cy="0"/>
+        </a:xfrm>
+      </p:grpSpPr>
+      <p:sp>
+        <p:nvSpPr>
+          <p:cNvPr id="2" name="Title 1">
+            <a:extLst>
+              <a:ext uri="{FF2B5EF4-FFF2-40B4-BE49-F238E27FC236}">
+                <a16:creationId xmlns:a16="http://schemas.microsoft.com/office/drawing/2014/main" id="{CCC25797-A262-A1D2-039C-B3252AB47416}"/>
+              </a:ext>
+            </a:extLst>
+          </p:cNvPr>
+          <p:cNvSpPr>
+            <a:spLocks noGrp="1"/>
+          </p:cNvSpPr>
+          <p:nvPr>
+            <p:ph type="title"/>
+          </p:nvPr>
+        </p:nvSpPr>
+        <p:spPr/>
+        <p:txBody>
+          <a:bodyPr/>
+          <a:lstStyle/>
+          <a:p>
+            <a:r>
+              <a:rPr lang="it-IT" dirty="0"/>
+              <a:t>Action plan</a:t>
+            </a:r>
+          </a:p>
+        </p:txBody>
+      </p:sp>
+      <p:sp>
+        <p:nvSpPr>
+          <p:cNvPr id="5" name="Content Placeholder 4">
+            <a:extLst>
+              <a:ext uri="{FF2B5EF4-FFF2-40B4-BE49-F238E27FC236}">
+                <a16:creationId xmlns:a16="http://schemas.microsoft.com/office/drawing/2014/main" id="{F09664C9-A611-086B-0F4A-6DA6BF5A1066}"/>
+              </a:ext>
+            </a:extLst>
+          </p:cNvPr>
+          <p:cNvSpPr>
+            <a:spLocks noGrp="1"/>
+          </p:cNvSpPr>
+          <p:nvPr>
+            <p:ph idx="1"/>
+          </p:nvPr>
+        </p:nvSpPr>
+        <p:spPr/>
+        <p:txBody>
+          <a:bodyPr/>
+          <a:lstStyle/>
+          <a:p>
+            <a:r>
+              <a:rPr lang="it-IT" dirty="0" err="1"/>
+              <a:t>Add</a:t>
+            </a:r>
+            <a:r>
+              <a:rPr lang="it-IT" dirty="0"/>
+              <a:t> a class to make sure </a:t>
+            </a:r>
+            <a:r>
+              <a:rPr lang="it-IT" dirty="0" err="1"/>
+              <a:t>you</a:t>
+            </a:r>
+            <a:r>
+              <a:rPr lang="it-IT" dirty="0"/>
+              <a:t> </a:t>
+            </a:r>
+            <a:r>
+              <a:rPr lang="it-IT" dirty="0" err="1"/>
+              <a:t>select</a:t>
+            </a:r>
+            <a:r>
+              <a:rPr lang="it-IT" dirty="0"/>
+              <a:t> </a:t>
+            </a:r>
+            <a:r>
+              <a:rPr lang="it-IT" dirty="0" err="1"/>
+              <a:t>all</a:t>
+            </a:r>
+            <a:r>
+              <a:rPr lang="it-IT" dirty="0"/>
+              <a:t> the </a:t>
+            </a:r>
+            <a:r>
+              <a:rPr lang="it-IT" dirty="0" err="1"/>
+              <a:t>radiobuttons</a:t>
+            </a:r>
+            <a:r>
+              <a:rPr lang="it-IT" dirty="0"/>
+              <a:t> (and make </a:t>
+            </a:r>
+            <a:r>
+              <a:rPr lang="it-IT" dirty="0" err="1"/>
+              <a:t>them</a:t>
+            </a:r>
+            <a:r>
+              <a:rPr lang="it-IT" dirty="0"/>
+              <a:t> </a:t>
+            </a:r>
+            <a:r>
+              <a:rPr lang="it-IT" dirty="0" err="1"/>
+              <a:t>as</a:t>
+            </a:r>
+            <a:r>
+              <a:rPr lang="it-IT" dirty="0"/>
+              <a:t> </a:t>
+            </a:r>
+            <a:r>
+              <a:rPr lang="it-IT" dirty="0" err="1"/>
+              <a:t>you</a:t>
+            </a:r>
+            <a:r>
+              <a:rPr lang="it-IT" dirty="0"/>
+              <a:t> like)</a:t>
+            </a:r>
+          </a:p>
+          <a:p>
+            <a:r>
+              <a:rPr lang="it-IT" dirty="0"/>
+              <a:t>Select </a:t>
+            </a:r>
+            <a:r>
+              <a:rPr lang="it-IT" dirty="0" err="1"/>
+              <a:t>all</a:t>
+            </a:r>
+            <a:r>
+              <a:rPr lang="it-IT" dirty="0"/>
+              <a:t> </a:t>
+            </a:r>
+            <a:r>
+              <a:rPr lang="it-IT" dirty="0" err="1"/>
+              <a:t>them</a:t>
+            </a:r>
+            <a:r>
+              <a:rPr lang="it-IT" dirty="0"/>
+              <a:t> </a:t>
+            </a:r>
+            <a:r>
+              <a:rPr lang="it-IT" dirty="0" err="1"/>
+              <a:t>twice</a:t>
+            </a:r>
+            <a:r>
+              <a:rPr lang="it-IT" dirty="0"/>
+              <a:t>:</a:t>
+            </a:r>
+          </a:p>
+          <a:p>
+            <a:pPr lvl="1"/>
+            <a:r>
+              <a:rPr lang="it-IT" dirty="0"/>
+              <a:t>One loop </a:t>
+            </a:r>
+            <a:r>
+              <a:rPr lang="it-IT" dirty="0" err="1"/>
+              <a:t>will</a:t>
+            </a:r>
+            <a:r>
+              <a:rPr lang="it-IT" dirty="0"/>
+              <a:t> </a:t>
+            </a:r>
+            <a:r>
+              <a:rPr lang="it-IT" dirty="0" err="1"/>
+              <a:t>add</a:t>
+            </a:r>
+            <a:r>
+              <a:rPr lang="it-IT" dirty="0"/>
+              <a:t> the event </a:t>
+            </a:r>
+            <a:r>
+              <a:rPr lang="it-IT" dirty="0" err="1"/>
+              <a:t>listener</a:t>
+            </a:r>
+            <a:r>
+              <a:rPr lang="it-IT" dirty="0"/>
+              <a:t>;</a:t>
+            </a:r>
+          </a:p>
+          <a:p>
+            <a:pPr lvl="1"/>
+            <a:r>
+              <a:rPr lang="it-IT" dirty="0"/>
+              <a:t>One loop in </a:t>
+            </a:r>
+            <a:r>
+              <a:rPr lang="it-IT" dirty="0" err="1"/>
+              <a:t>forward</a:t>
+            </a:r>
+            <a:r>
+              <a:rPr lang="it-IT" dirty="0"/>
+              <a:t> </a:t>
+            </a:r>
+            <a:r>
+              <a:rPr lang="it-IT" dirty="0" err="1"/>
+              <a:t>direction</a:t>
+            </a:r>
+            <a:r>
+              <a:rPr lang="it-IT" dirty="0"/>
+              <a:t> </a:t>
+            </a:r>
+            <a:r>
+              <a:rPr lang="it-IT" dirty="0" err="1"/>
+              <a:t>will</a:t>
+            </a:r>
+            <a:r>
+              <a:rPr lang="it-IT" dirty="0"/>
+              <a:t> </a:t>
+            </a:r>
+            <a:r>
+              <a:rPr lang="it-IT" dirty="0" err="1"/>
+              <a:t>select</a:t>
+            </a:r>
+            <a:r>
+              <a:rPr lang="it-IT" dirty="0"/>
+              <a:t> on the </a:t>
+            </a:r>
+            <a:r>
+              <a:rPr lang="it-IT" dirty="0" err="1"/>
+              <a:t>right</a:t>
+            </a:r>
+            <a:endParaRPr lang="it-IT" dirty="0"/>
+          </a:p>
+          <a:p>
+            <a:pPr lvl="1"/>
+            <a:r>
+              <a:rPr lang="it-IT" dirty="0"/>
+              <a:t>One loop in </a:t>
+            </a:r>
+            <a:r>
+              <a:rPr lang="it-IT" dirty="0" err="1"/>
+              <a:t>backward</a:t>
+            </a:r>
+            <a:r>
+              <a:rPr lang="it-IT" dirty="0"/>
+              <a:t> </a:t>
+            </a:r>
+            <a:r>
+              <a:rPr lang="it-IT" dirty="0" err="1"/>
+              <a:t>direction</a:t>
+            </a:r>
+            <a:r>
+              <a:rPr lang="it-IT" dirty="0"/>
+              <a:t> </a:t>
+            </a:r>
+            <a:r>
+              <a:rPr lang="it-IT" dirty="0" err="1"/>
+              <a:t>will</a:t>
+            </a:r>
+            <a:r>
+              <a:rPr lang="it-IT" dirty="0"/>
+              <a:t> </a:t>
+            </a:r>
+            <a:r>
+              <a:rPr lang="it-IT" dirty="0" err="1"/>
+              <a:t>select</a:t>
+            </a:r>
+            <a:r>
+              <a:rPr lang="it-IT" dirty="0"/>
+              <a:t> on the </a:t>
+            </a:r>
+            <a:r>
+              <a:rPr lang="it-IT" dirty="0" err="1"/>
+              <a:t>left</a:t>
+            </a:r>
+            <a:endParaRPr lang="it-IT" dirty="0"/>
+          </a:p>
+          <a:p>
+            <a:pPr lvl="1"/>
+            <a:r>
+              <a:rPr lang="it-IT" b="1" dirty="0" err="1"/>
+              <a:t>We</a:t>
+            </a:r>
+            <a:r>
+              <a:rPr lang="it-IT" b="1" dirty="0"/>
+              <a:t> </a:t>
+            </a:r>
+            <a:r>
+              <a:rPr lang="it-IT" b="1" dirty="0" err="1"/>
+              <a:t>need</a:t>
+            </a:r>
+            <a:r>
+              <a:rPr lang="it-IT" b="1" dirty="0"/>
+              <a:t> to figure out the complicate </a:t>
+            </a:r>
+            <a:r>
+              <a:rPr lang="it-IT" b="1" dirty="0" err="1"/>
+              <a:t>cases</a:t>
+            </a:r>
+            <a:endParaRPr lang="it-IT" b="1" dirty="0"/>
           </a:p>
         </p:txBody>
       </p:sp>
     </p:spTree>
     <p:extLst>
       <p:ext uri="{BB962C8B-B14F-4D97-AF65-F5344CB8AC3E}">
-        <p14:creationId xmlns:p14="http://schemas.microsoft.com/office/powerpoint/2010/main" val="2985669483"/>
+        <p14:creationId xmlns:p14="http://schemas.microsoft.com/office/powerpoint/2010/main" val="3413471062"/>
       </p:ext>
     </p:extLst>
   </p:cSld>
@@ -20089,6 +23124,1266 @@
     <p:extLst>
       <p:ext uri="{BB962C8B-B14F-4D97-AF65-F5344CB8AC3E}">
         <p14:creationId xmlns:p14="http://schemas.microsoft.com/office/powerpoint/2010/main" val="2812431343"/>
+      </p:ext>
+    </p:extLst>
+  </p:cSld>
+  <p:clrMapOvr>
+    <a:masterClrMapping/>
+  </p:clrMapOvr>
+</p:sld>
+</file>
+
+<file path=ppt/slides/slide60.xml><?xml version="1.0" encoding="utf-8"?>
+<p:sld xmlns:a="http://schemas.openxmlformats.org/drawingml/2006/main" xmlns:r="http://schemas.openxmlformats.org/officeDocument/2006/relationships" xmlns:p="http://schemas.openxmlformats.org/presentationml/2006/main">
+  <p:cSld>
+    <p:spTree>
+      <p:nvGrpSpPr>
+        <p:cNvPr id="1" name=""/>
+        <p:cNvGrpSpPr/>
+        <p:nvPr/>
+      </p:nvGrpSpPr>
+      <p:grpSpPr>
+        <a:xfrm>
+          <a:off x="0" y="0"/>
+          <a:ext cx="0" cy="0"/>
+          <a:chOff x="0" y="0"/>
+          <a:chExt cx="0" cy="0"/>
+        </a:xfrm>
+      </p:grpSpPr>
+      <p:sp>
+        <p:nvSpPr>
+          <p:cNvPr id="2" name="Title 1">
+            <a:extLst>
+              <a:ext uri="{FF2B5EF4-FFF2-40B4-BE49-F238E27FC236}">
+                <a16:creationId xmlns:a16="http://schemas.microsoft.com/office/drawing/2014/main" id="{1757DA28-A812-DA41-DC78-B7B7D6E04C28}"/>
+              </a:ext>
+            </a:extLst>
+          </p:cNvPr>
+          <p:cNvSpPr>
+            <a:spLocks noGrp="1"/>
+          </p:cNvSpPr>
+          <p:nvPr>
+            <p:ph type="title"/>
+          </p:nvPr>
+        </p:nvSpPr>
+        <p:spPr/>
+        <p:txBody>
+          <a:bodyPr/>
+          <a:lstStyle/>
+          <a:p>
+            <a:r>
+              <a:rPr lang="it-IT" dirty="0"/>
+              <a:t>One </a:t>
+            </a:r>
+            <a:r>
+              <a:rPr lang="it-IT" dirty="0" err="1"/>
+              <a:t>final</a:t>
+            </a:r>
+            <a:r>
+              <a:rPr lang="it-IT" dirty="0"/>
+              <a:t> </a:t>
+            </a:r>
+            <a:r>
+              <a:rPr lang="it-IT" dirty="0" err="1"/>
+              <a:t>thing</a:t>
+            </a:r>
+            <a:r>
+              <a:rPr lang="it-IT" dirty="0"/>
+              <a:t>: data</a:t>
+            </a:r>
+          </a:p>
+        </p:txBody>
+      </p:sp>
+      <p:sp>
+        <p:nvSpPr>
+          <p:cNvPr id="3" name="Content Placeholder 2">
+            <a:extLst>
+              <a:ext uri="{FF2B5EF4-FFF2-40B4-BE49-F238E27FC236}">
+                <a16:creationId xmlns:a16="http://schemas.microsoft.com/office/drawing/2014/main" id="{9CBDE357-899A-998F-31CD-7F4D658F2286}"/>
+              </a:ext>
+            </a:extLst>
+          </p:cNvPr>
+          <p:cNvSpPr>
+            <a:spLocks noGrp="1"/>
+          </p:cNvSpPr>
+          <p:nvPr>
+            <p:ph idx="1"/>
+          </p:nvPr>
+        </p:nvSpPr>
+        <p:spPr/>
+        <p:txBody>
+          <a:bodyPr/>
+          <a:lstStyle/>
+          <a:p>
+            <a:r>
+              <a:rPr lang="it-IT" dirty="0" err="1"/>
+              <a:t>We</a:t>
+            </a:r>
+            <a:r>
+              <a:rPr lang="it-IT" dirty="0"/>
+              <a:t> </a:t>
+            </a:r>
+            <a:r>
+              <a:rPr lang="it-IT" dirty="0" err="1"/>
+              <a:t>would</a:t>
+            </a:r>
+            <a:r>
+              <a:rPr lang="it-IT" dirty="0"/>
+              <a:t> like </a:t>
+            </a:r>
+            <a:r>
+              <a:rPr lang="it-IT" dirty="0" err="1"/>
+              <a:t>avoid</a:t>
+            </a:r>
+            <a:r>
+              <a:rPr lang="it-IT" dirty="0"/>
+              <a:t> </a:t>
+            </a:r>
+            <a:r>
+              <a:rPr lang="it-IT" dirty="0" err="1"/>
+              <a:t>having</a:t>
+            </a:r>
+            <a:r>
+              <a:rPr lang="it-IT" dirty="0"/>
+              <a:t> tons of </a:t>
+            </a:r>
+            <a:r>
+              <a:rPr lang="it-IT" dirty="0" err="1"/>
+              <a:t>variables</a:t>
+            </a:r>
+            <a:r>
+              <a:rPr lang="it-IT" dirty="0"/>
+              <a:t> for </a:t>
+            </a:r>
+            <a:r>
+              <a:rPr lang="it-IT" dirty="0" err="1"/>
+              <a:t>each</a:t>
+            </a:r>
+            <a:r>
+              <a:rPr lang="it-IT" dirty="0"/>
+              <a:t> </a:t>
+            </a:r>
+            <a:r>
+              <a:rPr lang="it-IT" dirty="0" err="1"/>
+              <a:t>row</a:t>
+            </a:r>
+            <a:r>
+              <a:rPr lang="it-IT" dirty="0"/>
+              <a:t>. </a:t>
+            </a:r>
+            <a:r>
+              <a:rPr lang="it-IT" dirty="0" err="1"/>
+              <a:t>Instead</a:t>
+            </a:r>
+            <a:r>
+              <a:rPr lang="it-IT" dirty="0"/>
+              <a:t>, one single </a:t>
+            </a:r>
+            <a:r>
+              <a:rPr lang="it-IT" dirty="0" err="1"/>
+              <a:t>variable</a:t>
+            </a:r>
+            <a:r>
+              <a:rPr lang="it-IT" dirty="0"/>
+              <a:t> with the switching point</a:t>
+            </a:r>
+          </a:p>
+          <a:p>
+            <a:r>
+              <a:rPr lang="it-IT" dirty="0" err="1"/>
+              <a:t>When</a:t>
+            </a:r>
+            <a:r>
+              <a:rPr lang="it-IT" dirty="0"/>
+              <a:t> the </a:t>
+            </a:r>
+            <a:r>
+              <a:rPr lang="it-IT" dirty="0" err="1"/>
+              <a:t>decision</a:t>
+            </a:r>
+            <a:r>
+              <a:rPr lang="it-IT" dirty="0"/>
+              <a:t> </a:t>
+            </a:r>
+            <a:r>
+              <a:rPr lang="it-IT" dirty="0" err="1"/>
+              <a:t>is</a:t>
+            </a:r>
+            <a:r>
+              <a:rPr lang="it-IT" dirty="0"/>
+              <a:t> </a:t>
+            </a:r>
+            <a:r>
+              <a:rPr lang="it-IT" dirty="0" err="1"/>
+              <a:t>taken</a:t>
+            </a:r>
+            <a:r>
+              <a:rPr lang="it-IT" dirty="0"/>
+              <a:t> and the </a:t>
+            </a:r>
+            <a:r>
+              <a:rPr lang="it-IT" dirty="0" err="1"/>
+              <a:t>button</a:t>
+            </a:r>
+            <a:r>
+              <a:rPr lang="it-IT" dirty="0"/>
+              <a:t> </a:t>
+            </a:r>
+            <a:r>
+              <a:rPr lang="it-IT" dirty="0" err="1"/>
+              <a:t>is</a:t>
+            </a:r>
+            <a:r>
+              <a:rPr lang="it-IT" dirty="0"/>
+              <a:t> </a:t>
+            </a:r>
+            <a:r>
+              <a:rPr lang="it-IT" dirty="0" err="1"/>
+              <a:t>pressed</a:t>
+            </a:r>
+            <a:r>
+              <a:rPr lang="it-IT" dirty="0"/>
+              <a:t>, </a:t>
+            </a:r>
+            <a:r>
+              <a:rPr lang="it-IT" dirty="0" err="1"/>
+              <a:t>we</a:t>
+            </a:r>
+            <a:r>
+              <a:rPr lang="it-IT" dirty="0"/>
+              <a:t> record the </a:t>
+            </a:r>
+            <a:r>
+              <a:rPr lang="it-IT" dirty="0" err="1"/>
+              <a:t>final</a:t>
+            </a:r>
+            <a:r>
+              <a:rPr lang="it-IT" dirty="0"/>
+              <a:t> </a:t>
+            </a:r>
+            <a:r>
+              <a:rPr lang="it-IT" dirty="0" err="1"/>
+              <a:t>choice</a:t>
+            </a:r>
+            <a:endParaRPr lang="it-IT" dirty="0"/>
+          </a:p>
+        </p:txBody>
+      </p:sp>
+    </p:spTree>
+    <p:extLst>
+      <p:ext uri="{BB962C8B-B14F-4D97-AF65-F5344CB8AC3E}">
+        <p14:creationId xmlns:p14="http://schemas.microsoft.com/office/powerpoint/2010/main" val="1975333477"/>
+      </p:ext>
+    </p:extLst>
+  </p:cSld>
+  <p:clrMapOvr>
+    <a:masterClrMapping/>
+  </p:clrMapOvr>
+</p:sld>
+</file>
+
+<file path=ppt/slides/slide61.xml><?xml version="1.0" encoding="utf-8"?>
+<p:sld xmlns:a="http://schemas.openxmlformats.org/drawingml/2006/main" xmlns:r="http://schemas.openxmlformats.org/officeDocument/2006/relationships" xmlns:p="http://schemas.openxmlformats.org/presentationml/2006/main">
+  <p:cSld>
+    <p:spTree>
+      <p:nvGrpSpPr>
+        <p:cNvPr id="1" name=""/>
+        <p:cNvGrpSpPr/>
+        <p:nvPr/>
+      </p:nvGrpSpPr>
+      <p:grpSpPr>
+        <a:xfrm>
+          <a:off x="0" y="0"/>
+          <a:ext cx="0" cy="0"/>
+          <a:chOff x="0" y="0"/>
+          <a:chExt cx="0" cy="0"/>
+        </a:xfrm>
+      </p:grpSpPr>
+      <p:sp>
+        <p:nvSpPr>
+          <p:cNvPr id="2" name="Title 1">
+            <a:extLst>
+              <a:ext uri="{FF2B5EF4-FFF2-40B4-BE49-F238E27FC236}">
+                <a16:creationId xmlns:a16="http://schemas.microsoft.com/office/drawing/2014/main" id="{24B1B5EF-154D-5FF9-EDB5-E07DDF087218}"/>
+              </a:ext>
+            </a:extLst>
+          </p:cNvPr>
+          <p:cNvSpPr>
+            <a:spLocks noGrp="1"/>
+          </p:cNvSpPr>
+          <p:nvPr>
+            <p:ph type="title"/>
+          </p:nvPr>
+        </p:nvSpPr>
+        <p:spPr/>
+        <p:txBody>
+          <a:bodyPr/>
+          <a:lstStyle/>
+          <a:p>
+            <a:r>
+              <a:rPr lang="it-IT" dirty="0" err="1"/>
+              <a:t>Asyncronous</a:t>
+            </a:r>
+            <a:r>
+              <a:rPr lang="it-IT" dirty="0"/>
+              <a:t> matching</a:t>
+            </a:r>
+          </a:p>
+        </p:txBody>
+      </p:sp>
+      <p:sp>
+        <p:nvSpPr>
+          <p:cNvPr id="4" name="Content Placeholder 3">
+            <a:extLst>
+              <a:ext uri="{FF2B5EF4-FFF2-40B4-BE49-F238E27FC236}">
+                <a16:creationId xmlns:a16="http://schemas.microsoft.com/office/drawing/2014/main" id="{12A3D822-0A46-AC38-66B7-2755E22573A7}"/>
+              </a:ext>
+            </a:extLst>
+          </p:cNvPr>
+          <p:cNvSpPr>
+            <a:spLocks noGrp="1"/>
+          </p:cNvSpPr>
+          <p:nvPr>
+            <p:ph sz="half" idx="1"/>
+          </p:nvPr>
+        </p:nvSpPr>
+        <p:spPr/>
+        <p:txBody>
+          <a:bodyPr/>
+          <a:lstStyle/>
+          <a:p>
+            <a:r>
+              <a:rPr lang="it-IT" dirty="0"/>
+              <a:t>Assume </a:t>
+            </a:r>
+            <a:r>
+              <a:rPr lang="it-IT" dirty="0" err="1"/>
+              <a:t>that</a:t>
+            </a:r>
+            <a:r>
+              <a:rPr lang="it-IT" dirty="0"/>
+              <a:t> </a:t>
+            </a:r>
+            <a:r>
+              <a:rPr lang="it-IT" dirty="0" err="1"/>
+              <a:t>our</a:t>
+            </a:r>
+            <a:r>
+              <a:rPr lang="it-IT" dirty="0"/>
+              <a:t> last task </a:t>
+            </a:r>
+            <a:r>
+              <a:rPr lang="it-IT" dirty="0" err="1"/>
+              <a:t>is</a:t>
+            </a:r>
+            <a:r>
+              <a:rPr lang="it-IT" dirty="0"/>
+              <a:t> trust a la C&amp;D</a:t>
+            </a:r>
+          </a:p>
+          <a:p>
+            <a:r>
+              <a:rPr lang="it-IT" dirty="0" err="1"/>
+              <a:t>We</a:t>
+            </a:r>
+            <a:r>
+              <a:rPr lang="it-IT" dirty="0"/>
+              <a:t> </a:t>
+            </a:r>
+            <a:r>
+              <a:rPr lang="it-IT" dirty="0" err="1"/>
+              <a:t>have</a:t>
+            </a:r>
+            <a:r>
+              <a:rPr lang="it-IT" dirty="0"/>
+              <a:t> </a:t>
+            </a:r>
+            <a:r>
+              <a:rPr lang="it-IT" dirty="0" err="1"/>
+              <a:t>collected</a:t>
+            </a:r>
+            <a:r>
+              <a:rPr lang="it-IT" dirty="0"/>
+              <a:t> </a:t>
+            </a:r>
+            <a:r>
+              <a:rPr lang="it-IT" dirty="0" err="1"/>
+              <a:t>our</a:t>
+            </a:r>
+            <a:r>
+              <a:rPr lang="it-IT" dirty="0"/>
+              <a:t> trustees </a:t>
+            </a:r>
+            <a:r>
+              <a:rPr lang="it-IT" dirty="0" err="1"/>
+              <a:t>decisions</a:t>
+            </a:r>
+            <a:endParaRPr lang="it-IT" dirty="0"/>
+          </a:p>
+          <a:p>
+            <a:r>
+              <a:rPr lang="it-IT" dirty="0" err="1"/>
+              <a:t>Perhaps</a:t>
+            </a:r>
+            <a:r>
+              <a:rPr lang="it-IT" dirty="0"/>
+              <a:t> </a:t>
+            </a:r>
+            <a:r>
+              <a:rPr lang="it-IT" dirty="0" err="1"/>
+              <a:t>we</a:t>
+            </a:r>
+            <a:r>
+              <a:rPr lang="it-IT" dirty="0"/>
+              <a:t> </a:t>
+            </a:r>
+            <a:r>
+              <a:rPr lang="it-IT" dirty="0" err="1"/>
+              <a:t>even</a:t>
+            </a:r>
+            <a:r>
+              <a:rPr lang="it-IT" dirty="0"/>
+              <a:t> </a:t>
+            </a:r>
+            <a:r>
+              <a:rPr lang="it-IT" dirty="0" err="1"/>
+              <a:t>have</a:t>
+            </a:r>
+            <a:r>
+              <a:rPr lang="it-IT" dirty="0"/>
+              <a:t> the </a:t>
+            </a:r>
+            <a:r>
+              <a:rPr lang="it-IT" dirty="0" err="1"/>
+              <a:t>promises</a:t>
+            </a:r>
+            <a:endParaRPr lang="it-IT" dirty="0"/>
+          </a:p>
+        </p:txBody>
+      </p:sp>
+      <p:pic>
+        <p:nvPicPr>
+          <p:cNvPr id="7" name="Content Placeholder 6">
+            <a:extLst>
+              <a:ext uri="{FF2B5EF4-FFF2-40B4-BE49-F238E27FC236}">
+                <a16:creationId xmlns:a16="http://schemas.microsoft.com/office/drawing/2014/main" id="{EA6FD77D-86C8-B574-A19A-44C1FF54DFBD}"/>
+              </a:ext>
+            </a:extLst>
+          </p:cNvPr>
+          <p:cNvPicPr>
+            <a:picLocks noGrp="1" noChangeAspect="1"/>
+          </p:cNvPicPr>
+          <p:nvPr>
+            <p:ph sz="half" idx="2"/>
+          </p:nvPr>
+        </p:nvPicPr>
+        <p:blipFill>
+          <a:blip r:embed="rId2"/>
+          <a:stretch>
+            <a:fillRect/>
+          </a:stretch>
+        </p:blipFill>
+        <p:spPr>
+          <a:xfrm>
+            <a:off x="6172200" y="2472255"/>
+            <a:ext cx="5181600" cy="3058078"/>
+          </a:xfrm>
+        </p:spPr>
+      </p:pic>
+    </p:spTree>
+    <p:extLst>
+      <p:ext uri="{BB962C8B-B14F-4D97-AF65-F5344CB8AC3E}">
+        <p14:creationId xmlns:p14="http://schemas.microsoft.com/office/powerpoint/2010/main" val="3863190004"/>
+      </p:ext>
+    </p:extLst>
+  </p:cSld>
+  <p:clrMapOvr>
+    <a:masterClrMapping/>
+  </p:clrMapOvr>
+</p:sld>
+</file>
+
+<file path=ppt/slides/slide62.xml><?xml version="1.0" encoding="utf-8"?>
+<p:sld xmlns:a="http://schemas.openxmlformats.org/drawingml/2006/main" xmlns:r="http://schemas.openxmlformats.org/officeDocument/2006/relationships" xmlns:p="http://schemas.openxmlformats.org/presentationml/2006/main">
+  <p:cSld>
+    <p:spTree>
+      <p:nvGrpSpPr>
+        <p:cNvPr id="1" name=""/>
+        <p:cNvGrpSpPr/>
+        <p:nvPr/>
+      </p:nvGrpSpPr>
+      <p:grpSpPr>
+        <a:xfrm>
+          <a:off x="0" y="0"/>
+          <a:ext cx="0" cy="0"/>
+          <a:chOff x="0" y="0"/>
+          <a:chExt cx="0" cy="0"/>
+        </a:xfrm>
+      </p:grpSpPr>
+      <p:sp>
+        <p:nvSpPr>
+          <p:cNvPr id="2" name="Title 1">
+            <a:extLst>
+              <a:ext uri="{FF2B5EF4-FFF2-40B4-BE49-F238E27FC236}">
+                <a16:creationId xmlns:a16="http://schemas.microsoft.com/office/drawing/2014/main" id="{B1E21544-8ACA-24DF-6CCA-A49D6135846B}"/>
+              </a:ext>
+            </a:extLst>
+          </p:cNvPr>
+          <p:cNvSpPr>
+            <a:spLocks noGrp="1"/>
+          </p:cNvSpPr>
+          <p:nvPr>
+            <p:ph type="title"/>
+          </p:nvPr>
+        </p:nvSpPr>
+        <p:spPr/>
+        <p:txBody>
+          <a:bodyPr/>
+          <a:lstStyle/>
+          <a:p>
+            <a:r>
+              <a:rPr lang="it-IT" dirty="0" err="1"/>
+              <a:t>Asyncronous</a:t>
+            </a:r>
+            <a:r>
+              <a:rPr lang="it-IT" dirty="0"/>
+              <a:t> matching</a:t>
+            </a:r>
+          </a:p>
+        </p:txBody>
+      </p:sp>
+      <p:sp>
+        <p:nvSpPr>
+          <p:cNvPr id="3" name="Content Placeholder 2">
+            <a:extLst>
+              <a:ext uri="{FF2B5EF4-FFF2-40B4-BE49-F238E27FC236}">
+                <a16:creationId xmlns:a16="http://schemas.microsoft.com/office/drawing/2014/main" id="{EDC0433F-7C10-53E5-AF5D-F4876C920993}"/>
+              </a:ext>
+            </a:extLst>
+          </p:cNvPr>
+          <p:cNvSpPr>
+            <a:spLocks noGrp="1"/>
+          </p:cNvSpPr>
+          <p:nvPr>
+            <p:ph sz="half" idx="1"/>
+          </p:nvPr>
+        </p:nvSpPr>
+        <p:spPr/>
+        <p:txBody>
+          <a:bodyPr/>
+          <a:lstStyle/>
+          <a:p>
+            <a:r>
+              <a:rPr lang="it-IT" dirty="0" err="1"/>
+              <a:t>We</a:t>
+            </a:r>
+            <a:r>
+              <a:rPr lang="it-IT" dirty="0"/>
+              <a:t> </a:t>
+            </a:r>
+            <a:r>
+              <a:rPr lang="it-IT" dirty="0" err="1"/>
+              <a:t>need</a:t>
+            </a:r>
+            <a:r>
+              <a:rPr lang="it-IT" dirty="0"/>
+              <a:t> to </a:t>
+            </a:r>
+            <a:r>
+              <a:rPr lang="it-IT" dirty="0" err="1"/>
+              <a:t>manage</a:t>
+            </a:r>
+            <a:r>
+              <a:rPr lang="it-IT" dirty="0"/>
+              <a:t> the matching</a:t>
+            </a:r>
+          </a:p>
+          <a:p>
+            <a:r>
+              <a:rPr lang="it-IT" dirty="0" err="1"/>
+              <a:t>We</a:t>
+            </a:r>
+            <a:r>
+              <a:rPr lang="it-IT" dirty="0"/>
+              <a:t> </a:t>
+            </a:r>
+            <a:r>
+              <a:rPr lang="it-IT" dirty="0" err="1"/>
+              <a:t>need</a:t>
+            </a:r>
+            <a:r>
+              <a:rPr lang="it-IT" dirty="0"/>
+              <a:t> </a:t>
+            </a:r>
+            <a:r>
+              <a:rPr lang="it-IT" dirty="0" err="1"/>
+              <a:t>dynamic</a:t>
+            </a:r>
+            <a:r>
+              <a:rPr lang="it-IT" dirty="0"/>
+              <a:t> text for the promise</a:t>
+            </a:r>
+          </a:p>
+          <a:p>
+            <a:r>
+              <a:rPr lang="it-IT" dirty="0" err="1"/>
+              <a:t>Ideally</a:t>
+            </a:r>
+            <a:r>
+              <a:rPr lang="it-IT" dirty="0"/>
+              <a:t>, </a:t>
+            </a:r>
+            <a:r>
+              <a:rPr lang="it-IT" dirty="0" err="1"/>
+              <a:t>we</a:t>
+            </a:r>
+            <a:r>
+              <a:rPr lang="it-IT" dirty="0"/>
+              <a:t> </a:t>
+            </a:r>
+            <a:r>
+              <a:rPr lang="it-IT" dirty="0" err="1"/>
+              <a:t>should</a:t>
+            </a:r>
+            <a:r>
+              <a:rPr lang="it-IT" dirty="0"/>
+              <a:t> match just once</a:t>
+            </a:r>
+          </a:p>
+        </p:txBody>
+      </p:sp>
+      <p:pic>
+        <p:nvPicPr>
+          <p:cNvPr id="6" name="Content Placeholder 5">
+            <a:extLst>
+              <a:ext uri="{FF2B5EF4-FFF2-40B4-BE49-F238E27FC236}">
+                <a16:creationId xmlns:a16="http://schemas.microsoft.com/office/drawing/2014/main" id="{600FC5F5-37DD-C3FE-BB89-841F4B5C70FF}"/>
+              </a:ext>
+            </a:extLst>
+          </p:cNvPr>
+          <p:cNvPicPr>
+            <a:picLocks noGrp="1" noChangeAspect="1"/>
+          </p:cNvPicPr>
+          <p:nvPr>
+            <p:ph sz="half" idx="2"/>
+          </p:nvPr>
+        </p:nvPicPr>
+        <p:blipFill>
+          <a:blip r:embed="rId2"/>
+          <a:stretch>
+            <a:fillRect/>
+          </a:stretch>
+        </p:blipFill>
+        <p:spPr>
+          <a:xfrm>
+            <a:off x="6172200" y="2502484"/>
+            <a:ext cx="5181600" cy="2997619"/>
+          </a:xfrm>
+        </p:spPr>
+      </p:pic>
+    </p:spTree>
+    <p:extLst>
+      <p:ext uri="{BB962C8B-B14F-4D97-AF65-F5344CB8AC3E}">
+        <p14:creationId xmlns:p14="http://schemas.microsoft.com/office/powerpoint/2010/main" val="2931149457"/>
+      </p:ext>
+    </p:extLst>
+  </p:cSld>
+  <p:clrMapOvr>
+    <a:masterClrMapping/>
+  </p:clrMapOvr>
+</p:sld>
+</file>
+
+<file path=ppt/slides/slide63.xml><?xml version="1.0" encoding="utf-8"?>
+<p:sld xmlns:a="http://schemas.openxmlformats.org/drawingml/2006/main" xmlns:r="http://schemas.openxmlformats.org/officeDocument/2006/relationships" xmlns:p="http://schemas.openxmlformats.org/presentationml/2006/main">
+  <p:cSld>
+    <p:spTree>
+      <p:nvGrpSpPr>
+        <p:cNvPr id="1" name=""/>
+        <p:cNvGrpSpPr/>
+        <p:nvPr/>
+      </p:nvGrpSpPr>
+      <p:grpSpPr>
+        <a:xfrm>
+          <a:off x="0" y="0"/>
+          <a:ext cx="0" cy="0"/>
+          <a:chOff x="0" y="0"/>
+          <a:chExt cx="0" cy="0"/>
+        </a:xfrm>
+      </p:grpSpPr>
+      <p:sp>
+        <p:nvSpPr>
+          <p:cNvPr id="2" name="Title 1">
+            <a:extLst>
+              <a:ext uri="{FF2B5EF4-FFF2-40B4-BE49-F238E27FC236}">
+                <a16:creationId xmlns:a16="http://schemas.microsoft.com/office/drawing/2014/main" id="{50F4C837-3497-34AB-239F-8466BD3C04F6}"/>
+              </a:ext>
+            </a:extLst>
+          </p:cNvPr>
+          <p:cNvSpPr>
+            <a:spLocks noGrp="1"/>
+          </p:cNvSpPr>
+          <p:nvPr>
+            <p:ph type="title"/>
+          </p:nvPr>
+        </p:nvSpPr>
+        <p:spPr/>
+        <p:txBody>
+          <a:bodyPr/>
+          <a:lstStyle/>
+          <a:p>
+            <a:r>
+              <a:rPr lang="it-IT" dirty="0" err="1"/>
+              <a:t>Asyncronous</a:t>
+            </a:r>
+            <a:r>
+              <a:rPr lang="it-IT" dirty="0"/>
+              <a:t> matching</a:t>
+            </a:r>
+          </a:p>
+        </p:txBody>
+      </p:sp>
+      <p:sp>
+        <p:nvSpPr>
+          <p:cNvPr id="3" name="Content Placeholder 2">
+            <a:extLst>
+              <a:ext uri="{FF2B5EF4-FFF2-40B4-BE49-F238E27FC236}">
+                <a16:creationId xmlns:a16="http://schemas.microsoft.com/office/drawing/2014/main" id="{6ED67EE4-23BA-0A4D-40BC-A021F4C68F8F}"/>
+              </a:ext>
+            </a:extLst>
+          </p:cNvPr>
+          <p:cNvSpPr>
+            <a:spLocks noGrp="1"/>
+          </p:cNvSpPr>
+          <p:nvPr>
+            <p:ph sz="half" idx="1"/>
+          </p:nvPr>
+        </p:nvSpPr>
+        <p:spPr/>
+        <p:txBody>
+          <a:bodyPr/>
+          <a:lstStyle/>
+          <a:p>
+            <a:r>
+              <a:rPr lang="it-IT" dirty="0" err="1"/>
+              <a:t>We</a:t>
+            </a:r>
+            <a:r>
+              <a:rPr lang="it-IT" dirty="0"/>
+              <a:t> </a:t>
+            </a:r>
+            <a:r>
+              <a:rPr lang="it-IT" dirty="0" err="1"/>
+              <a:t>need</a:t>
+            </a:r>
+            <a:r>
+              <a:rPr lang="it-IT" dirty="0"/>
+              <a:t> </a:t>
+            </a:r>
+            <a:r>
+              <a:rPr lang="it-IT" dirty="0" err="1"/>
+              <a:t>matrices</a:t>
+            </a:r>
+            <a:r>
+              <a:rPr lang="it-IT" dirty="0"/>
+              <a:t> of </a:t>
+            </a:r>
+            <a:r>
+              <a:rPr lang="it-IT" dirty="0" err="1"/>
+              <a:t>choices</a:t>
+            </a:r>
+            <a:r>
+              <a:rPr lang="it-IT" dirty="0"/>
+              <a:t>, </a:t>
+            </a:r>
+            <a:r>
+              <a:rPr lang="it-IT" dirty="0" err="1"/>
+              <a:t>ids</a:t>
+            </a:r>
+            <a:r>
+              <a:rPr lang="it-IT" dirty="0"/>
+              <a:t>, </a:t>
+            </a:r>
+            <a:r>
+              <a:rPr lang="it-IT" dirty="0" err="1"/>
+              <a:t>promises</a:t>
+            </a:r>
+            <a:endParaRPr lang="it-IT" dirty="0"/>
+          </a:p>
+          <a:p>
+            <a:r>
+              <a:rPr lang="it-IT" dirty="0" err="1"/>
+              <a:t>We</a:t>
+            </a:r>
+            <a:r>
+              <a:rPr lang="it-IT" dirty="0"/>
+              <a:t> </a:t>
+            </a:r>
+            <a:r>
+              <a:rPr lang="it-IT" dirty="0" err="1"/>
+              <a:t>need</a:t>
+            </a:r>
+            <a:r>
+              <a:rPr lang="it-IT" dirty="0"/>
+              <a:t> a random </a:t>
+            </a:r>
+            <a:r>
+              <a:rPr lang="it-IT" dirty="0" err="1"/>
+              <a:t>mechanism</a:t>
+            </a:r>
+            <a:endParaRPr lang="it-IT" dirty="0"/>
+          </a:p>
+          <a:p>
+            <a:r>
+              <a:rPr lang="it-IT" dirty="0" err="1"/>
+              <a:t>We</a:t>
+            </a:r>
+            <a:r>
+              <a:rPr lang="it-IT" dirty="0"/>
+              <a:t> </a:t>
+            </a:r>
+            <a:r>
+              <a:rPr lang="it-IT" dirty="0" err="1"/>
+              <a:t>need</a:t>
+            </a:r>
+            <a:r>
+              <a:rPr lang="it-IT" dirty="0"/>
+              <a:t> to </a:t>
+            </a:r>
+            <a:r>
+              <a:rPr lang="it-IT" dirty="0" err="1"/>
+              <a:t>keep</a:t>
+            </a:r>
+            <a:r>
+              <a:rPr lang="it-IT" dirty="0"/>
+              <a:t> track of </a:t>
+            </a:r>
+            <a:r>
+              <a:rPr lang="it-IT" dirty="0" err="1"/>
+              <a:t>used</a:t>
+            </a:r>
+            <a:r>
+              <a:rPr lang="it-IT" dirty="0"/>
+              <a:t> </a:t>
+            </a:r>
+            <a:r>
+              <a:rPr lang="it-IT" dirty="0" err="1"/>
+              <a:t>indices</a:t>
+            </a:r>
+            <a:endParaRPr lang="it-IT" dirty="0"/>
+          </a:p>
+        </p:txBody>
+      </p:sp>
+      <p:pic>
+        <p:nvPicPr>
+          <p:cNvPr id="10" name="Content Placeholder 9">
+            <a:extLst>
+              <a:ext uri="{FF2B5EF4-FFF2-40B4-BE49-F238E27FC236}">
+                <a16:creationId xmlns:a16="http://schemas.microsoft.com/office/drawing/2014/main" id="{F1716C5A-A3BA-57BC-EE19-92972AA68F2E}"/>
+              </a:ext>
+            </a:extLst>
+          </p:cNvPr>
+          <p:cNvPicPr>
+            <a:picLocks noGrp="1" noChangeAspect="1"/>
+          </p:cNvPicPr>
+          <p:nvPr>
+            <p:ph sz="half" idx="2"/>
+          </p:nvPr>
+        </p:nvPicPr>
+        <p:blipFill>
+          <a:blip r:embed="rId2"/>
+          <a:stretch>
+            <a:fillRect/>
+          </a:stretch>
+        </p:blipFill>
+        <p:spPr>
+          <a:xfrm>
+            <a:off x="6172200" y="1993187"/>
+            <a:ext cx="5181600" cy="4016214"/>
+          </a:xfrm>
+        </p:spPr>
+      </p:pic>
+    </p:spTree>
+    <p:extLst>
+      <p:ext uri="{BB962C8B-B14F-4D97-AF65-F5344CB8AC3E}">
+        <p14:creationId xmlns:p14="http://schemas.microsoft.com/office/powerpoint/2010/main" val="1954581048"/>
+      </p:ext>
+    </p:extLst>
+  </p:cSld>
+  <p:clrMapOvr>
+    <a:masterClrMapping/>
+  </p:clrMapOvr>
+</p:sld>
+</file>
+
+<file path=ppt/slides/slide64.xml><?xml version="1.0" encoding="utf-8"?>
+<p:sld xmlns:a="http://schemas.openxmlformats.org/drawingml/2006/main" xmlns:r="http://schemas.openxmlformats.org/officeDocument/2006/relationships" xmlns:p="http://schemas.openxmlformats.org/presentationml/2006/main">
+  <p:cSld>
+    <p:spTree>
+      <p:nvGrpSpPr>
+        <p:cNvPr id="1" name=""/>
+        <p:cNvGrpSpPr/>
+        <p:nvPr/>
+      </p:nvGrpSpPr>
+      <p:grpSpPr>
+        <a:xfrm>
+          <a:off x="0" y="0"/>
+          <a:ext cx="0" cy="0"/>
+          <a:chOff x="0" y="0"/>
+          <a:chExt cx="0" cy="0"/>
+        </a:xfrm>
+      </p:grpSpPr>
+      <p:sp>
+        <p:nvSpPr>
+          <p:cNvPr id="2" name="Title 1">
+            <a:extLst>
+              <a:ext uri="{FF2B5EF4-FFF2-40B4-BE49-F238E27FC236}">
+                <a16:creationId xmlns:a16="http://schemas.microsoft.com/office/drawing/2014/main" id="{0347E3A1-D566-4031-A21D-9393800C1370}"/>
+              </a:ext>
+            </a:extLst>
+          </p:cNvPr>
+          <p:cNvSpPr>
+            <a:spLocks noGrp="1"/>
+          </p:cNvSpPr>
+          <p:nvPr>
+            <p:ph type="title"/>
+          </p:nvPr>
+        </p:nvSpPr>
+        <p:spPr/>
+        <p:txBody>
+          <a:bodyPr/>
+          <a:lstStyle/>
+          <a:p>
+            <a:r>
+              <a:rPr lang="it-IT" dirty="0" err="1"/>
+              <a:t>Asyncronous</a:t>
+            </a:r>
+            <a:r>
+              <a:rPr lang="it-IT" dirty="0"/>
+              <a:t> matching</a:t>
+            </a:r>
+          </a:p>
+        </p:txBody>
+      </p:sp>
+      <p:sp>
+        <p:nvSpPr>
+          <p:cNvPr id="3" name="Content Placeholder 2">
+            <a:extLst>
+              <a:ext uri="{FF2B5EF4-FFF2-40B4-BE49-F238E27FC236}">
+                <a16:creationId xmlns:a16="http://schemas.microsoft.com/office/drawing/2014/main" id="{91FF1CA3-4902-5989-4631-780F02BD2272}"/>
+              </a:ext>
+            </a:extLst>
+          </p:cNvPr>
+          <p:cNvSpPr>
+            <a:spLocks noGrp="1"/>
+          </p:cNvSpPr>
+          <p:nvPr>
+            <p:ph sz="half" idx="1"/>
+          </p:nvPr>
+        </p:nvSpPr>
+        <p:spPr/>
+        <p:txBody>
+          <a:bodyPr/>
+          <a:lstStyle/>
+          <a:p>
+            <a:r>
+              <a:rPr lang="it-IT" dirty="0" err="1"/>
+              <a:t>What</a:t>
+            </a:r>
+            <a:r>
+              <a:rPr lang="it-IT" dirty="0"/>
+              <a:t> </a:t>
+            </a:r>
+            <a:r>
+              <a:rPr lang="it-IT" dirty="0" err="1"/>
+              <a:t>is</a:t>
+            </a:r>
+            <a:r>
+              <a:rPr lang="it-IT" dirty="0"/>
+              <a:t> the </a:t>
+            </a:r>
+            <a:r>
+              <a:rPr lang="it-IT" dirty="0" err="1"/>
+              <a:t>problem</a:t>
+            </a:r>
+            <a:r>
+              <a:rPr lang="it-IT" dirty="0"/>
+              <a:t>?</a:t>
+            </a:r>
+          </a:p>
+          <a:p>
+            <a:r>
+              <a:rPr lang="it-IT" dirty="0"/>
+              <a:t>The </a:t>
+            </a:r>
+            <a:r>
+              <a:rPr lang="it-IT" dirty="0" err="1"/>
+              <a:t>randomization</a:t>
+            </a:r>
+            <a:endParaRPr lang="it-IT" dirty="0"/>
+          </a:p>
+        </p:txBody>
+      </p:sp>
+      <p:pic>
+        <p:nvPicPr>
+          <p:cNvPr id="6" name="Content Placeholder 5">
+            <a:extLst>
+              <a:ext uri="{FF2B5EF4-FFF2-40B4-BE49-F238E27FC236}">
+                <a16:creationId xmlns:a16="http://schemas.microsoft.com/office/drawing/2014/main" id="{13123E3F-1322-3185-F614-A99FB3836DEB}"/>
+              </a:ext>
+            </a:extLst>
+          </p:cNvPr>
+          <p:cNvPicPr>
+            <a:picLocks noGrp="1" noChangeAspect="1"/>
+          </p:cNvPicPr>
+          <p:nvPr>
+            <p:ph sz="half" idx="2"/>
+          </p:nvPr>
+        </p:nvPicPr>
+        <p:blipFill>
+          <a:blip r:embed="rId2"/>
+          <a:stretch>
+            <a:fillRect/>
+          </a:stretch>
+        </p:blipFill>
+        <p:spPr>
+          <a:xfrm>
+            <a:off x="6172200" y="2519269"/>
+            <a:ext cx="5181600" cy="2964050"/>
+          </a:xfrm>
+        </p:spPr>
+      </p:pic>
+    </p:spTree>
+    <p:extLst>
+      <p:ext uri="{BB962C8B-B14F-4D97-AF65-F5344CB8AC3E}">
+        <p14:creationId xmlns:p14="http://schemas.microsoft.com/office/powerpoint/2010/main" val="4185255247"/>
+      </p:ext>
+    </p:extLst>
+  </p:cSld>
+  <p:clrMapOvr>
+    <a:masterClrMapping/>
+  </p:clrMapOvr>
+</p:sld>
+</file>
+
+<file path=ppt/slides/slide65.xml><?xml version="1.0" encoding="utf-8"?>
+<p:sld xmlns:a="http://schemas.openxmlformats.org/drawingml/2006/main" xmlns:r="http://schemas.openxmlformats.org/officeDocument/2006/relationships" xmlns:p="http://schemas.openxmlformats.org/presentationml/2006/main">
+  <p:cSld>
+    <p:spTree>
+      <p:nvGrpSpPr>
+        <p:cNvPr id="1" name=""/>
+        <p:cNvGrpSpPr/>
+        <p:nvPr/>
+      </p:nvGrpSpPr>
+      <p:grpSpPr>
+        <a:xfrm>
+          <a:off x="0" y="0"/>
+          <a:ext cx="0" cy="0"/>
+          <a:chOff x="0" y="0"/>
+          <a:chExt cx="0" cy="0"/>
+        </a:xfrm>
+      </p:grpSpPr>
+      <p:sp>
+        <p:nvSpPr>
+          <p:cNvPr id="2" name="Title 1">
+            <a:extLst>
+              <a:ext uri="{FF2B5EF4-FFF2-40B4-BE49-F238E27FC236}">
+                <a16:creationId xmlns:a16="http://schemas.microsoft.com/office/drawing/2014/main" id="{FC82C448-9D51-0DFC-6210-B4FED9018CCF}"/>
+              </a:ext>
+            </a:extLst>
+          </p:cNvPr>
+          <p:cNvSpPr>
+            <a:spLocks noGrp="1"/>
+          </p:cNvSpPr>
+          <p:nvPr>
+            <p:ph type="title"/>
+          </p:nvPr>
+        </p:nvSpPr>
+        <p:spPr/>
+        <p:txBody>
+          <a:bodyPr/>
+          <a:lstStyle/>
+          <a:p>
+            <a:r>
+              <a:rPr lang="it-IT" dirty="0" err="1"/>
+              <a:t>Asyncronous</a:t>
+            </a:r>
+            <a:r>
+              <a:rPr lang="it-IT" dirty="0"/>
+              <a:t> matching</a:t>
+            </a:r>
+          </a:p>
+        </p:txBody>
+      </p:sp>
+      <p:sp>
+        <p:nvSpPr>
+          <p:cNvPr id="3" name="Content Placeholder 2">
+            <a:extLst>
+              <a:ext uri="{FF2B5EF4-FFF2-40B4-BE49-F238E27FC236}">
+                <a16:creationId xmlns:a16="http://schemas.microsoft.com/office/drawing/2014/main" id="{E02C4D8C-8A70-3D04-8D72-F1D45F826974}"/>
+              </a:ext>
+            </a:extLst>
+          </p:cNvPr>
+          <p:cNvSpPr>
+            <a:spLocks noGrp="1"/>
+          </p:cNvSpPr>
+          <p:nvPr>
+            <p:ph sz="half" idx="1"/>
+          </p:nvPr>
+        </p:nvSpPr>
+        <p:spPr/>
+        <p:txBody>
+          <a:bodyPr/>
+          <a:lstStyle/>
+          <a:p>
+            <a:r>
+              <a:rPr lang="it-IT" dirty="0"/>
+              <a:t>One </a:t>
+            </a:r>
+            <a:r>
+              <a:rPr lang="it-IT" dirty="0" err="1"/>
+              <a:t>solution</a:t>
+            </a:r>
+            <a:r>
+              <a:rPr lang="it-IT" dirty="0"/>
+              <a:t>. But </a:t>
+            </a:r>
+            <a:r>
+              <a:rPr lang="it-IT" dirty="0" err="1"/>
+              <a:t>not</a:t>
+            </a:r>
+            <a:r>
+              <a:rPr lang="it-IT" dirty="0"/>
+              <a:t> </a:t>
+            </a:r>
+            <a:r>
+              <a:rPr lang="it-IT" dirty="0" err="1"/>
+              <a:t>really</a:t>
+            </a:r>
+            <a:endParaRPr lang="it-IT" dirty="0"/>
+          </a:p>
+          <a:p>
+            <a:r>
+              <a:rPr lang="it-IT" dirty="0" err="1"/>
+              <a:t>We</a:t>
+            </a:r>
+            <a:r>
+              <a:rPr lang="it-IT" dirty="0"/>
+              <a:t> </a:t>
+            </a:r>
+            <a:r>
+              <a:rPr lang="it-IT" dirty="0" err="1"/>
+              <a:t>need</a:t>
+            </a:r>
+            <a:r>
+              <a:rPr lang="it-IT" dirty="0"/>
+              <a:t> to </a:t>
+            </a:r>
+            <a:r>
+              <a:rPr lang="it-IT" dirty="0" err="1"/>
+              <a:t>manage</a:t>
+            </a:r>
+            <a:r>
+              <a:rPr lang="it-IT" dirty="0"/>
+              <a:t> </a:t>
+            </a:r>
+            <a:r>
+              <a:rPr lang="it-IT" dirty="0" err="1"/>
+              <a:t>this</a:t>
+            </a:r>
+            <a:r>
+              <a:rPr lang="it-IT" dirty="0"/>
+              <a:t> from the server…</a:t>
+            </a:r>
+          </a:p>
+          <a:p>
+            <a:endParaRPr lang="it-IT" dirty="0"/>
+          </a:p>
+          <a:p>
+            <a:r>
+              <a:rPr lang="it-IT" dirty="0" err="1"/>
+              <a:t>This</a:t>
+            </a:r>
+            <a:r>
+              <a:rPr lang="it-IT" dirty="0"/>
+              <a:t> </a:t>
+            </a:r>
+            <a:r>
+              <a:rPr lang="it-IT" dirty="0" err="1"/>
+              <a:t>is</a:t>
+            </a:r>
+            <a:r>
+              <a:rPr lang="it-IT" dirty="0"/>
+              <a:t> a general </a:t>
+            </a:r>
+            <a:r>
+              <a:rPr lang="it-IT" dirty="0" err="1"/>
+              <a:t>problem</a:t>
+            </a:r>
+            <a:r>
+              <a:rPr lang="it-IT" dirty="0"/>
+              <a:t>, I </a:t>
+            </a:r>
+            <a:r>
+              <a:rPr lang="it-IT" dirty="0" err="1"/>
+              <a:t>want</a:t>
+            </a:r>
+            <a:r>
+              <a:rPr lang="it-IT" dirty="0"/>
+              <a:t> to talk </a:t>
+            </a:r>
+            <a:r>
+              <a:rPr lang="it-IT" dirty="0" err="1"/>
+              <a:t>about</a:t>
+            </a:r>
+            <a:r>
+              <a:rPr lang="it-IT" dirty="0"/>
+              <a:t> </a:t>
+            </a:r>
+            <a:r>
+              <a:rPr lang="it-IT" dirty="0" err="1"/>
+              <a:t>that</a:t>
+            </a:r>
+            <a:r>
+              <a:rPr lang="it-IT" dirty="0"/>
+              <a:t> in the end</a:t>
+            </a:r>
+          </a:p>
+        </p:txBody>
+      </p:sp>
+      <p:pic>
+        <p:nvPicPr>
+          <p:cNvPr id="6" name="Content Placeholder 5">
+            <a:extLst>
+              <a:ext uri="{FF2B5EF4-FFF2-40B4-BE49-F238E27FC236}">
+                <a16:creationId xmlns:a16="http://schemas.microsoft.com/office/drawing/2014/main" id="{29018A26-47FB-68DD-9C6A-6247B364CEAB}"/>
+              </a:ext>
+            </a:extLst>
+          </p:cNvPr>
+          <p:cNvPicPr>
+            <a:picLocks noGrp="1" noChangeAspect="1"/>
+          </p:cNvPicPr>
+          <p:nvPr>
+            <p:ph sz="half" idx="2"/>
+          </p:nvPr>
+        </p:nvPicPr>
+        <p:blipFill>
+          <a:blip r:embed="rId2"/>
+          <a:stretch>
+            <a:fillRect/>
+          </a:stretch>
+        </p:blipFill>
+        <p:spPr>
+          <a:xfrm>
+            <a:off x="6172200" y="2617891"/>
+            <a:ext cx="5181600" cy="2766805"/>
+          </a:xfrm>
+        </p:spPr>
+      </p:pic>
+    </p:spTree>
+    <p:extLst>
+      <p:ext uri="{BB962C8B-B14F-4D97-AF65-F5344CB8AC3E}">
+        <p14:creationId xmlns:p14="http://schemas.microsoft.com/office/powerpoint/2010/main" val="1680469188"/>
       </p:ext>
     </p:extLst>
   </p:cSld>

</xml_diff>